<commit_message>
Added examples for directives.
</commit_message>
<xml_diff>
--- a/angular/Angular.pptx
+++ b/angular/Angular.pptx
@@ -11,8 +11,11 @@
     <p:sldId id="260" r:id="rId5"/>
     <p:sldId id="259" r:id="rId6"/>
     <p:sldId id="262" r:id="rId7"/>
-    <p:sldId id="263" r:id="rId8"/>
-    <p:sldId id="258" r:id="rId9"/>
+    <p:sldId id="265" r:id="rId8"/>
+    <p:sldId id="266" r:id="rId9"/>
+    <p:sldId id="263" r:id="rId10"/>
+    <p:sldId id="264" r:id="rId11"/>
+    <p:sldId id="258" r:id="rId12"/>
   </p:sldIdLst>
   <p:sldSz cx="12192000" cy="6858000"/>
   <p:notesSz cx="6858000" cy="9144000"/>
@@ -17747,6 +17750,1647 @@
 </p:sld>
 </file>
 
+<file path=ppt/slides/slide10.xml><?xml version="1.0" encoding="utf-8"?>
+<p:sld xmlns:a="http://schemas.openxmlformats.org/drawingml/2006/main" xmlns:r="http://schemas.openxmlformats.org/officeDocument/2006/relationships" xmlns:p="http://schemas.openxmlformats.org/presentationml/2006/main">
+  <p:cSld>
+    <p:spTree>
+      <p:nvGrpSpPr>
+        <p:cNvPr id="1" name=""/>
+        <p:cNvGrpSpPr/>
+        <p:nvPr/>
+      </p:nvGrpSpPr>
+      <p:grpSpPr>
+        <a:xfrm>
+          <a:off x="0" y="0"/>
+          <a:ext cx="0" cy="0"/>
+          <a:chOff x="0" y="0"/>
+          <a:chExt cx="0" cy="0"/>
+        </a:xfrm>
+      </p:grpSpPr>
+      <p:sp>
+        <p:nvSpPr>
+          <p:cNvPr id="2" name="Title 1"/>
+          <p:cNvSpPr>
+            <a:spLocks noGrp="1"/>
+          </p:cNvSpPr>
+          <p:nvPr>
+            <p:ph type="title"/>
+          </p:nvPr>
+        </p:nvSpPr>
+        <p:spPr/>
+        <p:txBody>
+          <a:bodyPr/>
+          <a:lstStyle/>
+          <a:p>
+            <a:r>
+              <a:rPr lang="en-US" dirty="0" smtClean="0"/>
+              <a:t>New component</a:t>
+            </a:r>
+            <a:endParaRPr lang="en-US" dirty="0"/>
+          </a:p>
+        </p:txBody>
+      </p:sp>
+      <p:sp>
+        <p:nvSpPr>
+          <p:cNvPr id="7" name="TextBox 6"/>
+          <p:cNvSpPr txBox="1"/>
+          <p:nvPr/>
+        </p:nvSpPr>
+        <p:spPr>
+          <a:xfrm>
+            <a:off x="1385456" y="1644073"/>
+            <a:ext cx="8876144" cy="4801314"/>
+          </a:xfrm>
+          <a:prstGeom prst="rect">
+            <a:avLst/>
+          </a:prstGeom>
+          <a:solidFill>
+            <a:schemeClr val="bg1"/>
+          </a:solidFill>
+        </p:spPr>
+        <p:txBody>
+          <a:bodyPr wrap="square" rtlCol="0">
+            <a:spAutoFit/>
+          </a:bodyPr>
+          <a:lstStyle/>
+          <a:p>
+            <a:r>
+              <a:rPr lang="en-US" dirty="0">
+                <a:solidFill>
+                  <a:srgbClr val="C586C0"/>
+                </a:solidFill>
+                <a:latin typeface="Consolas" panose="020B0609020204030204" pitchFamily="49" charset="0"/>
+              </a:rPr>
+              <a:t>import</a:t>
+            </a:r>
+            <a:r>
+              <a:rPr lang="en-US" dirty="0">
+                <a:solidFill>
+                  <a:srgbClr val="D4D4D4"/>
+                </a:solidFill>
+                <a:latin typeface="Consolas" panose="020B0609020204030204" pitchFamily="49" charset="0"/>
+              </a:rPr>
+              <a:t> { </a:t>
+            </a:r>
+            <a:r>
+              <a:rPr lang="en-US" dirty="0">
+                <a:solidFill>
+                  <a:srgbClr val="9CDCFE"/>
+                </a:solidFill>
+                <a:latin typeface="Consolas" panose="020B0609020204030204" pitchFamily="49" charset="0"/>
+              </a:rPr>
+              <a:t>Component</a:t>
+            </a:r>
+            <a:r>
+              <a:rPr lang="en-US" dirty="0">
+                <a:solidFill>
+                  <a:srgbClr val="D4D4D4"/>
+                </a:solidFill>
+                <a:latin typeface="Consolas" panose="020B0609020204030204" pitchFamily="49" charset="0"/>
+              </a:rPr>
+              <a:t>, </a:t>
+            </a:r>
+            <a:r>
+              <a:rPr lang="en-US" dirty="0" err="1">
+                <a:solidFill>
+                  <a:srgbClr val="9CDCFE"/>
+                </a:solidFill>
+                <a:latin typeface="Consolas" panose="020B0609020204030204" pitchFamily="49" charset="0"/>
+              </a:rPr>
+              <a:t>OnInit</a:t>
+            </a:r>
+            <a:r>
+              <a:rPr lang="en-US" dirty="0">
+                <a:solidFill>
+                  <a:srgbClr val="D4D4D4"/>
+                </a:solidFill>
+                <a:latin typeface="Consolas" panose="020B0609020204030204" pitchFamily="49" charset="0"/>
+              </a:rPr>
+              <a:t>, </a:t>
+            </a:r>
+            <a:r>
+              <a:rPr lang="en-US" dirty="0">
+                <a:solidFill>
+                  <a:srgbClr val="9CDCFE"/>
+                </a:solidFill>
+                <a:latin typeface="Consolas" panose="020B0609020204030204" pitchFamily="49" charset="0"/>
+              </a:rPr>
+              <a:t>Input</a:t>
+            </a:r>
+            <a:r>
+              <a:rPr lang="en-US" dirty="0">
+                <a:solidFill>
+                  <a:srgbClr val="D4D4D4"/>
+                </a:solidFill>
+                <a:latin typeface="Consolas" panose="020B0609020204030204" pitchFamily="49" charset="0"/>
+              </a:rPr>
+              <a:t> } </a:t>
+            </a:r>
+            <a:r>
+              <a:rPr lang="en-US" dirty="0">
+                <a:solidFill>
+                  <a:srgbClr val="C586C0"/>
+                </a:solidFill>
+                <a:latin typeface="Consolas" panose="020B0609020204030204" pitchFamily="49" charset="0"/>
+              </a:rPr>
+              <a:t>from</a:t>
+            </a:r>
+            <a:r>
+              <a:rPr lang="en-US" dirty="0">
+                <a:solidFill>
+                  <a:srgbClr val="D4D4D4"/>
+                </a:solidFill>
+                <a:latin typeface="Consolas" panose="020B0609020204030204" pitchFamily="49" charset="0"/>
+              </a:rPr>
+              <a:t> </a:t>
+            </a:r>
+            <a:r>
+              <a:rPr lang="en-US" dirty="0">
+                <a:solidFill>
+                  <a:srgbClr val="CE9178"/>
+                </a:solidFill>
+                <a:latin typeface="Consolas" panose="020B0609020204030204" pitchFamily="49" charset="0"/>
+              </a:rPr>
+              <a:t>'@angular/core'</a:t>
+            </a:r>
+            <a:r>
+              <a:rPr lang="en-US" dirty="0">
+                <a:solidFill>
+                  <a:srgbClr val="D4D4D4"/>
+                </a:solidFill>
+                <a:latin typeface="Consolas" panose="020B0609020204030204" pitchFamily="49" charset="0"/>
+              </a:rPr>
+              <a:t>;</a:t>
+            </a:r>
+          </a:p>
+          <a:p>
+            <a:r>
+              <a:rPr lang="en-US" dirty="0">
+                <a:solidFill>
+                  <a:srgbClr val="C586C0"/>
+                </a:solidFill>
+                <a:latin typeface="Consolas" panose="020B0609020204030204" pitchFamily="49" charset="0"/>
+              </a:rPr>
+              <a:t>import</a:t>
+            </a:r>
+            <a:r>
+              <a:rPr lang="en-US" dirty="0">
+                <a:solidFill>
+                  <a:srgbClr val="D4D4D4"/>
+                </a:solidFill>
+                <a:latin typeface="Consolas" panose="020B0609020204030204" pitchFamily="49" charset="0"/>
+              </a:rPr>
+              <a:t> { </a:t>
+            </a:r>
+            <a:r>
+              <a:rPr lang="en-US" dirty="0">
+                <a:solidFill>
+                  <a:srgbClr val="9CDCFE"/>
+                </a:solidFill>
+                <a:latin typeface="Consolas" panose="020B0609020204030204" pitchFamily="49" charset="0"/>
+              </a:rPr>
+              <a:t>Http</a:t>
+            </a:r>
+            <a:r>
+              <a:rPr lang="en-US" dirty="0">
+                <a:solidFill>
+                  <a:srgbClr val="D4D4D4"/>
+                </a:solidFill>
+                <a:latin typeface="Consolas" panose="020B0609020204030204" pitchFamily="49" charset="0"/>
+              </a:rPr>
+              <a:t> } </a:t>
+            </a:r>
+            <a:r>
+              <a:rPr lang="en-US" dirty="0">
+                <a:solidFill>
+                  <a:srgbClr val="C586C0"/>
+                </a:solidFill>
+                <a:latin typeface="Consolas" panose="020B0609020204030204" pitchFamily="49" charset="0"/>
+              </a:rPr>
+              <a:t>from</a:t>
+            </a:r>
+            <a:r>
+              <a:rPr lang="en-US" dirty="0">
+                <a:solidFill>
+                  <a:srgbClr val="D4D4D4"/>
+                </a:solidFill>
+                <a:latin typeface="Consolas" panose="020B0609020204030204" pitchFamily="49" charset="0"/>
+              </a:rPr>
+              <a:t> </a:t>
+            </a:r>
+            <a:r>
+              <a:rPr lang="en-US" dirty="0">
+                <a:solidFill>
+                  <a:srgbClr val="CE9178"/>
+                </a:solidFill>
+                <a:latin typeface="Consolas" panose="020B0609020204030204" pitchFamily="49" charset="0"/>
+              </a:rPr>
+              <a:t>'@angular/http'</a:t>
+            </a:r>
+            <a:r>
+              <a:rPr lang="en-US" dirty="0">
+                <a:solidFill>
+                  <a:srgbClr val="D4D4D4"/>
+                </a:solidFill>
+                <a:latin typeface="Consolas" panose="020B0609020204030204" pitchFamily="49" charset="0"/>
+              </a:rPr>
+              <a:t>;</a:t>
+            </a:r>
+          </a:p>
+          <a:p>
+            <a:r>
+              <a:rPr lang="en-US" dirty="0">
+                <a:solidFill>
+                  <a:srgbClr val="D4D4D4"/>
+                </a:solidFill>
+                <a:latin typeface="Consolas" panose="020B0609020204030204" pitchFamily="49" charset="0"/>
+              </a:rPr>
+              <a:t/>
+            </a:r>
+            <a:br>
+              <a:rPr lang="en-US" dirty="0">
+                <a:solidFill>
+                  <a:srgbClr val="D4D4D4"/>
+                </a:solidFill>
+                <a:latin typeface="Consolas" panose="020B0609020204030204" pitchFamily="49" charset="0"/>
+              </a:rPr>
+            </a:br>
+            <a:r>
+              <a:rPr lang="en-US" dirty="0">
+                <a:solidFill>
+                  <a:srgbClr val="D4D4D4"/>
+                </a:solidFill>
+                <a:latin typeface="Consolas" panose="020B0609020204030204" pitchFamily="49" charset="0"/>
+              </a:rPr>
+              <a:t>@</a:t>
+            </a:r>
+            <a:r>
+              <a:rPr lang="en-US" dirty="0">
+                <a:solidFill>
+                  <a:srgbClr val="DCDCAA"/>
+                </a:solidFill>
+                <a:latin typeface="Consolas" panose="020B0609020204030204" pitchFamily="49" charset="0"/>
+              </a:rPr>
+              <a:t>Component</a:t>
+            </a:r>
+            <a:r>
+              <a:rPr lang="en-US" dirty="0">
+                <a:solidFill>
+                  <a:srgbClr val="D4D4D4"/>
+                </a:solidFill>
+                <a:latin typeface="Consolas" panose="020B0609020204030204" pitchFamily="49" charset="0"/>
+              </a:rPr>
+              <a:t>({</a:t>
+            </a:r>
+          </a:p>
+          <a:p>
+            <a:pPr lvl="1"/>
+            <a:r>
+              <a:rPr lang="en-US" dirty="0">
+                <a:solidFill>
+                  <a:srgbClr val="9CDCFE"/>
+                </a:solidFill>
+                <a:latin typeface="Consolas" panose="020B0609020204030204" pitchFamily="49" charset="0"/>
+              </a:rPr>
+              <a:t>selector:</a:t>
+            </a:r>
+            <a:r>
+              <a:rPr lang="en-US" dirty="0">
+                <a:solidFill>
+                  <a:srgbClr val="D4D4D4"/>
+                </a:solidFill>
+                <a:latin typeface="Consolas" panose="020B0609020204030204" pitchFamily="49" charset="0"/>
+              </a:rPr>
+              <a:t> </a:t>
+            </a:r>
+            <a:r>
+              <a:rPr lang="en-US" dirty="0">
+                <a:solidFill>
+                  <a:srgbClr val="CE9178"/>
+                </a:solidFill>
+                <a:latin typeface="Consolas" panose="020B0609020204030204" pitchFamily="49" charset="0"/>
+              </a:rPr>
+              <a:t>'app-demo-</a:t>
+            </a:r>
+            <a:r>
+              <a:rPr lang="en-US" dirty="0" err="1">
+                <a:solidFill>
+                  <a:srgbClr val="CE9178"/>
+                </a:solidFill>
+                <a:latin typeface="Consolas" panose="020B0609020204030204" pitchFamily="49" charset="0"/>
+              </a:rPr>
+              <a:t>cmp</a:t>
+            </a:r>
+            <a:r>
+              <a:rPr lang="en-US" dirty="0">
+                <a:solidFill>
+                  <a:srgbClr val="CE9178"/>
+                </a:solidFill>
+                <a:latin typeface="Consolas" panose="020B0609020204030204" pitchFamily="49" charset="0"/>
+              </a:rPr>
+              <a:t>'</a:t>
+            </a:r>
+            <a:r>
+              <a:rPr lang="en-US" dirty="0">
+                <a:solidFill>
+                  <a:srgbClr val="D4D4D4"/>
+                </a:solidFill>
+                <a:latin typeface="Consolas" panose="020B0609020204030204" pitchFamily="49" charset="0"/>
+              </a:rPr>
+              <a:t>,</a:t>
+            </a:r>
+          </a:p>
+          <a:p>
+            <a:pPr lvl="1"/>
+            <a:r>
+              <a:rPr lang="en-US" dirty="0" err="1">
+                <a:solidFill>
+                  <a:srgbClr val="9CDCFE"/>
+                </a:solidFill>
+                <a:latin typeface="Consolas" panose="020B0609020204030204" pitchFamily="49" charset="0"/>
+              </a:rPr>
+              <a:t>templateUrl</a:t>
+            </a:r>
+            <a:r>
+              <a:rPr lang="en-US" dirty="0">
+                <a:solidFill>
+                  <a:srgbClr val="9CDCFE"/>
+                </a:solidFill>
+                <a:latin typeface="Consolas" panose="020B0609020204030204" pitchFamily="49" charset="0"/>
+              </a:rPr>
+              <a:t>:</a:t>
+            </a:r>
+            <a:r>
+              <a:rPr lang="en-US" dirty="0">
+                <a:solidFill>
+                  <a:srgbClr val="D4D4D4"/>
+                </a:solidFill>
+                <a:latin typeface="Consolas" panose="020B0609020204030204" pitchFamily="49" charset="0"/>
+              </a:rPr>
+              <a:t> </a:t>
+            </a:r>
+            <a:r>
+              <a:rPr lang="en-US" dirty="0">
+                <a:solidFill>
+                  <a:srgbClr val="CE9178"/>
+                </a:solidFill>
+                <a:latin typeface="Consolas" panose="020B0609020204030204" pitchFamily="49" charset="0"/>
+              </a:rPr>
+              <a:t>'./demo-cmp.component.html'</a:t>
+            </a:r>
+            <a:r>
+              <a:rPr lang="en-US" dirty="0">
+                <a:solidFill>
+                  <a:srgbClr val="D4D4D4"/>
+                </a:solidFill>
+                <a:latin typeface="Consolas" panose="020B0609020204030204" pitchFamily="49" charset="0"/>
+              </a:rPr>
+              <a:t>,</a:t>
+            </a:r>
+          </a:p>
+          <a:p>
+            <a:pPr lvl="1"/>
+            <a:r>
+              <a:rPr lang="en-US" dirty="0" err="1">
+                <a:solidFill>
+                  <a:srgbClr val="9CDCFE"/>
+                </a:solidFill>
+                <a:latin typeface="Consolas" panose="020B0609020204030204" pitchFamily="49" charset="0"/>
+              </a:rPr>
+              <a:t>styleUrls</a:t>
+            </a:r>
+            <a:r>
+              <a:rPr lang="en-US" dirty="0">
+                <a:solidFill>
+                  <a:srgbClr val="9CDCFE"/>
+                </a:solidFill>
+                <a:latin typeface="Consolas" panose="020B0609020204030204" pitchFamily="49" charset="0"/>
+              </a:rPr>
+              <a:t>:</a:t>
+            </a:r>
+            <a:r>
+              <a:rPr lang="en-US" dirty="0">
+                <a:solidFill>
+                  <a:srgbClr val="D4D4D4"/>
+                </a:solidFill>
+                <a:latin typeface="Consolas" panose="020B0609020204030204" pitchFamily="49" charset="0"/>
+              </a:rPr>
+              <a:t> [</a:t>
+            </a:r>
+            <a:r>
+              <a:rPr lang="en-US" dirty="0">
+                <a:solidFill>
+                  <a:srgbClr val="CE9178"/>
+                </a:solidFill>
+                <a:latin typeface="Consolas" panose="020B0609020204030204" pitchFamily="49" charset="0"/>
+              </a:rPr>
+              <a:t>'./demo-cmp.component.css'</a:t>
+            </a:r>
+            <a:r>
+              <a:rPr lang="en-US" dirty="0">
+                <a:solidFill>
+                  <a:srgbClr val="D4D4D4"/>
+                </a:solidFill>
+                <a:latin typeface="Consolas" panose="020B0609020204030204" pitchFamily="49" charset="0"/>
+              </a:rPr>
+              <a:t>]</a:t>
+            </a:r>
+          </a:p>
+          <a:p>
+            <a:r>
+              <a:rPr lang="en-US" dirty="0">
+                <a:solidFill>
+                  <a:srgbClr val="D4D4D4"/>
+                </a:solidFill>
+                <a:latin typeface="Consolas" panose="020B0609020204030204" pitchFamily="49" charset="0"/>
+              </a:rPr>
+              <a:t>})</a:t>
+            </a:r>
+          </a:p>
+          <a:p>
+            <a:r>
+              <a:rPr lang="en-US" dirty="0">
+                <a:solidFill>
+                  <a:srgbClr val="C586C0"/>
+                </a:solidFill>
+                <a:latin typeface="Consolas" panose="020B0609020204030204" pitchFamily="49" charset="0"/>
+              </a:rPr>
+              <a:t>export</a:t>
+            </a:r>
+            <a:r>
+              <a:rPr lang="en-US" dirty="0">
+                <a:solidFill>
+                  <a:srgbClr val="D4D4D4"/>
+                </a:solidFill>
+                <a:latin typeface="Consolas" panose="020B0609020204030204" pitchFamily="49" charset="0"/>
+              </a:rPr>
+              <a:t> </a:t>
+            </a:r>
+            <a:r>
+              <a:rPr lang="en-US" dirty="0">
+                <a:solidFill>
+                  <a:srgbClr val="569CD6"/>
+                </a:solidFill>
+                <a:latin typeface="Consolas" panose="020B0609020204030204" pitchFamily="49" charset="0"/>
+              </a:rPr>
+              <a:t>class</a:t>
+            </a:r>
+            <a:r>
+              <a:rPr lang="en-US" dirty="0">
+                <a:solidFill>
+                  <a:srgbClr val="D4D4D4"/>
+                </a:solidFill>
+                <a:latin typeface="Consolas" panose="020B0609020204030204" pitchFamily="49" charset="0"/>
+              </a:rPr>
+              <a:t> </a:t>
+            </a:r>
+            <a:r>
+              <a:rPr lang="en-US" dirty="0" err="1">
+                <a:solidFill>
+                  <a:srgbClr val="4EC9B0"/>
+                </a:solidFill>
+                <a:latin typeface="Consolas" panose="020B0609020204030204" pitchFamily="49" charset="0"/>
+              </a:rPr>
+              <a:t>DemoCmpComponent</a:t>
+            </a:r>
+            <a:r>
+              <a:rPr lang="en-US" dirty="0">
+                <a:solidFill>
+                  <a:srgbClr val="D4D4D4"/>
+                </a:solidFill>
+                <a:latin typeface="Consolas" panose="020B0609020204030204" pitchFamily="49" charset="0"/>
+              </a:rPr>
+              <a:t> </a:t>
+            </a:r>
+            <a:r>
+              <a:rPr lang="en-US" dirty="0">
+                <a:solidFill>
+                  <a:srgbClr val="569CD6"/>
+                </a:solidFill>
+                <a:latin typeface="Consolas" panose="020B0609020204030204" pitchFamily="49" charset="0"/>
+              </a:rPr>
+              <a:t>implements</a:t>
+            </a:r>
+            <a:r>
+              <a:rPr lang="en-US" dirty="0">
+                <a:solidFill>
+                  <a:srgbClr val="D4D4D4"/>
+                </a:solidFill>
+                <a:latin typeface="Consolas" panose="020B0609020204030204" pitchFamily="49" charset="0"/>
+              </a:rPr>
+              <a:t> </a:t>
+            </a:r>
+            <a:r>
+              <a:rPr lang="en-US" dirty="0" err="1">
+                <a:solidFill>
+                  <a:srgbClr val="4EC9B0"/>
+                </a:solidFill>
+                <a:latin typeface="Consolas" panose="020B0609020204030204" pitchFamily="49" charset="0"/>
+              </a:rPr>
+              <a:t>OnInit</a:t>
+            </a:r>
+            <a:r>
+              <a:rPr lang="en-US" dirty="0">
+                <a:solidFill>
+                  <a:srgbClr val="D4D4D4"/>
+                </a:solidFill>
+                <a:latin typeface="Consolas" panose="020B0609020204030204" pitchFamily="49" charset="0"/>
+              </a:rPr>
+              <a:t> {</a:t>
+            </a:r>
+          </a:p>
+          <a:p>
+            <a:r>
+              <a:rPr lang="en-US" dirty="0" smtClean="0">
+                <a:solidFill>
+                  <a:srgbClr val="9CDCFE"/>
+                </a:solidFill>
+                <a:latin typeface="Consolas" panose="020B0609020204030204" pitchFamily="49" charset="0"/>
+              </a:rPr>
+              <a:t>	title</a:t>
+            </a:r>
+            <a:r>
+              <a:rPr lang="en-US" dirty="0" smtClean="0">
+                <a:solidFill>
+                  <a:srgbClr val="D4D4D4"/>
+                </a:solidFill>
+                <a:latin typeface="Consolas" panose="020B0609020204030204" pitchFamily="49" charset="0"/>
+              </a:rPr>
+              <a:t> </a:t>
+            </a:r>
+            <a:r>
+              <a:rPr lang="en-US" dirty="0">
+                <a:solidFill>
+                  <a:srgbClr val="D4D4D4"/>
+                </a:solidFill>
+                <a:latin typeface="Consolas" panose="020B0609020204030204" pitchFamily="49" charset="0"/>
+              </a:rPr>
+              <a:t>= </a:t>
+            </a:r>
+            <a:r>
+              <a:rPr lang="en-US" dirty="0">
+                <a:solidFill>
+                  <a:srgbClr val="CE9178"/>
+                </a:solidFill>
+                <a:latin typeface="Consolas" panose="020B0609020204030204" pitchFamily="49" charset="0"/>
+              </a:rPr>
+              <a:t>'World'</a:t>
+            </a:r>
+            <a:r>
+              <a:rPr lang="en-US" dirty="0">
+                <a:solidFill>
+                  <a:srgbClr val="D4D4D4"/>
+                </a:solidFill>
+                <a:latin typeface="Consolas" panose="020B0609020204030204" pitchFamily="49" charset="0"/>
+              </a:rPr>
+              <a:t>;</a:t>
+            </a:r>
+          </a:p>
+          <a:p>
+            <a:r>
+              <a:rPr lang="en-US" dirty="0" smtClean="0">
+                <a:solidFill>
+                  <a:srgbClr val="D4D4D4"/>
+                </a:solidFill>
+                <a:latin typeface="Consolas" panose="020B0609020204030204" pitchFamily="49" charset="0"/>
+              </a:rPr>
+              <a:t>	@</a:t>
+            </a:r>
+            <a:r>
+              <a:rPr lang="en-US" dirty="0">
+                <a:solidFill>
+                  <a:srgbClr val="DCDCAA"/>
+                </a:solidFill>
+                <a:latin typeface="Consolas" panose="020B0609020204030204" pitchFamily="49" charset="0"/>
+              </a:rPr>
+              <a:t>Input</a:t>
+            </a:r>
+            <a:r>
+              <a:rPr lang="en-US" dirty="0">
+                <a:solidFill>
+                  <a:srgbClr val="D4D4D4"/>
+                </a:solidFill>
+                <a:latin typeface="Consolas" panose="020B0609020204030204" pitchFamily="49" charset="0"/>
+              </a:rPr>
+              <a:t>() </a:t>
+            </a:r>
+            <a:r>
+              <a:rPr lang="en-US" dirty="0">
+                <a:solidFill>
+                  <a:srgbClr val="9CDCFE"/>
+                </a:solidFill>
+                <a:latin typeface="Consolas" panose="020B0609020204030204" pitchFamily="49" charset="0"/>
+              </a:rPr>
+              <a:t>greeting</a:t>
+            </a:r>
+            <a:r>
+              <a:rPr lang="en-US" dirty="0">
+                <a:solidFill>
+                  <a:srgbClr val="D4D4D4"/>
+                </a:solidFill>
+                <a:latin typeface="Consolas" panose="020B0609020204030204" pitchFamily="49" charset="0"/>
+              </a:rPr>
+              <a:t>;</a:t>
+            </a:r>
+          </a:p>
+          <a:p>
+            <a:r>
+              <a:rPr lang="en-US" dirty="0" smtClean="0">
+                <a:solidFill>
+                  <a:srgbClr val="569CD6"/>
+                </a:solidFill>
+                <a:latin typeface="Consolas" panose="020B0609020204030204" pitchFamily="49" charset="0"/>
+              </a:rPr>
+              <a:t>	constructor</a:t>
+            </a:r>
+            <a:r>
+              <a:rPr lang="en-US" dirty="0" smtClean="0">
+                <a:solidFill>
+                  <a:srgbClr val="D4D4D4"/>
+                </a:solidFill>
+                <a:latin typeface="Consolas" panose="020B0609020204030204" pitchFamily="49" charset="0"/>
+              </a:rPr>
+              <a:t>(</a:t>
+            </a:r>
+            <a:r>
+              <a:rPr lang="en-US" dirty="0" smtClean="0">
+                <a:solidFill>
+                  <a:srgbClr val="9CDCFE"/>
+                </a:solidFill>
+                <a:latin typeface="Consolas" panose="020B0609020204030204" pitchFamily="49" charset="0"/>
+              </a:rPr>
+              <a:t>http</a:t>
+            </a:r>
+            <a:r>
+              <a:rPr lang="en-US" dirty="0">
+                <a:solidFill>
+                  <a:srgbClr val="D4D4D4"/>
+                </a:solidFill>
+                <a:latin typeface="Consolas" panose="020B0609020204030204" pitchFamily="49" charset="0"/>
+              </a:rPr>
+              <a:t>: </a:t>
+            </a:r>
+            <a:r>
+              <a:rPr lang="en-US" dirty="0">
+                <a:solidFill>
+                  <a:srgbClr val="4EC9B0"/>
+                </a:solidFill>
+                <a:latin typeface="Consolas" panose="020B0609020204030204" pitchFamily="49" charset="0"/>
+              </a:rPr>
+              <a:t>Http</a:t>
+            </a:r>
+            <a:r>
+              <a:rPr lang="en-US" dirty="0">
+                <a:solidFill>
+                  <a:srgbClr val="D4D4D4"/>
+                </a:solidFill>
+                <a:latin typeface="Consolas" panose="020B0609020204030204" pitchFamily="49" charset="0"/>
+              </a:rPr>
+              <a:t>) { }</a:t>
+            </a:r>
+          </a:p>
+          <a:p>
+            <a:r>
+              <a:rPr lang="en-US" dirty="0" smtClean="0">
+                <a:solidFill>
+                  <a:srgbClr val="DCDCAA"/>
+                </a:solidFill>
+                <a:latin typeface="Consolas" panose="020B0609020204030204" pitchFamily="49" charset="0"/>
+              </a:rPr>
+              <a:t>	</a:t>
+            </a:r>
+            <a:r>
+              <a:rPr lang="en-US" dirty="0" err="1" smtClean="0">
+                <a:solidFill>
+                  <a:srgbClr val="DCDCAA"/>
+                </a:solidFill>
+                <a:latin typeface="Consolas" panose="020B0609020204030204" pitchFamily="49" charset="0"/>
+              </a:rPr>
+              <a:t>ngOnInit</a:t>
+            </a:r>
+            <a:r>
+              <a:rPr lang="en-US" dirty="0">
+                <a:solidFill>
+                  <a:srgbClr val="D4D4D4"/>
+                </a:solidFill>
+                <a:latin typeface="Consolas" panose="020B0609020204030204" pitchFamily="49" charset="0"/>
+              </a:rPr>
+              <a:t>() { }</a:t>
+            </a:r>
+          </a:p>
+          <a:p>
+            <a:r>
+              <a:rPr lang="en-US" dirty="0" smtClean="0">
+                <a:solidFill>
+                  <a:srgbClr val="DCDCAA"/>
+                </a:solidFill>
+                <a:latin typeface="Consolas" panose="020B0609020204030204" pitchFamily="49" charset="0"/>
+              </a:rPr>
+              <a:t>	</a:t>
+            </a:r>
+            <a:r>
+              <a:rPr lang="en-US" dirty="0" err="1" smtClean="0">
+                <a:solidFill>
+                  <a:srgbClr val="DCDCAA"/>
+                </a:solidFill>
+                <a:latin typeface="Consolas" panose="020B0609020204030204" pitchFamily="49" charset="0"/>
+              </a:rPr>
+              <a:t>ngOnDestroy</a:t>
+            </a:r>
+            <a:r>
+              <a:rPr lang="en-US" dirty="0">
+                <a:solidFill>
+                  <a:srgbClr val="D4D4D4"/>
+                </a:solidFill>
+                <a:latin typeface="Consolas" panose="020B0609020204030204" pitchFamily="49" charset="0"/>
+              </a:rPr>
+              <a:t>() {}</a:t>
+            </a:r>
+          </a:p>
+          <a:p>
+            <a:r>
+              <a:rPr lang="en-US" dirty="0" smtClean="0">
+                <a:solidFill>
+                  <a:srgbClr val="D4D4D4"/>
+                </a:solidFill>
+                <a:latin typeface="Consolas" panose="020B0609020204030204" pitchFamily="49" charset="0"/>
+              </a:rPr>
+              <a:t>}</a:t>
+            </a:r>
+          </a:p>
+          <a:p>
+            <a:r>
+              <a:rPr lang="en-US" dirty="0" smtClean="0">
+                <a:solidFill>
+                  <a:srgbClr val="D4D4D4"/>
+                </a:solidFill>
+                <a:latin typeface="Consolas" panose="020B0609020204030204" pitchFamily="49" charset="0"/>
+              </a:rPr>
+              <a:t>// HTML</a:t>
+            </a:r>
+            <a:br>
+              <a:rPr lang="en-US" dirty="0" smtClean="0">
+                <a:solidFill>
+                  <a:srgbClr val="D4D4D4"/>
+                </a:solidFill>
+                <a:latin typeface="Consolas" panose="020B0609020204030204" pitchFamily="49" charset="0"/>
+              </a:rPr>
+            </a:br>
+            <a:r>
+              <a:rPr lang="en-US" dirty="0">
+                <a:solidFill>
+                  <a:srgbClr val="808080"/>
+                </a:solidFill>
+                <a:latin typeface="Consolas" panose="020B0609020204030204" pitchFamily="49" charset="0"/>
+              </a:rPr>
+              <a:t>&lt;</a:t>
+            </a:r>
+            <a:r>
+              <a:rPr lang="en-US" dirty="0">
+                <a:solidFill>
+                  <a:srgbClr val="569CD6"/>
+                </a:solidFill>
+                <a:latin typeface="Consolas" panose="020B0609020204030204" pitchFamily="49" charset="0"/>
+              </a:rPr>
+              <a:t>app-demo-</a:t>
+            </a:r>
+            <a:r>
+              <a:rPr lang="en-US" dirty="0" err="1">
+                <a:solidFill>
+                  <a:srgbClr val="569CD6"/>
+                </a:solidFill>
+                <a:latin typeface="Consolas" panose="020B0609020204030204" pitchFamily="49" charset="0"/>
+              </a:rPr>
+              <a:t>cmp</a:t>
+            </a:r>
+            <a:r>
+              <a:rPr lang="en-US" dirty="0">
+                <a:solidFill>
+                  <a:srgbClr val="D4D4D4"/>
+                </a:solidFill>
+                <a:latin typeface="Consolas" panose="020B0609020204030204" pitchFamily="49" charset="0"/>
+              </a:rPr>
+              <a:t> </a:t>
+            </a:r>
+            <a:r>
+              <a:rPr lang="en-US" dirty="0">
+                <a:solidFill>
+                  <a:srgbClr val="9CDCFE"/>
+                </a:solidFill>
+                <a:latin typeface="Consolas" panose="020B0609020204030204" pitchFamily="49" charset="0"/>
+              </a:rPr>
+              <a:t>greeting</a:t>
+            </a:r>
+            <a:r>
+              <a:rPr lang="en-US" dirty="0">
+                <a:solidFill>
+                  <a:srgbClr val="D4D4D4"/>
+                </a:solidFill>
+                <a:latin typeface="Consolas" panose="020B0609020204030204" pitchFamily="49" charset="0"/>
+              </a:rPr>
+              <a:t>=</a:t>
+            </a:r>
+            <a:r>
+              <a:rPr lang="en-US" dirty="0">
+                <a:solidFill>
+                  <a:srgbClr val="CE9178"/>
+                </a:solidFill>
+                <a:latin typeface="Consolas" panose="020B0609020204030204" pitchFamily="49" charset="0"/>
+              </a:rPr>
+              <a:t>"Hello"</a:t>
+            </a:r>
+            <a:r>
+              <a:rPr lang="en-US" dirty="0">
+                <a:solidFill>
+                  <a:srgbClr val="808080"/>
+                </a:solidFill>
+                <a:latin typeface="Consolas" panose="020B0609020204030204" pitchFamily="49" charset="0"/>
+              </a:rPr>
+              <a:t>&gt;&lt;/</a:t>
+            </a:r>
+            <a:r>
+              <a:rPr lang="en-US" dirty="0">
+                <a:solidFill>
+                  <a:srgbClr val="569CD6"/>
+                </a:solidFill>
+                <a:latin typeface="Consolas" panose="020B0609020204030204" pitchFamily="49" charset="0"/>
+              </a:rPr>
+              <a:t>app-demo-</a:t>
+            </a:r>
+            <a:r>
+              <a:rPr lang="en-US" dirty="0" err="1">
+                <a:solidFill>
+                  <a:srgbClr val="569CD6"/>
+                </a:solidFill>
+                <a:latin typeface="Consolas" panose="020B0609020204030204" pitchFamily="49" charset="0"/>
+              </a:rPr>
+              <a:t>cmp</a:t>
+            </a:r>
+            <a:r>
+              <a:rPr lang="en-US" dirty="0" smtClean="0">
+                <a:solidFill>
+                  <a:srgbClr val="808080"/>
+                </a:solidFill>
+                <a:latin typeface="Consolas" panose="020B0609020204030204" pitchFamily="49" charset="0"/>
+              </a:rPr>
+              <a:t>&gt;</a:t>
+            </a:r>
+            <a:endParaRPr lang="en-US" b="0" dirty="0">
+              <a:solidFill>
+                <a:srgbClr val="D4D4D4"/>
+              </a:solidFill>
+              <a:effectLst/>
+              <a:latin typeface="Consolas" panose="020B0609020204030204" pitchFamily="49" charset="0"/>
+            </a:endParaRPr>
+          </a:p>
+        </p:txBody>
+      </p:sp>
+      <p:sp>
+        <p:nvSpPr>
+          <p:cNvPr id="4" name="TextBox 3"/>
+          <p:cNvSpPr txBox="1"/>
+          <p:nvPr/>
+        </p:nvSpPr>
+        <p:spPr>
+          <a:xfrm>
+            <a:off x="8478982" y="2056686"/>
+            <a:ext cx="3713018" cy="4801314"/>
+          </a:xfrm>
+          <a:prstGeom prst="rect">
+            <a:avLst/>
+          </a:prstGeom>
+          <a:solidFill>
+            <a:schemeClr val="bg1"/>
+          </a:solidFill>
+          <a:ln>
+            <a:solidFill>
+              <a:schemeClr val="accent1">
+                <a:lumMod val="40000"/>
+                <a:lumOff val="60000"/>
+              </a:schemeClr>
+            </a:solidFill>
+          </a:ln>
+        </p:spPr>
+        <p:txBody>
+          <a:bodyPr wrap="square" rtlCol="0">
+            <a:spAutoFit/>
+          </a:bodyPr>
+          <a:lstStyle/>
+          <a:p>
+            <a:r>
+              <a:rPr lang="en-US" dirty="0">
+                <a:solidFill>
+                  <a:srgbClr val="C586C0"/>
+                </a:solidFill>
+                <a:latin typeface="Consolas" panose="020B0609020204030204" pitchFamily="49" charset="0"/>
+              </a:rPr>
+              <a:t>import</a:t>
+            </a:r>
+            <a:r>
+              <a:rPr lang="en-US" dirty="0">
+                <a:solidFill>
+                  <a:srgbClr val="D4D4D4"/>
+                </a:solidFill>
+                <a:latin typeface="Consolas" panose="020B0609020204030204" pitchFamily="49" charset="0"/>
+              </a:rPr>
+              <a:t> { </a:t>
+            </a:r>
+            <a:r>
+              <a:rPr lang="en-US" dirty="0" err="1">
+                <a:solidFill>
+                  <a:srgbClr val="9CDCFE"/>
+                </a:solidFill>
+                <a:latin typeface="Consolas" panose="020B0609020204030204" pitchFamily="49" charset="0"/>
+              </a:rPr>
+              <a:t>DemoCmpComponent</a:t>
+            </a:r>
+            <a:r>
+              <a:rPr lang="en-US" dirty="0">
+                <a:solidFill>
+                  <a:srgbClr val="D4D4D4"/>
+                </a:solidFill>
+                <a:latin typeface="Consolas" panose="020B0609020204030204" pitchFamily="49" charset="0"/>
+              </a:rPr>
+              <a:t> } </a:t>
+            </a:r>
+            <a:r>
+              <a:rPr lang="en-US" dirty="0">
+                <a:solidFill>
+                  <a:srgbClr val="C586C0"/>
+                </a:solidFill>
+                <a:latin typeface="Consolas" panose="020B0609020204030204" pitchFamily="49" charset="0"/>
+              </a:rPr>
+              <a:t>from</a:t>
+            </a:r>
+            <a:r>
+              <a:rPr lang="en-US" dirty="0">
+                <a:solidFill>
+                  <a:srgbClr val="D4D4D4"/>
+                </a:solidFill>
+                <a:latin typeface="Consolas" panose="020B0609020204030204" pitchFamily="49" charset="0"/>
+              </a:rPr>
+              <a:t> </a:t>
+            </a:r>
+            <a:r>
+              <a:rPr lang="en-US" dirty="0" smtClean="0">
+                <a:solidFill>
+                  <a:srgbClr val="CE9178"/>
+                </a:solidFill>
+                <a:latin typeface="Consolas" panose="020B0609020204030204" pitchFamily="49" charset="0"/>
+              </a:rPr>
+              <a:t>'./.../file-name'</a:t>
+            </a:r>
+            <a:r>
+              <a:rPr lang="en-US" dirty="0" smtClean="0">
+                <a:solidFill>
+                  <a:srgbClr val="D4D4D4"/>
+                </a:solidFill>
+                <a:latin typeface="Consolas" panose="020B0609020204030204" pitchFamily="49" charset="0"/>
+              </a:rPr>
+              <a:t>;</a:t>
+            </a:r>
+            <a:endParaRPr lang="en-US" dirty="0">
+              <a:solidFill>
+                <a:srgbClr val="D4D4D4"/>
+              </a:solidFill>
+              <a:latin typeface="Consolas" panose="020B0609020204030204" pitchFamily="49" charset="0"/>
+            </a:endParaRPr>
+          </a:p>
+          <a:p>
+            <a:r>
+              <a:rPr lang="en-US" dirty="0" smtClean="0">
+                <a:solidFill>
+                  <a:srgbClr val="D4D4D4"/>
+                </a:solidFill>
+                <a:latin typeface="Consolas" panose="020B0609020204030204" pitchFamily="49" charset="0"/>
+              </a:rPr>
+              <a:t>@</a:t>
+            </a:r>
+            <a:r>
+              <a:rPr lang="en-US" dirty="0" err="1" smtClean="0">
+                <a:solidFill>
+                  <a:srgbClr val="DCDCAA"/>
+                </a:solidFill>
+                <a:latin typeface="Consolas" panose="020B0609020204030204" pitchFamily="49" charset="0"/>
+              </a:rPr>
+              <a:t>NgModule</a:t>
+            </a:r>
+            <a:r>
+              <a:rPr lang="en-US" dirty="0" smtClean="0">
+                <a:solidFill>
+                  <a:srgbClr val="D4D4D4"/>
+                </a:solidFill>
+                <a:latin typeface="Consolas" panose="020B0609020204030204" pitchFamily="49" charset="0"/>
+              </a:rPr>
+              <a:t>({</a:t>
+            </a:r>
+            <a:endParaRPr lang="en-US" dirty="0">
+              <a:solidFill>
+                <a:srgbClr val="D4D4D4"/>
+              </a:solidFill>
+              <a:latin typeface="Consolas" panose="020B0609020204030204" pitchFamily="49" charset="0"/>
+            </a:endParaRPr>
+          </a:p>
+          <a:p>
+            <a:r>
+              <a:rPr lang="en-US" dirty="0" smtClean="0">
+                <a:solidFill>
+                  <a:srgbClr val="9CDCFE"/>
+                </a:solidFill>
+                <a:latin typeface="Consolas" panose="020B0609020204030204" pitchFamily="49" charset="0"/>
+              </a:rPr>
+              <a:t>	declarations</a:t>
+            </a:r>
+            <a:r>
+              <a:rPr lang="en-US" dirty="0">
+                <a:solidFill>
+                  <a:srgbClr val="9CDCFE"/>
+                </a:solidFill>
+                <a:latin typeface="Consolas" panose="020B0609020204030204" pitchFamily="49" charset="0"/>
+              </a:rPr>
+              <a:t>:</a:t>
+            </a:r>
+            <a:r>
+              <a:rPr lang="en-US" dirty="0">
+                <a:solidFill>
+                  <a:srgbClr val="D4D4D4"/>
+                </a:solidFill>
+                <a:latin typeface="Consolas" panose="020B0609020204030204" pitchFamily="49" charset="0"/>
+              </a:rPr>
+              <a:t> [</a:t>
+            </a:r>
+          </a:p>
+          <a:p>
+            <a:r>
+              <a:rPr lang="en-US" dirty="0" smtClean="0">
+                <a:solidFill>
+                  <a:srgbClr val="9CDCFE"/>
+                </a:solidFill>
+                <a:latin typeface="Consolas" panose="020B0609020204030204" pitchFamily="49" charset="0"/>
+              </a:rPr>
+              <a:t>		</a:t>
+            </a:r>
+            <a:r>
+              <a:rPr lang="en-US" dirty="0" err="1" smtClean="0">
+                <a:solidFill>
+                  <a:srgbClr val="9CDCFE"/>
+                </a:solidFill>
+                <a:latin typeface="Consolas" panose="020B0609020204030204" pitchFamily="49" charset="0"/>
+              </a:rPr>
+              <a:t>AppComponent</a:t>
+            </a:r>
+            <a:r>
+              <a:rPr lang="en-US" dirty="0">
+                <a:solidFill>
+                  <a:srgbClr val="D4D4D4"/>
+                </a:solidFill>
+                <a:latin typeface="Consolas" panose="020B0609020204030204" pitchFamily="49" charset="0"/>
+              </a:rPr>
+              <a:t>,</a:t>
+            </a:r>
+          </a:p>
+          <a:p>
+            <a:r>
+              <a:rPr lang="en-US" dirty="0" smtClean="0">
+                <a:solidFill>
+                  <a:srgbClr val="9CDCFE"/>
+                </a:solidFill>
+                <a:latin typeface="Consolas" panose="020B0609020204030204" pitchFamily="49" charset="0"/>
+              </a:rPr>
+              <a:t>		</a:t>
+            </a:r>
+            <a:r>
+              <a:rPr lang="en-US" dirty="0" err="1" smtClean="0">
+                <a:solidFill>
+                  <a:srgbClr val="9CDCFE"/>
+                </a:solidFill>
+                <a:latin typeface="Consolas" panose="020B0609020204030204" pitchFamily="49" charset="0"/>
+              </a:rPr>
+              <a:t>DemoCmpComponent</a:t>
+            </a:r>
+            <a:endParaRPr lang="en-US" dirty="0">
+              <a:solidFill>
+                <a:srgbClr val="D4D4D4"/>
+              </a:solidFill>
+              <a:latin typeface="Consolas" panose="020B0609020204030204" pitchFamily="49" charset="0"/>
+            </a:endParaRPr>
+          </a:p>
+          <a:p>
+            <a:r>
+              <a:rPr lang="en-US" dirty="0" smtClean="0">
+                <a:solidFill>
+                  <a:srgbClr val="D4D4D4"/>
+                </a:solidFill>
+                <a:latin typeface="Consolas" panose="020B0609020204030204" pitchFamily="49" charset="0"/>
+              </a:rPr>
+              <a:t>	],</a:t>
+            </a:r>
+            <a:endParaRPr lang="en-US" dirty="0">
+              <a:solidFill>
+                <a:srgbClr val="D4D4D4"/>
+              </a:solidFill>
+              <a:latin typeface="Consolas" panose="020B0609020204030204" pitchFamily="49" charset="0"/>
+            </a:endParaRPr>
+          </a:p>
+          <a:p>
+            <a:pPr lvl="1"/>
+            <a:r>
+              <a:rPr lang="en-US" dirty="0">
+                <a:solidFill>
+                  <a:srgbClr val="9CDCFE"/>
+                </a:solidFill>
+                <a:latin typeface="Consolas" panose="020B0609020204030204" pitchFamily="49" charset="0"/>
+              </a:rPr>
+              <a:t>imports:</a:t>
+            </a:r>
+            <a:r>
+              <a:rPr lang="en-US" dirty="0">
+                <a:solidFill>
+                  <a:srgbClr val="D4D4D4"/>
+                </a:solidFill>
+                <a:latin typeface="Consolas" panose="020B0609020204030204" pitchFamily="49" charset="0"/>
+              </a:rPr>
+              <a:t> [</a:t>
+            </a:r>
+          </a:p>
+          <a:p>
+            <a:pPr lvl="2"/>
+            <a:r>
+              <a:rPr lang="en-US" dirty="0" err="1">
+                <a:solidFill>
+                  <a:srgbClr val="9CDCFE"/>
+                </a:solidFill>
+                <a:latin typeface="Consolas" panose="020B0609020204030204" pitchFamily="49" charset="0"/>
+              </a:rPr>
+              <a:t>BrowserModule</a:t>
+            </a:r>
+            <a:r>
+              <a:rPr lang="en-US" dirty="0">
+                <a:solidFill>
+                  <a:srgbClr val="D4D4D4"/>
+                </a:solidFill>
+                <a:latin typeface="Consolas" panose="020B0609020204030204" pitchFamily="49" charset="0"/>
+              </a:rPr>
+              <a:t>,</a:t>
+            </a:r>
+          </a:p>
+          <a:p>
+            <a:pPr lvl="2"/>
+            <a:r>
+              <a:rPr lang="en-US" dirty="0" err="1">
+                <a:solidFill>
+                  <a:srgbClr val="9CDCFE"/>
+                </a:solidFill>
+                <a:latin typeface="Consolas" panose="020B0609020204030204" pitchFamily="49" charset="0"/>
+              </a:rPr>
+              <a:t>HttpModule</a:t>
+            </a:r>
+            <a:endParaRPr lang="en-US" dirty="0">
+              <a:solidFill>
+                <a:srgbClr val="D4D4D4"/>
+              </a:solidFill>
+              <a:latin typeface="Consolas" panose="020B0609020204030204" pitchFamily="49" charset="0"/>
+            </a:endParaRPr>
+          </a:p>
+          <a:p>
+            <a:r>
+              <a:rPr lang="en-US" dirty="0" smtClean="0">
+                <a:solidFill>
+                  <a:srgbClr val="D4D4D4"/>
+                </a:solidFill>
+                <a:latin typeface="Consolas" panose="020B0609020204030204" pitchFamily="49" charset="0"/>
+              </a:rPr>
+              <a:t>	],</a:t>
+            </a:r>
+            <a:endParaRPr lang="en-US" dirty="0">
+              <a:solidFill>
+                <a:srgbClr val="D4D4D4"/>
+              </a:solidFill>
+              <a:latin typeface="Consolas" panose="020B0609020204030204" pitchFamily="49" charset="0"/>
+            </a:endParaRPr>
+          </a:p>
+          <a:p>
+            <a:r>
+              <a:rPr lang="en-US" dirty="0" smtClean="0">
+                <a:solidFill>
+                  <a:srgbClr val="9CDCFE"/>
+                </a:solidFill>
+                <a:latin typeface="Consolas" panose="020B0609020204030204" pitchFamily="49" charset="0"/>
+              </a:rPr>
+              <a:t>	providers</a:t>
+            </a:r>
+            <a:r>
+              <a:rPr lang="en-US" dirty="0">
+                <a:solidFill>
+                  <a:srgbClr val="9CDCFE"/>
+                </a:solidFill>
+                <a:latin typeface="Consolas" panose="020B0609020204030204" pitchFamily="49" charset="0"/>
+              </a:rPr>
+              <a:t>:</a:t>
+            </a:r>
+            <a:r>
+              <a:rPr lang="en-US" dirty="0">
+                <a:solidFill>
+                  <a:srgbClr val="D4D4D4"/>
+                </a:solidFill>
+                <a:latin typeface="Consolas" panose="020B0609020204030204" pitchFamily="49" charset="0"/>
+              </a:rPr>
+              <a:t> [],</a:t>
+            </a:r>
+          </a:p>
+          <a:p>
+            <a:r>
+              <a:rPr lang="en-US" dirty="0" smtClean="0">
+                <a:solidFill>
+                  <a:srgbClr val="9CDCFE"/>
+                </a:solidFill>
+                <a:latin typeface="Consolas" panose="020B0609020204030204" pitchFamily="49" charset="0"/>
+              </a:rPr>
+              <a:t>	bootstrap</a:t>
+            </a:r>
+            <a:r>
+              <a:rPr lang="en-US" dirty="0">
+                <a:solidFill>
+                  <a:srgbClr val="9CDCFE"/>
+                </a:solidFill>
+                <a:latin typeface="Consolas" panose="020B0609020204030204" pitchFamily="49" charset="0"/>
+              </a:rPr>
+              <a:t>:</a:t>
+            </a:r>
+            <a:r>
+              <a:rPr lang="en-US" dirty="0">
+                <a:solidFill>
+                  <a:srgbClr val="D4D4D4"/>
+                </a:solidFill>
+                <a:latin typeface="Consolas" panose="020B0609020204030204" pitchFamily="49" charset="0"/>
+              </a:rPr>
+              <a:t> </a:t>
+            </a:r>
+            <a:r>
+              <a:rPr lang="en-US" dirty="0" smtClean="0">
+                <a:solidFill>
+                  <a:srgbClr val="D4D4D4"/>
+                </a:solidFill>
+                <a:latin typeface="Consolas" panose="020B0609020204030204" pitchFamily="49" charset="0"/>
+              </a:rPr>
+              <a:t>	[</a:t>
+            </a:r>
+            <a:r>
+              <a:rPr lang="en-US" dirty="0" err="1">
+                <a:solidFill>
+                  <a:srgbClr val="9CDCFE"/>
+                </a:solidFill>
+                <a:latin typeface="Consolas" panose="020B0609020204030204" pitchFamily="49" charset="0"/>
+              </a:rPr>
+              <a:t>AppComponent</a:t>
+            </a:r>
+            <a:r>
+              <a:rPr lang="en-US" dirty="0">
+                <a:solidFill>
+                  <a:srgbClr val="D4D4D4"/>
+                </a:solidFill>
+                <a:latin typeface="Consolas" panose="020B0609020204030204" pitchFamily="49" charset="0"/>
+              </a:rPr>
+              <a:t>]</a:t>
+            </a:r>
+          </a:p>
+          <a:p>
+            <a:r>
+              <a:rPr lang="en-US" dirty="0">
+                <a:solidFill>
+                  <a:srgbClr val="D4D4D4"/>
+                </a:solidFill>
+                <a:latin typeface="Consolas" panose="020B0609020204030204" pitchFamily="49" charset="0"/>
+              </a:rPr>
+              <a:t>})</a:t>
+            </a:r>
+          </a:p>
+          <a:p>
+            <a:r>
+              <a:rPr lang="en-US" dirty="0">
+                <a:solidFill>
+                  <a:srgbClr val="C586C0"/>
+                </a:solidFill>
+                <a:latin typeface="Consolas" panose="020B0609020204030204" pitchFamily="49" charset="0"/>
+              </a:rPr>
+              <a:t>export</a:t>
+            </a:r>
+            <a:r>
+              <a:rPr lang="en-US" dirty="0">
+                <a:solidFill>
+                  <a:srgbClr val="D4D4D4"/>
+                </a:solidFill>
+                <a:latin typeface="Consolas" panose="020B0609020204030204" pitchFamily="49" charset="0"/>
+              </a:rPr>
+              <a:t> </a:t>
+            </a:r>
+            <a:r>
+              <a:rPr lang="en-US" dirty="0">
+                <a:solidFill>
+                  <a:srgbClr val="569CD6"/>
+                </a:solidFill>
+                <a:latin typeface="Consolas" panose="020B0609020204030204" pitchFamily="49" charset="0"/>
+              </a:rPr>
+              <a:t>class</a:t>
+            </a:r>
+            <a:r>
+              <a:rPr lang="en-US" dirty="0">
+                <a:solidFill>
+                  <a:srgbClr val="D4D4D4"/>
+                </a:solidFill>
+                <a:latin typeface="Consolas" panose="020B0609020204030204" pitchFamily="49" charset="0"/>
+              </a:rPr>
+              <a:t> </a:t>
+            </a:r>
+            <a:r>
+              <a:rPr lang="en-US" dirty="0" err="1">
+                <a:solidFill>
+                  <a:srgbClr val="4EC9B0"/>
+                </a:solidFill>
+                <a:latin typeface="Consolas" panose="020B0609020204030204" pitchFamily="49" charset="0"/>
+              </a:rPr>
+              <a:t>AppModule</a:t>
+            </a:r>
+            <a:r>
+              <a:rPr lang="en-US" dirty="0">
+                <a:solidFill>
+                  <a:srgbClr val="D4D4D4"/>
+                </a:solidFill>
+                <a:latin typeface="Consolas" panose="020B0609020204030204" pitchFamily="49" charset="0"/>
+              </a:rPr>
+              <a:t> { }</a:t>
+            </a:r>
+          </a:p>
+          <a:p>
+            <a:endParaRPr lang="en-US" dirty="0"/>
+          </a:p>
+        </p:txBody>
+      </p:sp>
+    </p:spTree>
+    <p:extLst>
+      <p:ext uri="{BB962C8B-B14F-4D97-AF65-F5344CB8AC3E}">
+        <p14:creationId xmlns:p14="http://schemas.microsoft.com/office/powerpoint/2010/main" val="183954859"/>
+      </p:ext>
+    </p:extLst>
+  </p:cSld>
+  <p:clrMapOvr>
+    <a:masterClrMapping/>
+  </p:clrMapOvr>
+  <p:timing>
+    <p:tnLst>
+      <p:par>
+        <p:cTn id="1" dur="indefinite" restart="never" nodeType="tmRoot"/>
+      </p:par>
+    </p:tnLst>
+  </p:timing>
+</p:sld>
+</file>
+
+<file path=ppt/slides/slide11.xml><?xml version="1.0" encoding="utf-8"?>
+<p:sld xmlns:a="http://schemas.openxmlformats.org/drawingml/2006/main" xmlns:r="http://schemas.openxmlformats.org/officeDocument/2006/relationships" xmlns:p="http://schemas.openxmlformats.org/presentationml/2006/main">
+  <p:cSld>
+    <p:spTree>
+      <p:nvGrpSpPr>
+        <p:cNvPr id="1" name=""/>
+        <p:cNvGrpSpPr/>
+        <p:nvPr/>
+      </p:nvGrpSpPr>
+      <p:grpSpPr>
+        <a:xfrm>
+          <a:off x="0" y="0"/>
+          <a:ext cx="0" cy="0"/>
+          <a:chOff x="0" y="0"/>
+          <a:chExt cx="0" cy="0"/>
+        </a:xfrm>
+      </p:grpSpPr>
+      <p:sp>
+        <p:nvSpPr>
+          <p:cNvPr id="2" name="Title 1"/>
+          <p:cNvSpPr>
+            <a:spLocks noGrp="1"/>
+          </p:cNvSpPr>
+          <p:nvPr>
+            <p:ph type="title"/>
+          </p:nvPr>
+        </p:nvSpPr>
+        <p:spPr/>
+        <p:txBody>
+          <a:bodyPr/>
+          <a:lstStyle/>
+          <a:p>
+            <a:r>
+              <a:rPr lang="en-US" dirty="0" smtClean="0"/>
+              <a:t>Further reading</a:t>
+            </a:r>
+            <a:endParaRPr lang="en-US" dirty="0"/>
+          </a:p>
+        </p:txBody>
+      </p:sp>
+      <p:sp>
+        <p:nvSpPr>
+          <p:cNvPr id="3" name="Content Placeholder 2"/>
+          <p:cNvSpPr>
+            <a:spLocks noGrp="1"/>
+          </p:cNvSpPr>
+          <p:nvPr>
+            <p:ph idx="1"/>
+          </p:nvPr>
+        </p:nvSpPr>
+        <p:spPr/>
+        <p:txBody>
+          <a:bodyPr>
+            <a:normAutofit fontScale="92500" lnSpcReduction="10000"/>
+          </a:bodyPr>
+          <a:lstStyle/>
+          <a:p>
+            <a:r>
+              <a:rPr lang="en-US" dirty="0"/>
+              <a:t>Official documentation: https://angular.io/docs</a:t>
+            </a:r>
+          </a:p>
+          <a:p>
+            <a:r>
+              <a:rPr lang="en-US" dirty="0"/>
+              <a:t>Official Angular2+ tutorial: </a:t>
+            </a:r>
+            <a:r>
+              <a:rPr lang="en-US" dirty="0">
+                <a:hlinkClick r:id="rId2"/>
+              </a:rPr>
+              <a:t>https://angular.io/tutorial</a:t>
+            </a:r>
+            <a:endParaRPr lang="en-US" dirty="0"/>
+          </a:p>
+          <a:p>
+            <a:r>
+              <a:rPr lang="en-US" dirty="0"/>
+              <a:t>Angular cheat sheet: </a:t>
+            </a:r>
+            <a:r>
+              <a:rPr lang="en-US" dirty="0">
+                <a:hlinkClick r:id="rId3"/>
+              </a:rPr>
+              <a:t>https://angular.io/guide/cheatsheet</a:t>
+            </a:r>
+            <a:endParaRPr lang="en-US" dirty="0"/>
+          </a:p>
+          <a:p>
+            <a:r>
+              <a:rPr lang="en-US" dirty="0" smtClean="0"/>
+              <a:t>Visual </a:t>
+            </a:r>
+            <a:r>
+              <a:rPr lang="en-US" dirty="0" err="1" smtClean="0"/>
+              <a:t>RxJS</a:t>
+            </a:r>
+            <a:r>
+              <a:rPr lang="en-US" dirty="0" smtClean="0"/>
+              <a:t> streams: </a:t>
+            </a:r>
+            <a:r>
+              <a:rPr lang="en-US" dirty="0" smtClean="0">
+                <a:hlinkClick r:id="rId4"/>
+              </a:rPr>
+              <a:t>http://rxmarbles.com</a:t>
+            </a:r>
+            <a:endParaRPr lang="en-US" dirty="0" smtClean="0"/>
+          </a:p>
+          <a:p>
+            <a:r>
+              <a:rPr lang="en-US" dirty="0" err="1" smtClean="0"/>
+              <a:t>RxJS</a:t>
+            </a:r>
+            <a:r>
+              <a:rPr lang="en-US" dirty="0" smtClean="0"/>
+              <a:t> </a:t>
+            </a:r>
+            <a:r>
+              <a:rPr lang="en-US" dirty="0"/>
+              <a:t>manual: </a:t>
+            </a:r>
+            <a:r>
+              <a:rPr lang="en-US" dirty="0">
+                <a:hlinkClick r:id="rId5"/>
+              </a:rPr>
+              <a:t>http://</a:t>
+            </a:r>
+            <a:r>
+              <a:rPr lang="en-US" dirty="0" smtClean="0">
+                <a:hlinkClick r:id="rId5"/>
+              </a:rPr>
+              <a:t>reactivex.io/rxjs/manual/index.html</a:t>
+            </a:r>
+            <a:endParaRPr lang="en-US" dirty="0" smtClean="0"/>
+          </a:p>
+          <a:p>
+            <a:r>
+              <a:rPr lang="en-US" dirty="0" smtClean="0"/>
+              <a:t>Getting </a:t>
+            </a:r>
+            <a:r>
+              <a:rPr lang="en-US" dirty="0"/>
+              <a:t>acquainted with Angular CLI: </a:t>
+            </a:r>
+            <a:r>
+              <a:rPr lang="en-US" dirty="0">
+                <a:hlinkClick r:id="rId6"/>
+              </a:rPr>
+              <a:t>https://github.com/angular/angular-cli</a:t>
+            </a:r>
+            <a:endParaRPr lang="en-US" dirty="0"/>
+          </a:p>
+          <a:p>
+            <a:r>
+              <a:rPr lang="en-US" dirty="0" smtClean="0"/>
+              <a:t>Angular </a:t>
+            </a:r>
+            <a:r>
+              <a:rPr lang="en-US" dirty="0"/>
+              <a:t>in plain JavaScript: </a:t>
+            </a:r>
+            <a:r>
+              <a:rPr lang="en-US" dirty="0">
+                <a:hlinkClick r:id="rId7"/>
+              </a:rPr>
+              <a:t>https://daveceddia.com/angular-2-in-plain-js</a:t>
+            </a:r>
+            <a:endParaRPr lang="en-US" dirty="0"/>
+          </a:p>
+          <a:p>
+            <a:r>
+              <a:rPr lang="en-US" dirty="0" smtClean="0"/>
+              <a:t>About </a:t>
+            </a:r>
+            <a:r>
+              <a:rPr lang="en-US" dirty="0"/>
+              <a:t>change detection: </a:t>
+            </a:r>
+            <a:r>
+              <a:rPr lang="en-US" dirty="0">
+                <a:hlinkClick r:id="rId8"/>
+              </a:rPr>
+              <a:t>https://</a:t>
+            </a:r>
+            <a:r>
+              <a:rPr lang="en-US" dirty="0" smtClean="0">
+                <a:hlinkClick r:id="rId8"/>
+              </a:rPr>
+              <a:t>blog.thoughtram.io/angular/2016/02/22/angular-2-change-detection-explained.html</a:t>
+            </a:r>
+            <a:endParaRPr lang="en-US" dirty="0" smtClean="0"/>
+          </a:p>
+          <a:p>
+            <a:r>
+              <a:rPr lang="en-US" dirty="0" smtClean="0"/>
+              <a:t>About </a:t>
+            </a:r>
+            <a:r>
+              <a:rPr lang="en-US" dirty="0" err="1" smtClean="0"/>
+              <a:t>ZoneJS</a:t>
+            </a:r>
+            <a:r>
+              <a:rPr lang="en-US" dirty="0"/>
+              <a:t>: </a:t>
+            </a:r>
+            <a:r>
+              <a:rPr lang="en-US" dirty="0">
+                <a:hlinkClick r:id="rId9"/>
+              </a:rPr>
+              <a:t>https://</a:t>
+            </a:r>
+            <a:r>
+              <a:rPr lang="en-US" dirty="0" smtClean="0">
+                <a:hlinkClick r:id="rId9"/>
+              </a:rPr>
+              <a:t>github.com/angular/zone.js</a:t>
+            </a:r>
+            <a:endParaRPr lang="en-US" dirty="0" smtClean="0"/>
+          </a:p>
+          <a:p>
+            <a:endParaRPr lang="en-US" dirty="0"/>
+          </a:p>
+        </p:txBody>
+      </p:sp>
+    </p:spTree>
+    <p:extLst>
+      <p:ext uri="{BB962C8B-B14F-4D97-AF65-F5344CB8AC3E}">
+        <p14:creationId xmlns:p14="http://schemas.microsoft.com/office/powerpoint/2010/main" val="3751561803"/>
+      </p:ext>
+    </p:extLst>
+  </p:cSld>
+  <p:clrMapOvr>
+    <a:masterClrMapping/>
+  </p:clrMapOvr>
+  <p:timing>
+    <p:tnLst>
+      <p:par>
+        <p:cTn id="1" dur="indefinite" restart="never" nodeType="tmRoot"/>
+      </p:par>
+    </p:tnLst>
+  </p:timing>
+</p:sld>
+</file>
+
 <file path=ppt/slides/slide2.xml><?xml version="1.0" encoding="utf-8"?>
 <p:sld xmlns:a="http://schemas.openxmlformats.org/drawingml/2006/main" xmlns:r="http://schemas.openxmlformats.org/officeDocument/2006/relationships" xmlns:p="http://schemas.openxmlformats.org/presentationml/2006/main">
   <p:cSld>
@@ -18304,7 +19948,7 @@
           <a:p>
             <a:r>
               <a:rPr lang="en-US" dirty="0" smtClean="0"/>
-              <a:t>Component</a:t>
+              <a:t>Module</a:t>
             </a:r>
             <a:endParaRPr lang="en-US" dirty="0"/>
           </a:p>
@@ -18319,7 +19963,7 @@
         <p:spPr>
           <a:xfrm>
             <a:off x="1385456" y="1644073"/>
-            <a:ext cx="8876144" cy="4247317"/>
+            <a:ext cx="10119156" cy="2308324"/>
           </a:xfrm>
           <a:prstGeom prst="rect">
             <a:avLst/>
@@ -18341,7 +19985,7 @@
                 </a:solidFill>
                 <a:latin typeface="Consolas" panose="020B0609020204030204" pitchFamily="49" charset="0"/>
               </a:rPr>
-              <a:t>export</a:t>
+              <a:t>import</a:t>
             </a:r>
             <a:r>
               <a:rPr lang="en-US" dirty="0">
@@ -18359,7 +20003,7 @@
                 </a:solidFill>
                 <a:latin typeface="Consolas" panose="020B0609020204030204" pitchFamily="49" charset="0"/>
               </a:rPr>
-              <a:t>class</a:t>
+              <a:t>*</a:t>
             </a:r>
             <a:r>
               <a:rPr lang="en-US" dirty="0">
@@ -18371,9 +20015,101 @@
               <a:t> </a:t>
             </a:r>
             <a:r>
+              <a:rPr lang="en-US" dirty="0">
+                <a:solidFill>
+                  <a:srgbClr val="C586C0"/>
+                </a:solidFill>
+                <a:latin typeface="Consolas" panose="020B0609020204030204" pitchFamily="49" charset="0"/>
+              </a:rPr>
+              <a:t>as</a:t>
+            </a:r>
+            <a:r>
+              <a:rPr lang="en-US" dirty="0">
+                <a:solidFill>
+                  <a:srgbClr val="D4D4D4"/>
+                </a:solidFill>
+                <a:latin typeface="Consolas" panose="020B0609020204030204" pitchFamily="49" charset="0"/>
+              </a:rPr>
+              <a:t> </a:t>
+            </a:r>
+            <a:r>
+              <a:rPr lang="en-US" dirty="0">
+                <a:solidFill>
+                  <a:srgbClr val="9CDCFE"/>
+                </a:solidFill>
+                <a:latin typeface="Consolas" panose="020B0609020204030204" pitchFamily="49" charset="0"/>
+              </a:rPr>
+              <a:t>ng</a:t>
+            </a:r>
+            <a:r>
+              <a:rPr lang="en-US" dirty="0">
+                <a:solidFill>
+                  <a:srgbClr val="D4D4D4"/>
+                </a:solidFill>
+                <a:latin typeface="Consolas" panose="020B0609020204030204" pitchFamily="49" charset="0"/>
+              </a:rPr>
+              <a:t> </a:t>
+            </a:r>
+            <a:r>
+              <a:rPr lang="en-US" dirty="0">
+                <a:solidFill>
+                  <a:srgbClr val="C586C0"/>
+                </a:solidFill>
+                <a:latin typeface="Consolas" panose="020B0609020204030204" pitchFamily="49" charset="0"/>
+              </a:rPr>
+              <a:t>from</a:t>
+            </a:r>
+            <a:r>
+              <a:rPr lang="en-US" dirty="0">
+                <a:solidFill>
+                  <a:srgbClr val="D4D4D4"/>
+                </a:solidFill>
+                <a:latin typeface="Consolas" panose="020B0609020204030204" pitchFamily="49" charset="0"/>
+              </a:rPr>
+              <a:t> </a:t>
+            </a:r>
+            <a:r>
+              <a:rPr lang="en-US" dirty="0">
+                <a:solidFill>
+                  <a:srgbClr val="CE9178"/>
+                </a:solidFill>
+                <a:latin typeface="Consolas" panose="020B0609020204030204" pitchFamily="49" charset="0"/>
+              </a:rPr>
+              <a:t>'angular'</a:t>
+            </a:r>
+            <a:r>
+              <a:rPr lang="en-US" dirty="0">
+                <a:solidFill>
+                  <a:srgbClr val="D4D4D4"/>
+                </a:solidFill>
+                <a:latin typeface="Consolas" panose="020B0609020204030204" pitchFamily="49" charset="0"/>
+              </a:rPr>
+              <a:t>;</a:t>
+            </a:r>
+          </a:p>
+          <a:p>
+            <a:r>
+              <a:rPr lang="en-US" dirty="0">
+                <a:solidFill>
+                  <a:srgbClr val="C586C0"/>
+                </a:solidFill>
+                <a:latin typeface="Consolas" panose="020B0609020204030204" pitchFamily="49" charset="0"/>
+              </a:rPr>
+              <a:t>import</a:t>
+            </a:r>
+            <a:r>
+              <a:rPr lang="en-US" dirty="0">
+                <a:solidFill>
+                  <a:srgbClr val="D4D4D4"/>
+                </a:solidFill>
+                <a:latin typeface="Consolas" panose="020B0609020204030204" pitchFamily="49" charset="0"/>
+              </a:rPr>
+              <a:t> { </a:t>
+            </a:r>
+            <a:r>
               <a:rPr lang="en-US" dirty="0" err="1">
                 <a:solidFill>
-                  <a:srgbClr val="4EC9B0"/>
+                  <a:srgbClr val="9CDCFE"/>
                 </a:solidFill>
                 <a:latin typeface="Consolas" panose="020B0609020204030204" pitchFamily="49" charset="0"/>
               </a:rPr>
@@ -18391,11 +20127,11 @@
             <a:r>
               <a:rPr lang="en-US" dirty="0">
                 <a:solidFill>
-                  <a:srgbClr val="569CD6"/>
-                </a:solidFill>
-                <a:latin typeface="Consolas" panose="020B0609020204030204" pitchFamily="49" charset="0"/>
-              </a:rPr>
-              <a:t>implements</a:t>
+                  <a:srgbClr val="C586C0"/>
+                </a:solidFill>
+                <a:latin typeface="Consolas" panose="020B0609020204030204" pitchFamily="49" charset="0"/>
+              </a:rPr>
+              <a:t>as</a:t>
             </a:r>
             <a:r>
               <a:rPr lang="en-US" dirty="0">
@@ -18409,87 +20145,95 @@
             <a:r>
               <a:rPr lang="en-US" dirty="0" err="1">
                 <a:solidFill>
-                  <a:srgbClr val="4EC9B0"/>
-                </a:solidFill>
-                <a:latin typeface="Consolas" panose="020B0609020204030204" pitchFamily="49" charset="0"/>
-              </a:rPr>
-              <a:t>ng</a:t>
+                  <a:srgbClr val="9CDCFE"/>
+                </a:solidFill>
+                <a:latin typeface="Consolas" panose="020B0609020204030204" pitchFamily="49" charset="0"/>
+              </a:rPr>
+              <a:t>OldDemoCmpComponent</a:t>
+            </a:r>
+            <a:r>
+              <a:rPr lang="en-US" dirty="0">
+                <a:solidFill>
+                  <a:srgbClr val="D4D4D4"/>
+                </a:solidFill>
+                <a:latin typeface="Consolas" panose="020B0609020204030204" pitchFamily="49" charset="0"/>
+              </a:rPr>
+              <a:t> } </a:t>
+            </a:r>
+            <a:r>
+              <a:rPr lang="en-US" dirty="0">
+                <a:solidFill>
+                  <a:srgbClr val="C586C0"/>
+                </a:solidFill>
+                <a:latin typeface="Consolas" panose="020B0609020204030204" pitchFamily="49" charset="0"/>
+              </a:rPr>
+              <a:t>from</a:t>
+            </a:r>
+            <a:r>
+              <a:rPr lang="en-US" dirty="0">
+                <a:solidFill>
+                  <a:srgbClr val="D4D4D4"/>
+                </a:solidFill>
+                <a:latin typeface="Consolas" panose="020B0609020204030204" pitchFamily="49" charset="0"/>
+              </a:rPr>
+              <a:t> </a:t>
+            </a:r>
+            <a:r>
+              <a:rPr lang="en-US" dirty="0">
+                <a:solidFill>
+                  <a:srgbClr val="CE9178"/>
+                </a:solidFill>
+                <a:latin typeface="Consolas" panose="020B0609020204030204" pitchFamily="49" charset="0"/>
+              </a:rPr>
+              <a:t>'./demo-</a:t>
             </a:r>
             <a:r>
               <a:rPr lang="en-US" dirty="0" err="1">
                 <a:solidFill>
+                  <a:srgbClr val="CE9178"/>
+                </a:solidFill>
+                <a:latin typeface="Consolas" panose="020B0609020204030204" pitchFamily="49" charset="0"/>
+              </a:rPr>
+              <a:t>cmp</a:t>
+            </a:r>
+            <a:r>
+              <a:rPr lang="en-US" dirty="0">
+                <a:solidFill>
+                  <a:srgbClr val="CE9178"/>
+                </a:solidFill>
+                <a:latin typeface="Consolas" panose="020B0609020204030204" pitchFamily="49" charset="0"/>
+              </a:rPr>
+              <a:t>/old/demo-</a:t>
+            </a:r>
+            <a:r>
+              <a:rPr lang="en-US" dirty="0" err="1">
+                <a:solidFill>
+                  <a:srgbClr val="CE9178"/>
+                </a:solidFill>
+                <a:latin typeface="Consolas" panose="020B0609020204030204" pitchFamily="49" charset="0"/>
+              </a:rPr>
+              <a:t>cmp.component</a:t>
+            </a:r>
+            <a:r>
+              <a:rPr lang="en-US" dirty="0" smtClean="0">
+                <a:solidFill>
+                  <a:srgbClr val="CE9178"/>
+                </a:solidFill>
+                <a:latin typeface="Consolas" panose="020B0609020204030204" pitchFamily="49" charset="0"/>
+              </a:rPr>
+              <a:t>'</a:t>
+            </a:r>
+            <a:r>
+              <a:rPr lang="en-US" dirty="0" smtClean="0">
+                <a:solidFill>
                   <a:srgbClr val="D4D4D4"/>
                 </a:solidFill>
                 <a:latin typeface="Consolas" panose="020B0609020204030204" pitchFamily="49" charset="0"/>
               </a:rPr>
-              <a:t>.</a:t>
-            </a:r>
-            <a:r>
-              <a:rPr lang="en-US" dirty="0" err="1">
-                <a:solidFill>
-                  <a:srgbClr val="4EC9B0"/>
-                </a:solidFill>
-                <a:latin typeface="Consolas" panose="020B0609020204030204" pitchFamily="49" charset="0"/>
-              </a:rPr>
-              <a:t>IComponentOptions</a:t>
-            </a:r>
-            <a:r>
-              <a:rPr lang="en-US" dirty="0">
-                <a:solidFill>
-                  <a:srgbClr val="D4D4D4"/>
-                </a:solidFill>
-                <a:latin typeface="Consolas" panose="020B0609020204030204" pitchFamily="49" charset="0"/>
-              </a:rPr>
-              <a:t> {</a:t>
-            </a:r>
-          </a:p>
-          <a:p>
-            <a:pPr lvl="1"/>
-            <a:r>
-              <a:rPr lang="en-US" dirty="0">
-                <a:solidFill>
-                  <a:srgbClr val="9CDCFE"/>
-                </a:solidFill>
-                <a:latin typeface="Consolas" panose="020B0609020204030204" pitchFamily="49" charset="0"/>
-              </a:rPr>
-              <a:t>template</a:t>
-            </a:r>
-            <a:r>
-              <a:rPr lang="en-US" dirty="0">
-                <a:solidFill>
-                  <a:srgbClr val="D4D4D4"/>
-                </a:solidFill>
-                <a:latin typeface="Consolas" panose="020B0609020204030204" pitchFamily="49" charset="0"/>
-              </a:rPr>
-              <a:t> = </a:t>
-            </a:r>
-            <a:r>
-              <a:rPr lang="en-US" dirty="0">
-                <a:solidFill>
-                  <a:srgbClr val="CE9178"/>
-                </a:solidFill>
-                <a:latin typeface="Consolas" panose="020B0609020204030204" pitchFamily="49" charset="0"/>
-              </a:rPr>
-              <a:t>'</a:t>
-            </a:r>
-            <a:r>
-              <a:rPr lang="en-US" dirty="0" smtClean="0">
-                <a:solidFill>
-                  <a:srgbClr val="CE9178"/>
-                </a:solidFill>
-                <a:latin typeface="Consolas" panose="020B0609020204030204" pitchFamily="49" charset="0"/>
-              </a:rPr>
-              <a:t>...'</a:t>
-            </a:r>
-            <a:r>
-              <a:rPr lang="en-US" dirty="0" smtClean="0">
-                <a:solidFill>
-                  <a:srgbClr val="D4D4D4"/>
-                </a:solidFill>
-                <a:latin typeface="Consolas" panose="020B0609020204030204" pitchFamily="49" charset="0"/>
-              </a:rPr>
               <a:t>;</a:t>
             </a:r>
+          </a:p>
+          <a:p>
             <a:endParaRPr lang="en-US" dirty="0">
               <a:solidFill>
                 <a:srgbClr val="D4D4D4"/>
@@ -18498,15 +20242,141 @@
             </a:endParaRPr>
           </a:p>
           <a:p>
-            <a:pPr lvl="1"/>
+            <a:r>
+              <a:rPr lang="en-US" dirty="0" err="1">
+                <a:solidFill>
+                  <a:srgbClr val="9CDCFE"/>
+                </a:solidFill>
+                <a:latin typeface="Consolas" panose="020B0609020204030204" pitchFamily="49" charset="0"/>
+              </a:rPr>
+              <a:t>ng</a:t>
+            </a:r>
+            <a:r>
+              <a:rPr lang="en-US" dirty="0" err="1">
+                <a:solidFill>
+                  <a:srgbClr val="D4D4D4"/>
+                </a:solidFill>
+                <a:latin typeface="Consolas" panose="020B0609020204030204" pitchFamily="49" charset="0"/>
+              </a:rPr>
+              <a:t>.</a:t>
+            </a:r>
+            <a:r>
+              <a:rPr lang="en-US" dirty="0" err="1">
+                <a:solidFill>
+                  <a:srgbClr val="DCDCAA"/>
+                </a:solidFill>
+                <a:latin typeface="Consolas" panose="020B0609020204030204" pitchFamily="49" charset="0"/>
+              </a:rPr>
+              <a:t>module</a:t>
+            </a:r>
             <a:r>
               <a:rPr lang="en-US" dirty="0">
                 <a:solidFill>
+                  <a:srgbClr val="D4D4D4"/>
+                </a:solidFill>
+                <a:latin typeface="Consolas" panose="020B0609020204030204" pitchFamily="49" charset="0"/>
+              </a:rPr>
+              <a:t>(</a:t>
+            </a:r>
+            <a:r>
+              <a:rPr lang="en-US" dirty="0">
+                <a:solidFill>
+                  <a:srgbClr val="CE9178"/>
+                </a:solidFill>
+                <a:latin typeface="Consolas" panose="020B0609020204030204" pitchFamily="49" charset="0"/>
+              </a:rPr>
+              <a:t>'</a:t>
+            </a:r>
+            <a:r>
+              <a:rPr lang="en-US" dirty="0" err="1">
+                <a:solidFill>
+                  <a:srgbClr val="CE9178"/>
+                </a:solidFill>
+                <a:latin typeface="Consolas" panose="020B0609020204030204" pitchFamily="49" charset="0"/>
+              </a:rPr>
+              <a:t>MyApp</a:t>
+            </a:r>
+            <a:r>
+              <a:rPr lang="en-US" dirty="0">
+                <a:solidFill>
+                  <a:srgbClr val="CE9178"/>
+                </a:solidFill>
+                <a:latin typeface="Consolas" panose="020B0609020204030204" pitchFamily="49" charset="0"/>
+              </a:rPr>
+              <a:t>'</a:t>
+            </a:r>
+            <a:r>
+              <a:rPr lang="en-US" dirty="0">
+                <a:solidFill>
+                  <a:srgbClr val="D4D4D4"/>
+                </a:solidFill>
+                <a:latin typeface="Consolas" panose="020B0609020204030204" pitchFamily="49" charset="0"/>
+              </a:rPr>
+              <a:t>, [</a:t>
+            </a:r>
+            <a:r>
+              <a:rPr lang="en-US" dirty="0">
+                <a:solidFill>
+                  <a:srgbClr val="CE9178"/>
+                </a:solidFill>
+                <a:latin typeface="Consolas" panose="020B0609020204030204" pitchFamily="49" charset="0"/>
+              </a:rPr>
+              <a:t>'demo'</a:t>
+            </a:r>
+            <a:r>
+              <a:rPr lang="en-US" dirty="0">
+                <a:solidFill>
+                  <a:srgbClr val="D4D4D4"/>
+                </a:solidFill>
+                <a:latin typeface="Consolas" panose="020B0609020204030204" pitchFamily="49" charset="0"/>
+              </a:rPr>
+              <a:t>]);</a:t>
+            </a:r>
+          </a:p>
+          <a:p>
+            <a:r>
+              <a:rPr lang="en-US" dirty="0">
+                <a:solidFill>
+                  <a:srgbClr val="D4D4D4"/>
+                </a:solidFill>
+                <a:latin typeface="Consolas" panose="020B0609020204030204" pitchFamily="49" charset="0"/>
+              </a:rPr>
+              <a:t/>
+            </a:r>
+            <a:br>
+              <a:rPr lang="en-US" dirty="0">
+                <a:solidFill>
+                  <a:srgbClr val="D4D4D4"/>
+                </a:solidFill>
+                <a:latin typeface="Consolas" panose="020B0609020204030204" pitchFamily="49" charset="0"/>
+              </a:rPr>
+            </a:br>
+            <a:r>
+              <a:rPr lang="en-US" dirty="0" err="1" smtClean="0">
+                <a:solidFill>
                   <a:srgbClr val="9CDCFE"/>
                 </a:solidFill>
                 <a:latin typeface="Consolas" panose="020B0609020204030204" pitchFamily="49" charset="0"/>
               </a:rPr>
-              <a:t>controller</a:t>
+              <a:t>ng</a:t>
+            </a:r>
+            <a:r>
+              <a:rPr lang="en-US" dirty="0" err="1" smtClean="0">
+                <a:solidFill>
+                  <a:srgbClr val="D4D4D4"/>
+                </a:solidFill>
+                <a:latin typeface="Consolas" panose="020B0609020204030204" pitchFamily="49" charset="0"/>
+              </a:rPr>
+              <a:t>.</a:t>
+            </a:r>
+            <a:r>
+              <a:rPr lang="en-US" dirty="0" err="1" smtClean="0">
+                <a:solidFill>
+                  <a:srgbClr val="DCDCAA"/>
+                </a:solidFill>
+                <a:latin typeface="Consolas" panose="020B0609020204030204" pitchFamily="49" charset="0"/>
+              </a:rPr>
+              <a:t>module</a:t>
             </a:r>
             <a:r>
               <a:rPr lang="en-US" dirty="0">
@@ -18515,37 +20385,115 @@
                 </a:solidFill>
                 <a:latin typeface="Consolas" panose="020B0609020204030204" pitchFamily="49" charset="0"/>
               </a:rPr>
-              <a:t> = </a:t>
+              <a:t>(</a:t>
+            </a:r>
+            <a:r>
+              <a:rPr lang="en-US" dirty="0">
+                <a:solidFill>
+                  <a:srgbClr val="CE9178"/>
+                </a:solidFill>
+                <a:latin typeface="Consolas" panose="020B0609020204030204" pitchFamily="49" charset="0"/>
+              </a:rPr>
+              <a:t>'demo'</a:t>
+            </a:r>
+            <a:r>
+              <a:rPr lang="en-US" dirty="0">
+                <a:solidFill>
+                  <a:srgbClr val="D4D4D4"/>
+                </a:solidFill>
+                <a:latin typeface="Consolas" panose="020B0609020204030204" pitchFamily="49" charset="0"/>
+              </a:rPr>
+              <a:t>, </a:t>
+            </a:r>
+            <a:r>
+              <a:rPr lang="en-US" dirty="0" smtClean="0">
+                <a:solidFill>
+                  <a:srgbClr val="D4D4D4"/>
+                </a:solidFill>
+                <a:latin typeface="Consolas" panose="020B0609020204030204" pitchFamily="49" charset="0"/>
+              </a:rPr>
+              <a:t>[]).</a:t>
+            </a:r>
+            <a:r>
+              <a:rPr lang="en-US" dirty="0">
+                <a:solidFill>
+                  <a:srgbClr val="DCDCAA"/>
+                </a:solidFill>
+                <a:latin typeface="Consolas" panose="020B0609020204030204" pitchFamily="49" charset="0"/>
+              </a:rPr>
+              <a:t>component</a:t>
+            </a:r>
+            <a:r>
+              <a:rPr lang="en-US" dirty="0">
+                <a:solidFill>
+                  <a:srgbClr val="D4D4D4"/>
+                </a:solidFill>
+                <a:latin typeface="Consolas" panose="020B0609020204030204" pitchFamily="49" charset="0"/>
+              </a:rPr>
+              <a:t>(</a:t>
+            </a:r>
+            <a:r>
+              <a:rPr lang="en-US" dirty="0">
+                <a:solidFill>
+                  <a:srgbClr val="CE9178"/>
+                </a:solidFill>
+                <a:latin typeface="Consolas" panose="020B0609020204030204" pitchFamily="49" charset="0"/>
+              </a:rPr>
+              <a:t>'</a:t>
             </a:r>
             <a:r>
               <a:rPr lang="en-US" dirty="0" err="1">
                 <a:solidFill>
-                  <a:srgbClr val="9CDCFE"/>
-                </a:solidFill>
-                <a:latin typeface="Consolas" panose="020B0609020204030204" pitchFamily="49" charset="0"/>
-              </a:rPr>
-              <a:t>DemoCmpController</a:t>
+                  <a:srgbClr val="CE9178"/>
+                </a:solidFill>
+                <a:latin typeface="Consolas" panose="020B0609020204030204" pitchFamily="49" charset="0"/>
+              </a:rPr>
+              <a:t>demoCmpOld</a:t>
             </a:r>
             <a:r>
               <a:rPr lang="en-US" dirty="0">
                 <a:solidFill>
+                  <a:srgbClr val="CE9178"/>
+                </a:solidFill>
+                <a:latin typeface="Consolas" panose="020B0609020204030204" pitchFamily="49" charset="0"/>
+              </a:rPr>
+              <a:t>'</a:t>
+            </a:r>
+            <a:r>
+              <a:rPr lang="en-US" dirty="0">
+                <a:solidFill>
                   <a:srgbClr val="D4D4D4"/>
                 </a:solidFill>
                 <a:latin typeface="Consolas" panose="020B0609020204030204" pitchFamily="49" charset="0"/>
               </a:rPr>
-              <a:t>;</a:t>
-            </a:r>
-          </a:p>
-          <a:p>
-            <a:pPr lvl="1"/>
+              <a:t>, </a:t>
+            </a:r>
+            <a:r>
+              <a:rPr lang="en-US" dirty="0">
+                <a:solidFill>
+                  <a:srgbClr val="569CD6"/>
+                </a:solidFill>
+                <a:latin typeface="Consolas" panose="020B0609020204030204" pitchFamily="49" charset="0"/>
+              </a:rPr>
+              <a:t>new</a:t>
+            </a:r>
+            <a:r>
+              <a:rPr lang="en-US" dirty="0">
+                <a:solidFill>
+                  <a:srgbClr val="D4D4D4"/>
+                </a:solidFill>
+                <a:latin typeface="Consolas" panose="020B0609020204030204" pitchFamily="49" charset="0"/>
+              </a:rPr>
+              <a:t> </a:t>
+            </a:r>
             <a:r>
               <a:rPr lang="en-US" dirty="0" err="1">
                 <a:solidFill>
-                  <a:srgbClr val="9CDCFE"/>
-                </a:solidFill>
-                <a:latin typeface="Consolas" panose="020B0609020204030204" pitchFamily="49" charset="0"/>
-              </a:rPr>
-              <a:t>controllerAs</a:t>
+                  <a:srgbClr val="4EC9B0"/>
+                </a:solidFill>
+                <a:latin typeface="Consolas" panose="020B0609020204030204" pitchFamily="49" charset="0"/>
+              </a:rPr>
+              <a:t>OldDemoCmpComponent</a:t>
             </a:r>
             <a:r>
               <a:rPr lang="en-US" dirty="0">
@@ -18554,154 +20502,10 @@
                 </a:solidFill>
                 <a:latin typeface="Consolas" panose="020B0609020204030204" pitchFamily="49" charset="0"/>
               </a:rPr>
-              <a:t> = </a:t>
-            </a:r>
-            <a:r>
-              <a:rPr lang="en-US" dirty="0">
-                <a:solidFill>
-                  <a:srgbClr val="CE9178"/>
-                </a:solidFill>
-                <a:latin typeface="Consolas" panose="020B0609020204030204" pitchFamily="49" charset="0"/>
-              </a:rPr>
-              <a:t>'$</a:t>
-            </a:r>
-            <a:r>
-              <a:rPr lang="en-US" dirty="0" err="1">
-                <a:solidFill>
-                  <a:srgbClr val="CE9178"/>
-                </a:solidFill>
-                <a:latin typeface="Consolas" panose="020B0609020204030204" pitchFamily="49" charset="0"/>
-              </a:rPr>
-              <a:t>demoCmpCtrl</a:t>
-            </a:r>
-            <a:r>
-              <a:rPr lang="en-US" dirty="0">
-                <a:solidFill>
-                  <a:srgbClr val="CE9178"/>
-                </a:solidFill>
-                <a:latin typeface="Consolas" panose="020B0609020204030204" pitchFamily="49" charset="0"/>
-              </a:rPr>
-              <a:t>'</a:t>
-            </a:r>
-            <a:r>
-              <a:rPr lang="en-US" dirty="0">
-                <a:solidFill>
-                  <a:srgbClr val="D4D4D4"/>
-                </a:solidFill>
-                <a:latin typeface="Consolas" panose="020B0609020204030204" pitchFamily="49" charset="0"/>
-              </a:rPr>
-              <a:t>;</a:t>
-            </a:r>
-          </a:p>
-          <a:p>
-            <a:pPr lvl="1"/>
-            <a:r>
-              <a:rPr lang="en-US" dirty="0">
-                <a:solidFill>
-                  <a:srgbClr val="9CDCFE"/>
-                </a:solidFill>
-                <a:latin typeface="Consolas" panose="020B0609020204030204" pitchFamily="49" charset="0"/>
-              </a:rPr>
-              <a:t>bindings</a:t>
-            </a:r>
-            <a:r>
-              <a:rPr lang="en-US" dirty="0">
-                <a:solidFill>
-                  <a:srgbClr val="D4D4D4"/>
-                </a:solidFill>
-                <a:latin typeface="Consolas" panose="020B0609020204030204" pitchFamily="49" charset="0"/>
-              </a:rPr>
-              <a:t> = </a:t>
-            </a:r>
-            <a:r>
-              <a:rPr lang="en-US" dirty="0" smtClean="0">
-                <a:solidFill>
-                  <a:srgbClr val="D4D4D4"/>
-                </a:solidFill>
-                <a:latin typeface="Consolas" panose="020B0609020204030204" pitchFamily="49" charset="0"/>
-              </a:rPr>
-              <a:t>{ </a:t>
-            </a:r>
-            <a:r>
-              <a:rPr lang="en-US" dirty="0" smtClean="0">
-                <a:solidFill>
-                  <a:srgbClr val="9CDCFE"/>
-                </a:solidFill>
-                <a:latin typeface="Consolas" panose="020B0609020204030204" pitchFamily="49" charset="0"/>
-              </a:rPr>
-              <a:t>greeting</a:t>
-            </a:r>
-            <a:r>
-              <a:rPr lang="en-US" dirty="0">
-                <a:solidFill>
-                  <a:srgbClr val="9CDCFE"/>
-                </a:solidFill>
-                <a:latin typeface="Consolas" panose="020B0609020204030204" pitchFamily="49" charset="0"/>
-              </a:rPr>
-              <a:t>:</a:t>
-            </a:r>
-            <a:r>
-              <a:rPr lang="en-US" dirty="0">
-                <a:solidFill>
-                  <a:srgbClr val="D4D4D4"/>
-                </a:solidFill>
-                <a:latin typeface="Consolas" panose="020B0609020204030204" pitchFamily="49" charset="0"/>
-              </a:rPr>
-              <a:t> </a:t>
-            </a:r>
-            <a:r>
-              <a:rPr lang="en-US" dirty="0" smtClean="0">
-                <a:solidFill>
-                  <a:srgbClr val="CE9178"/>
-                </a:solidFill>
-                <a:latin typeface="Consolas" panose="020B0609020204030204" pitchFamily="49" charset="0"/>
-              </a:rPr>
-              <a:t>'@</a:t>
-            </a:r>
-            <a:r>
-              <a:rPr lang="en-US" dirty="0">
-                <a:solidFill>
-                  <a:srgbClr val="CE9178"/>
-                </a:solidFill>
-                <a:latin typeface="Consolas" panose="020B0609020204030204" pitchFamily="49" charset="0"/>
-              </a:rPr>
-              <a:t>'</a:t>
-            </a:r>
-            <a:r>
-              <a:rPr lang="en-US" dirty="0" smtClean="0">
-                <a:solidFill>
-                  <a:srgbClr val="CE9178"/>
-                </a:solidFill>
-                <a:latin typeface="Consolas" panose="020B0609020204030204" pitchFamily="49" charset="0"/>
-              </a:rPr>
-              <a:t> </a:t>
-            </a:r>
-            <a:r>
-              <a:rPr lang="en-US" dirty="0" smtClean="0">
-                <a:solidFill>
-                  <a:srgbClr val="D4D4D4"/>
-                </a:solidFill>
-                <a:latin typeface="Consolas" panose="020B0609020204030204" pitchFamily="49" charset="0"/>
-              </a:rPr>
-              <a:t>};</a:t>
-            </a:r>
-            <a:endParaRPr lang="en-US" dirty="0">
-              <a:solidFill>
-                <a:srgbClr val="D4D4D4"/>
-              </a:solidFill>
-              <a:latin typeface="Consolas" panose="020B0609020204030204" pitchFamily="49" charset="0"/>
-            </a:endParaRPr>
-          </a:p>
-          <a:p>
-            <a:r>
-              <a:rPr lang="en-US" dirty="0" smtClean="0">
-                <a:solidFill>
-                  <a:srgbClr val="D4D4D4"/>
-                </a:solidFill>
-                <a:latin typeface="Consolas" panose="020B0609020204030204" pitchFamily="49" charset="0"/>
-              </a:rPr>
-              <a:t>}</a:t>
-            </a:r>
+              <a:t>());</a:t>
+            </a:r>
+          </a:p>
+          <a:p>
             <a:endParaRPr lang="en-US" b="0" dirty="0">
               <a:solidFill>
                 <a:srgbClr val="D4D4D4"/>
@@ -18710,415 +20514,12 @@
               <a:latin typeface="Consolas" panose="020B0609020204030204" pitchFamily="49" charset="0"/>
             </a:endParaRPr>
           </a:p>
-          <a:p>
-            <a:r>
-              <a:rPr lang="en-US" dirty="0">
-                <a:solidFill>
-                  <a:srgbClr val="569CD6"/>
-                </a:solidFill>
-                <a:latin typeface="Consolas" panose="020B0609020204030204" pitchFamily="49" charset="0"/>
-              </a:rPr>
-              <a:t>class</a:t>
-            </a:r>
-            <a:r>
-              <a:rPr lang="en-US" dirty="0">
-                <a:solidFill>
-                  <a:srgbClr val="D4D4D4"/>
-                </a:solidFill>
-                <a:latin typeface="Consolas" panose="020B0609020204030204" pitchFamily="49" charset="0"/>
-              </a:rPr>
-              <a:t> </a:t>
-            </a:r>
-            <a:r>
-              <a:rPr lang="en-US" dirty="0" err="1">
-                <a:solidFill>
-                  <a:srgbClr val="4EC9B0"/>
-                </a:solidFill>
-                <a:latin typeface="Consolas" panose="020B0609020204030204" pitchFamily="49" charset="0"/>
-              </a:rPr>
-              <a:t>DemoCmpController</a:t>
-            </a:r>
-            <a:r>
-              <a:rPr lang="en-US" dirty="0">
-                <a:solidFill>
-                  <a:srgbClr val="D4D4D4"/>
-                </a:solidFill>
-                <a:latin typeface="Consolas" panose="020B0609020204030204" pitchFamily="49" charset="0"/>
-              </a:rPr>
-              <a:t> </a:t>
-            </a:r>
-            <a:r>
-              <a:rPr lang="en-US" dirty="0">
-                <a:solidFill>
-                  <a:srgbClr val="569CD6"/>
-                </a:solidFill>
-                <a:latin typeface="Consolas" panose="020B0609020204030204" pitchFamily="49" charset="0"/>
-              </a:rPr>
-              <a:t>implements</a:t>
-            </a:r>
-            <a:r>
-              <a:rPr lang="en-US" dirty="0">
-                <a:solidFill>
-                  <a:srgbClr val="D4D4D4"/>
-                </a:solidFill>
-                <a:latin typeface="Consolas" panose="020B0609020204030204" pitchFamily="49" charset="0"/>
-              </a:rPr>
-              <a:t> </a:t>
-            </a:r>
-            <a:r>
-              <a:rPr lang="en-US" dirty="0" err="1">
-                <a:solidFill>
-                  <a:srgbClr val="4EC9B0"/>
-                </a:solidFill>
-                <a:latin typeface="Consolas" panose="020B0609020204030204" pitchFamily="49" charset="0"/>
-              </a:rPr>
-              <a:t>ng</a:t>
-            </a:r>
-            <a:r>
-              <a:rPr lang="en-US" dirty="0" err="1">
-                <a:solidFill>
-                  <a:srgbClr val="D4D4D4"/>
-                </a:solidFill>
-                <a:latin typeface="Consolas" panose="020B0609020204030204" pitchFamily="49" charset="0"/>
-              </a:rPr>
-              <a:t>.</a:t>
-            </a:r>
-            <a:r>
-              <a:rPr lang="en-US" dirty="0" err="1">
-                <a:solidFill>
-                  <a:srgbClr val="4EC9B0"/>
-                </a:solidFill>
-                <a:latin typeface="Consolas" panose="020B0609020204030204" pitchFamily="49" charset="0"/>
-              </a:rPr>
-              <a:t>IComponentController</a:t>
-            </a:r>
-            <a:r>
-              <a:rPr lang="en-US" dirty="0">
-                <a:solidFill>
-                  <a:srgbClr val="D4D4D4"/>
-                </a:solidFill>
-                <a:latin typeface="Consolas" panose="020B0609020204030204" pitchFamily="49" charset="0"/>
-              </a:rPr>
-              <a:t> {</a:t>
-            </a:r>
-          </a:p>
-          <a:p>
-            <a:r>
-              <a:rPr lang="en-US" dirty="0" smtClean="0">
-                <a:solidFill>
-                  <a:srgbClr val="569CD6"/>
-                </a:solidFill>
-                <a:latin typeface="Consolas" panose="020B0609020204030204" pitchFamily="49" charset="0"/>
-              </a:rPr>
-              <a:t>	static</a:t>
-            </a:r>
-            <a:r>
-              <a:rPr lang="en-US" dirty="0" smtClean="0">
-                <a:solidFill>
-                  <a:srgbClr val="D4D4D4"/>
-                </a:solidFill>
-                <a:latin typeface="Consolas" panose="020B0609020204030204" pitchFamily="49" charset="0"/>
-              </a:rPr>
-              <a:t> </a:t>
-            </a:r>
-            <a:r>
-              <a:rPr lang="en-US" dirty="0">
-                <a:solidFill>
-                  <a:srgbClr val="9CDCFE"/>
-                </a:solidFill>
-                <a:latin typeface="Consolas" panose="020B0609020204030204" pitchFamily="49" charset="0"/>
-              </a:rPr>
-              <a:t>$inject</a:t>
-            </a:r>
-            <a:r>
-              <a:rPr lang="en-US" dirty="0">
-                <a:solidFill>
-                  <a:srgbClr val="D4D4D4"/>
-                </a:solidFill>
-                <a:latin typeface="Consolas" panose="020B0609020204030204" pitchFamily="49" charset="0"/>
-              </a:rPr>
-              <a:t> = [</a:t>
-            </a:r>
-            <a:r>
-              <a:rPr lang="en-US" dirty="0">
-                <a:solidFill>
-                  <a:srgbClr val="CE9178"/>
-                </a:solidFill>
-                <a:latin typeface="Consolas" panose="020B0609020204030204" pitchFamily="49" charset="0"/>
-              </a:rPr>
-              <a:t>'$window'</a:t>
-            </a:r>
-            <a:r>
-              <a:rPr lang="en-US" dirty="0">
-                <a:solidFill>
-                  <a:srgbClr val="D4D4D4"/>
-                </a:solidFill>
-                <a:latin typeface="Consolas" panose="020B0609020204030204" pitchFamily="49" charset="0"/>
-              </a:rPr>
-              <a:t>];</a:t>
-            </a:r>
-          </a:p>
-          <a:p>
-            <a:r>
-              <a:rPr lang="en-US" dirty="0" smtClean="0">
-                <a:solidFill>
-                  <a:srgbClr val="9CDCFE"/>
-                </a:solidFill>
-                <a:latin typeface="Consolas" panose="020B0609020204030204" pitchFamily="49" charset="0"/>
-              </a:rPr>
-              <a:t>	title</a:t>
-            </a:r>
-            <a:r>
-              <a:rPr lang="en-US" dirty="0" smtClean="0">
-                <a:solidFill>
-                  <a:srgbClr val="D4D4D4"/>
-                </a:solidFill>
-                <a:latin typeface="Consolas" panose="020B0609020204030204" pitchFamily="49" charset="0"/>
-              </a:rPr>
-              <a:t> </a:t>
-            </a:r>
-            <a:r>
-              <a:rPr lang="en-US" dirty="0">
-                <a:solidFill>
-                  <a:srgbClr val="D4D4D4"/>
-                </a:solidFill>
-                <a:latin typeface="Consolas" panose="020B0609020204030204" pitchFamily="49" charset="0"/>
-              </a:rPr>
-              <a:t>= </a:t>
-            </a:r>
-            <a:r>
-              <a:rPr lang="en-US" dirty="0">
-                <a:solidFill>
-                  <a:srgbClr val="CE9178"/>
-                </a:solidFill>
-                <a:latin typeface="Consolas" panose="020B0609020204030204" pitchFamily="49" charset="0"/>
-              </a:rPr>
-              <a:t>'World'</a:t>
-            </a:r>
-            <a:r>
-              <a:rPr lang="en-US" dirty="0">
-                <a:solidFill>
-                  <a:srgbClr val="D4D4D4"/>
-                </a:solidFill>
-                <a:latin typeface="Consolas" panose="020B0609020204030204" pitchFamily="49" charset="0"/>
-              </a:rPr>
-              <a:t>;</a:t>
-            </a:r>
-          </a:p>
-          <a:p>
-            <a:r>
-              <a:rPr lang="en-US" dirty="0" smtClean="0">
-                <a:solidFill>
-                  <a:srgbClr val="569CD6"/>
-                </a:solidFill>
-                <a:latin typeface="Consolas" panose="020B0609020204030204" pitchFamily="49" charset="0"/>
-              </a:rPr>
-              <a:t>	constructor</a:t>
-            </a:r>
-            <a:r>
-              <a:rPr lang="en-US" dirty="0" smtClean="0">
-                <a:solidFill>
-                  <a:srgbClr val="D4D4D4"/>
-                </a:solidFill>
-                <a:latin typeface="Consolas" panose="020B0609020204030204" pitchFamily="49" charset="0"/>
-              </a:rPr>
-              <a:t>(</a:t>
-            </a:r>
-            <a:r>
-              <a:rPr lang="en-US" dirty="0" smtClean="0">
-                <a:solidFill>
-                  <a:srgbClr val="569CD6"/>
-                </a:solidFill>
-                <a:latin typeface="Consolas" panose="020B0609020204030204" pitchFamily="49" charset="0"/>
-              </a:rPr>
-              <a:t>public</a:t>
-            </a:r>
-            <a:r>
-              <a:rPr lang="en-US" dirty="0" smtClean="0">
-                <a:solidFill>
-                  <a:srgbClr val="D4D4D4"/>
-                </a:solidFill>
-                <a:latin typeface="Consolas" panose="020B0609020204030204" pitchFamily="49" charset="0"/>
-              </a:rPr>
-              <a:t> </a:t>
-            </a:r>
-            <a:r>
-              <a:rPr lang="en-US" dirty="0">
-                <a:solidFill>
-                  <a:srgbClr val="9CDCFE"/>
-                </a:solidFill>
-                <a:latin typeface="Consolas" panose="020B0609020204030204" pitchFamily="49" charset="0"/>
-              </a:rPr>
-              <a:t>window</a:t>
-            </a:r>
-            <a:r>
-              <a:rPr lang="en-US" dirty="0">
-                <a:solidFill>
-                  <a:srgbClr val="D4D4D4"/>
-                </a:solidFill>
-                <a:latin typeface="Consolas" panose="020B0609020204030204" pitchFamily="49" charset="0"/>
-              </a:rPr>
-              <a:t>: </a:t>
-            </a:r>
-            <a:r>
-              <a:rPr lang="en-US" dirty="0" err="1">
-                <a:solidFill>
-                  <a:srgbClr val="4EC9B0"/>
-                </a:solidFill>
-                <a:latin typeface="Consolas" panose="020B0609020204030204" pitchFamily="49" charset="0"/>
-              </a:rPr>
-              <a:t>ng</a:t>
-            </a:r>
-            <a:r>
-              <a:rPr lang="en-US" dirty="0" err="1">
-                <a:solidFill>
-                  <a:srgbClr val="D4D4D4"/>
-                </a:solidFill>
-                <a:latin typeface="Consolas" panose="020B0609020204030204" pitchFamily="49" charset="0"/>
-              </a:rPr>
-              <a:t>.</a:t>
-            </a:r>
-            <a:r>
-              <a:rPr lang="en-US" dirty="0" err="1">
-                <a:solidFill>
-                  <a:srgbClr val="4EC9B0"/>
-                </a:solidFill>
-                <a:latin typeface="Consolas" panose="020B0609020204030204" pitchFamily="49" charset="0"/>
-              </a:rPr>
-              <a:t>IWindowService</a:t>
-            </a:r>
-            <a:r>
-              <a:rPr lang="en-US" dirty="0">
-                <a:solidFill>
-                  <a:srgbClr val="D4D4D4"/>
-                </a:solidFill>
-                <a:latin typeface="Consolas" panose="020B0609020204030204" pitchFamily="49" charset="0"/>
-              </a:rPr>
-              <a:t>) {}</a:t>
-            </a:r>
-          </a:p>
-          <a:p>
-            <a:r>
-              <a:rPr lang="en-US" dirty="0" smtClean="0">
-                <a:solidFill>
-                  <a:srgbClr val="DCDCAA"/>
-                </a:solidFill>
-                <a:latin typeface="Consolas" panose="020B0609020204030204" pitchFamily="49" charset="0"/>
-              </a:rPr>
-              <a:t>	$</a:t>
-            </a:r>
-            <a:r>
-              <a:rPr lang="en-US" dirty="0" err="1">
-                <a:solidFill>
-                  <a:srgbClr val="DCDCAA"/>
-                </a:solidFill>
-                <a:latin typeface="Consolas" panose="020B0609020204030204" pitchFamily="49" charset="0"/>
-              </a:rPr>
-              <a:t>onInit</a:t>
-            </a:r>
-            <a:r>
-              <a:rPr lang="en-US" dirty="0">
-                <a:solidFill>
-                  <a:srgbClr val="D4D4D4"/>
-                </a:solidFill>
-                <a:latin typeface="Consolas" panose="020B0609020204030204" pitchFamily="49" charset="0"/>
-              </a:rPr>
-              <a:t>() </a:t>
-            </a:r>
-            <a:r>
-              <a:rPr lang="en-US" dirty="0" smtClean="0">
-                <a:solidFill>
-                  <a:srgbClr val="D4D4D4"/>
-                </a:solidFill>
-                <a:latin typeface="Consolas" panose="020B0609020204030204" pitchFamily="49" charset="0"/>
-              </a:rPr>
-              <a:t>{ }</a:t>
-            </a:r>
-            <a:endParaRPr lang="en-US" dirty="0">
-              <a:solidFill>
-                <a:srgbClr val="D4D4D4"/>
-              </a:solidFill>
-              <a:latin typeface="Consolas" panose="020B0609020204030204" pitchFamily="49" charset="0"/>
-            </a:endParaRPr>
-          </a:p>
-          <a:p>
-            <a:r>
-              <a:rPr lang="en-US" dirty="0" smtClean="0">
-                <a:solidFill>
-                  <a:srgbClr val="DCDCAA"/>
-                </a:solidFill>
-                <a:latin typeface="Consolas" panose="020B0609020204030204" pitchFamily="49" charset="0"/>
-              </a:rPr>
-              <a:t>	$</a:t>
-            </a:r>
-            <a:r>
-              <a:rPr lang="en-US" dirty="0" err="1">
-                <a:solidFill>
-                  <a:srgbClr val="DCDCAA"/>
-                </a:solidFill>
-                <a:latin typeface="Consolas" panose="020B0609020204030204" pitchFamily="49" charset="0"/>
-              </a:rPr>
-              <a:t>onDestroy</a:t>
-            </a:r>
-            <a:r>
-              <a:rPr lang="en-US" dirty="0">
-                <a:solidFill>
-                  <a:srgbClr val="D4D4D4"/>
-                </a:solidFill>
-                <a:latin typeface="Consolas" panose="020B0609020204030204" pitchFamily="49" charset="0"/>
-              </a:rPr>
-              <a:t>() </a:t>
-            </a:r>
-            <a:r>
-              <a:rPr lang="en-US" dirty="0" smtClean="0">
-                <a:solidFill>
-                  <a:srgbClr val="D4D4D4"/>
-                </a:solidFill>
-                <a:latin typeface="Consolas" panose="020B0609020204030204" pitchFamily="49" charset="0"/>
-              </a:rPr>
-              <a:t>{ }</a:t>
-            </a:r>
-            <a:endParaRPr lang="en-US" dirty="0">
-              <a:solidFill>
-                <a:srgbClr val="D4D4D4"/>
-              </a:solidFill>
-              <a:latin typeface="Consolas" panose="020B0609020204030204" pitchFamily="49" charset="0"/>
-            </a:endParaRPr>
-          </a:p>
-          <a:p>
-            <a:r>
-              <a:rPr lang="en-US" dirty="0" smtClean="0">
-                <a:solidFill>
-                  <a:srgbClr val="D4D4D4"/>
-                </a:solidFill>
-                <a:latin typeface="Consolas" panose="020B0609020204030204" pitchFamily="49" charset="0"/>
-              </a:rPr>
-              <a:t>}</a:t>
-            </a:r>
-          </a:p>
-          <a:p>
-            <a:endParaRPr lang="en-US" dirty="0">
-              <a:solidFill>
-                <a:srgbClr val="D4D4D4"/>
-              </a:solidFill>
-              <a:latin typeface="Consolas" panose="020B0609020204030204" pitchFamily="49" charset="0"/>
-            </a:endParaRPr>
-          </a:p>
-          <a:p>
-            <a:endParaRPr lang="en-US" b="0" dirty="0">
-              <a:solidFill>
-                <a:srgbClr val="D4D4D4"/>
-              </a:solidFill>
-              <a:effectLst/>
-              <a:latin typeface="Consolas" panose="020B0609020204030204" pitchFamily="49" charset="0"/>
-            </a:endParaRPr>
-          </a:p>
         </p:txBody>
       </p:sp>
     </p:spTree>
     <p:extLst>
       <p:ext uri="{BB962C8B-B14F-4D97-AF65-F5344CB8AC3E}">
-        <p14:creationId xmlns:p14="http://schemas.microsoft.com/office/powerpoint/2010/main" val="1066382295"/>
+        <p14:creationId xmlns:p14="http://schemas.microsoft.com/office/powerpoint/2010/main" val="2772302072"/>
       </p:ext>
     </p:extLst>
   </p:cSld>
@@ -19169,7 +20570,7 @@
           <a:p>
             <a:r>
               <a:rPr lang="en-US" dirty="0" smtClean="0"/>
-              <a:t>Further reading</a:t>
+              <a:t>New module</a:t>
             </a:r>
             <a:endParaRPr lang="en-US" dirty="0"/>
           </a:p>
@@ -19177,193 +20578,1984 @@
       </p:sp>
       <p:sp>
         <p:nvSpPr>
-          <p:cNvPr id="3" name="Content Placeholder 2"/>
-          <p:cNvSpPr>
-            <a:spLocks noGrp="1"/>
-          </p:cNvSpPr>
-          <p:nvPr>
-            <p:ph idx="1"/>
-          </p:nvPr>
+          <p:cNvPr id="7" name="TextBox 6"/>
+          <p:cNvSpPr txBox="1"/>
+          <p:nvPr/>
         </p:nvSpPr>
-        <p:spPr/>
+        <p:spPr>
+          <a:xfrm>
+            <a:off x="1385456" y="1644073"/>
+            <a:ext cx="8876144" cy="4247317"/>
+          </a:xfrm>
+          <a:prstGeom prst="rect">
+            <a:avLst/>
+          </a:prstGeom>
+          <a:solidFill>
+            <a:schemeClr val="bg1"/>
+          </a:solidFill>
+        </p:spPr>
         <p:txBody>
-          <a:bodyPr>
-            <a:normAutofit fontScale="92500" lnSpcReduction="10000"/>
+          <a:bodyPr wrap="square" rtlCol="0">
+            <a:spAutoFit/>
           </a:bodyPr>
           <a:lstStyle/>
           <a:p>
             <a:r>
-              <a:rPr lang="en-US" dirty="0"/>
-              <a:t>Official documentation: https://angular.io/docs</a:t>
-            </a:r>
-          </a:p>
-          <a:p>
-            <a:r>
-              <a:rPr lang="en-US" dirty="0"/>
-              <a:t>Official Angular2+ tutorial: </a:t>
-            </a:r>
-            <a:r>
               <a:rPr lang="en-US" dirty="0">
-                <a:hlinkClick r:id="rId2"/>
-              </a:rPr>
-              <a:t>https://angular.io/tutorial</a:t>
-            </a:r>
-            <a:endParaRPr lang="en-US" dirty="0"/>
-          </a:p>
-          <a:p>
-            <a:r>
-              <a:rPr lang="en-US" dirty="0"/>
-              <a:t>Angular cheat sheet: </a:t>
+                <a:solidFill>
+                  <a:srgbClr val="C586C0"/>
+                </a:solidFill>
+                <a:latin typeface="Consolas" panose="020B0609020204030204" pitchFamily="49" charset="0"/>
+              </a:rPr>
+              <a:t>import</a:t>
             </a:r>
             <a:r>
               <a:rPr lang="en-US" dirty="0">
-                <a:hlinkClick r:id="rId3"/>
-              </a:rPr>
-              <a:t>https://angular.io/guide/cheatsheet</a:t>
-            </a:r>
-            <a:endParaRPr lang="en-US" dirty="0"/>
-          </a:p>
-          <a:p>
-            <a:r>
-              <a:rPr lang="en-US" dirty="0" smtClean="0"/>
-              <a:t>Visual </a:t>
-            </a:r>
-            <a:r>
-              <a:rPr lang="en-US" dirty="0" err="1" smtClean="0"/>
-              <a:t>RxJS</a:t>
-            </a:r>
-            <a:r>
-              <a:rPr lang="en-US" dirty="0" smtClean="0"/>
-              <a:t> streams: </a:t>
-            </a:r>
+                <a:solidFill>
+                  <a:srgbClr val="D4D4D4"/>
+                </a:solidFill>
+                <a:latin typeface="Consolas" panose="020B0609020204030204" pitchFamily="49" charset="0"/>
+              </a:rPr>
+              <a:t> { </a:t>
+            </a:r>
+            <a:r>
+              <a:rPr lang="en-US" dirty="0" err="1">
+                <a:solidFill>
+                  <a:srgbClr val="9CDCFE"/>
+                </a:solidFill>
+                <a:latin typeface="Consolas" panose="020B0609020204030204" pitchFamily="49" charset="0"/>
+              </a:rPr>
+              <a:t>BrowserModule</a:t>
+            </a:r>
+            <a:r>
+              <a:rPr lang="en-US" dirty="0">
+                <a:solidFill>
+                  <a:srgbClr val="D4D4D4"/>
+                </a:solidFill>
+                <a:latin typeface="Consolas" panose="020B0609020204030204" pitchFamily="49" charset="0"/>
+              </a:rPr>
+              <a:t> } </a:t>
+            </a:r>
+            <a:r>
+              <a:rPr lang="en-US" dirty="0">
+                <a:solidFill>
+                  <a:srgbClr val="C586C0"/>
+                </a:solidFill>
+                <a:latin typeface="Consolas" panose="020B0609020204030204" pitchFamily="49" charset="0"/>
+              </a:rPr>
+              <a:t>from</a:t>
+            </a:r>
+            <a:r>
+              <a:rPr lang="en-US" dirty="0">
+                <a:solidFill>
+                  <a:srgbClr val="D4D4D4"/>
+                </a:solidFill>
+                <a:latin typeface="Consolas" panose="020B0609020204030204" pitchFamily="49" charset="0"/>
+              </a:rPr>
+              <a:t> </a:t>
+            </a:r>
+            <a:r>
+              <a:rPr lang="en-US" dirty="0">
+                <a:solidFill>
+                  <a:srgbClr val="CE9178"/>
+                </a:solidFill>
+                <a:latin typeface="Consolas" panose="020B0609020204030204" pitchFamily="49" charset="0"/>
+              </a:rPr>
+              <a:t>'@angular/platform-browser'</a:t>
+            </a:r>
+            <a:r>
+              <a:rPr lang="en-US" dirty="0">
+                <a:solidFill>
+                  <a:srgbClr val="D4D4D4"/>
+                </a:solidFill>
+                <a:latin typeface="Consolas" panose="020B0609020204030204" pitchFamily="49" charset="0"/>
+              </a:rPr>
+              <a:t>;</a:t>
+            </a:r>
+          </a:p>
+          <a:p>
             <a:r>
               <a:rPr lang="en-US" dirty="0" smtClean="0">
-                <a:hlinkClick r:id="rId4"/>
-              </a:rPr>
-              <a:t>http://rxmarbles.com</a:t>
-            </a:r>
-            <a:endParaRPr lang="en-US" dirty="0" smtClean="0"/>
-          </a:p>
-          <a:p>
-            <a:r>
-              <a:rPr lang="en-US" dirty="0" err="1" smtClean="0"/>
-              <a:t>RxJS</a:t>
-            </a:r>
-            <a:r>
-              <a:rPr lang="en-US" dirty="0" smtClean="0"/>
+                <a:solidFill>
+                  <a:srgbClr val="C586C0"/>
+                </a:solidFill>
+                <a:latin typeface="Consolas" panose="020B0609020204030204" pitchFamily="49" charset="0"/>
+              </a:rPr>
+              <a:t>import</a:t>
+            </a:r>
+            <a:r>
+              <a:rPr lang="en-US" dirty="0" smtClean="0">
+                <a:solidFill>
+                  <a:srgbClr val="D4D4D4"/>
+                </a:solidFill>
+                <a:latin typeface="Consolas" panose="020B0609020204030204" pitchFamily="49" charset="0"/>
+              </a:rPr>
+              <a:t> { </a:t>
+            </a:r>
+            <a:r>
+              <a:rPr lang="en-US" dirty="0" err="1" smtClean="0">
+                <a:solidFill>
+                  <a:srgbClr val="9CDCFE"/>
+                </a:solidFill>
+                <a:latin typeface="Consolas" panose="020B0609020204030204" pitchFamily="49" charset="0"/>
+              </a:rPr>
+              <a:t>NgModule</a:t>
+            </a:r>
+            <a:r>
+              <a:rPr lang="en-US" dirty="0" smtClean="0">
+                <a:solidFill>
+                  <a:srgbClr val="D4D4D4"/>
+                </a:solidFill>
+                <a:latin typeface="Consolas" panose="020B0609020204030204" pitchFamily="49" charset="0"/>
+              </a:rPr>
+              <a:t> } </a:t>
+            </a:r>
+            <a:r>
+              <a:rPr lang="en-US" dirty="0" smtClean="0">
+                <a:solidFill>
+                  <a:srgbClr val="C586C0"/>
+                </a:solidFill>
+                <a:latin typeface="Consolas" panose="020B0609020204030204" pitchFamily="49" charset="0"/>
+              </a:rPr>
+              <a:t>from</a:t>
+            </a:r>
+            <a:r>
+              <a:rPr lang="en-US" dirty="0" smtClean="0">
+                <a:solidFill>
+                  <a:srgbClr val="D4D4D4"/>
+                </a:solidFill>
+                <a:latin typeface="Consolas" panose="020B0609020204030204" pitchFamily="49" charset="0"/>
+              </a:rPr>
               <a:t> </a:t>
             </a:r>
             <a:r>
-              <a:rPr lang="en-US" dirty="0"/>
-              <a:t>manual: </a:t>
+              <a:rPr lang="en-US" dirty="0" smtClean="0">
+                <a:solidFill>
+                  <a:srgbClr val="CE9178"/>
+                </a:solidFill>
+                <a:latin typeface="Consolas" panose="020B0609020204030204" pitchFamily="49" charset="0"/>
+              </a:rPr>
+              <a:t>'@angular/core'</a:t>
+            </a:r>
+            <a:r>
+              <a:rPr lang="en-US" dirty="0" smtClean="0">
+                <a:solidFill>
+                  <a:srgbClr val="D4D4D4"/>
+                </a:solidFill>
+                <a:latin typeface="Consolas" panose="020B0609020204030204" pitchFamily="49" charset="0"/>
+              </a:rPr>
+              <a:t>;</a:t>
+            </a:r>
+          </a:p>
+          <a:p>
+            <a:r>
+              <a:rPr lang="en-US" dirty="0" smtClean="0">
+                <a:solidFill>
+                  <a:srgbClr val="C586C0"/>
+                </a:solidFill>
+                <a:latin typeface="Consolas" panose="020B0609020204030204" pitchFamily="49" charset="0"/>
+              </a:rPr>
+              <a:t>import</a:t>
+            </a:r>
+            <a:r>
+              <a:rPr lang="en-US" dirty="0" smtClean="0">
+                <a:solidFill>
+                  <a:srgbClr val="D4D4D4"/>
+                </a:solidFill>
+                <a:latin typeface="Consolas" panose="020B0609020204030204" pitchFamily="49" charset="0"/>
+              </a:rPr>
+              <a:t> { </a:t>
+            </a:r>
+            <a:r>
+              <a:rPr lang="en-US" dirty="0" err="1" smtClean="0">
+                <a:solidFill>
+                  <a:srgbClr val="9CDCFE"/>
+                </a:solidFill>
+                <a:latin typeface="Consolas" panose="020B0609020204030204" pitchFamily="49" charset="0"/>
+              </a:rPr>
+              <a:t>HttpModule</a:t>
+            </a:r>
+            <a:r>
+              <a:rPr lang="en-US" dirty="0" smtClean="0">
+                <a:solidFill>
+                  <a:srgbClr val="D4D4D4"/>
+                </a:solidFill>
+                <a:latin typeface="Consolas" panose="020B0609020204030204" pitchFamily="49" charset="0"/>
+              </a:rPr>
+              <a:t> } </a:t>
+            </a:r>
+            <a:r>
+              <a:rPr lang="en-US" dirty="0" smtClean="0">
+                <a:solidFill>
+                  <a:srgbClr val="C586C0"/>
+                </a:solidFill>
+                <a:latin typeface="Consolas" panose="020B0609020204030204" pitchFamily="49" charset="0"/>
+              </a:rPr>
+              <a:t>from</a:t>
+            </a:r>
+            <a:r>
+              <a:rPr lang="en-US" dirty="0" smtClean="0">
+                <a:solidFill>
+                  <a:srgbClr val="D4D4D4"/>
+                </a:solidFill>
+                <a:latin typeface="Consolas" panose="020B0609020204030204" pitchFamily="49" charset="0"/>
+              </a:rPr>
+              <a:t> </a:t>
+            </a:r>
+            <a:r>
+              <a:rPr lang="en-US" dirty="0" smtClean="0">
+                <a:solidFill>
+                  <a:srgbClr val="CE9178"/>
+                </a:solidFill>
+                <a:latin typeface="Consolas" panose="020B0609020204030204" pitchFamily="49" charset="0"/>
+              </a:rPr>
+              <a:t>'@angular/http'</a:t>
+            </a:r>
+            <a:r>
+              <a:rPr lang="en-US" dirty="0" smtClean="0">
+                <a:solidFill>
+                  <a:srgbClr val="D4D4D4"/>
+                </a:solidFill>
+                <a:latin typeface="Consolas" panose="020B0609020204030204" pitchFamily="49" charset="0"/>
+              </a:rPr>
+              <a:t>;</a:t>
+            </a:r>
+          </a:p>
+          <a:p>
+            <a:r>
+              <a:rPr lang="en-US" dirty="0" smtClean="0">
+                <a:solidFill>
+                  <a:srgbClr val="C586C0"/>
+                </a:solidFill>
+                <a:latin typeface="Consolas" panose="020B0609020204030204" pitchFamily="49" charset="0"/>
+              </a:rPr>
+              <a:t>import</a:t>
+            </a:r>
+            <a:r>
+              <a:rPr lang="en-US" dirty="0" smtClean="0">
+                <a:solidFill>
+                  <a:srgbClr val="D4D4D4"/>
+                </a:solidFill>
+                <a:latin typeface="Consolas" panose="020B0609020204030204" pitchFamily="49" charset="0"/>
+              </a:rPr>
+              <a:t> { </a:t>
+            </a:r>
+            <a:r>
+              <a:rPr lang="en-US" dirty="0" err="1" smtClean="0">
+                <a:solidFill>
+                  <a:srgbClr val="9CDCFE"/>
+                </a:solidFill>
+                <a:latin typeface="Consolas" panose="020B0609020204030204" pitchFamily="49" charset="0"/>
+              </a:rPr>
+              <a:t>AppComponent</a:t>
+            </a:r>
+            <a:r>
+              <a:rPr lang="en-US" dirty="0" smtClean="0">
+                <a:solidFill>
+                  <a:srgbClr val="D4D4D4"/>
+                </a:solidFill>
+                <a:latin typeface="Consolas" panose="020B0609020204030204" pitchFamily="49" charset="0"/>
+              </a:rPr>
+              <a:t> } </a:t>
+            </a:r>
+            <a:r>
+              <a:rPr lang="en-US" dirty="0" smtClean="0">
+                <a:solidFill>
+                  <a:srgbClr val="C586C0"/>
+                </a:solidFill>
+                <a:latin typeface="Consolas" panose="020B0609020204030204" pitchFamily="49" charset="0"/>
+              </a:rPr>
+              <a:t>from</a:t>
+            </a:r>
+            <a:r>
+              <a:rPr lang="en-US" dirty="0" smtClean="0">
+                <a:solidFill>
+                  <a:srgbClr val="D4D4D4"/>
+                </a:solidFill>
+                <a:latin typeface="Consolas" panose="020B0609020204030204" pitchFamily="49" charset="0"/>
+              </a:rPr>
+              <a:t> </a:t>
+            </a:r>
+            <a:r>
+              <a:rPr lang="en-US" dirty="0" smtClean="0">
+                <a:solidFill>
+                  <a:srgbClr val="CE9178"/>
+                </a:solidFill>
+                <a:latin typeface="Consolas" panose="020B0609020204030204" pitchFamily="49" charset="0"/>
+              </a:rPr>
+              <a:t>'./</a:t>
+            </a:r>
+            <a:r>
+              <a:rPr lang="en-US" dirty="0" err="1" smtClean="0">
+                <a:solidFill>
+                  <a:srgbClr val="CE9178"/>
+                </a:solidFill>
+                <a:latin typeface="Consolas" panose="020B0609020204030204" pitchFamily="49" charset="0"/>
+              </a:rPr>
+              <a:t>app.component</a:t>
+            </a:r>
+            <a:r>
+              <a:rPr lang="en-US" dirty="0" smtClean="0">
+                <a:solidFill>
+                  <a:srgbClr val="CE9178"/>
+                </a:solidFill>
+                <a:latin typeface="Consolas" panose="020B0609020204030204" pitchFamily="49" charset="0"/>
+              </a:rPr>
+              <a:t>'</a:t>
+            </a:r>
+            <a:r>
+              <a:rPr lang="en-US" dirty="0" smtClean="0">
+                <a:solidFill>
+                  <a:srgbClr val="D4D4D4"/>
+                </a:solidFill>
+                <a:latin typeface="Consolas" panose="020B0609020204030204" pitchFamily="49" charset="0"/>
+              </a:rPr>
+              <a:t>;</a:t>
+            </a:r>
+          </a:p>
+          <a:p>
+            <a:r>
+              <a:rPr lang="en-US" dirty="0" smtClean="0">
+                <a:solidFill>
+                  <a:srgbClr val="C586C0"/>
+                </a:solidFill>
+                <a:latin typeface="Consolas" panose="020B0609020204030204" pitchFamily="49" charset="0"/>
+              </a:rPr>
+              <a:t>import</a:t>
+            </a:r>
+            <a:r>
+              <a:rPr lang="en-US" dirty="0" smtClean="0">
+                <a:solidFill>
+                  <a:srgbClr val="D4D4D4"/>
+                </a:solidFill>
+                <a:latin typeface="Consolas" panose="020B0609020204030204" pitchFamily="49" charset="0"/>
+              </a:rPr>
+              <a:t> </a:t>
             </a:r>
             <a:r>
               <a:rPr lang="en-US" dirty="0">
-                <a:hlinkClick r:id="rId5"/>
-              </a:rPr>
-              <a:t>http://</a:t>
-            </a:r>
+                <a:solidFill>
+                  <a:srgbClr val="D4D4D4"/>
+                </a:solidFill>
+                <a:latin typeface="Consolas" panose="020B0609020204030204" pitchFamily="49" charset="0"/>
+              </a:rPr>
+              <a:t>{ </a:t>
+            </a:r>
+            <a:r>
+              <a:rPr lang="en-US" dirty="0" err="1">
+                <a:solidFill>
+                  <a:srgbClr val="9CDCFE"/>
+                </a:solidFill>
+                <a:latin typeface="Consolas" panose="020B0609020204030204" pitchFamily="49" charset="0"/>
+              </a:rPr>
+              <a:t>DemoCmpComponent</a:t>
+            </a:r>
+            <a:r>
+              <a:rPr lang="en-US" dirty="0">
+                <a:solidFill>
+                  <a:srgbClr val="D4D4D4"/>
+                </a:solidFill>
+                <a:latin typeface="Consolas" panose="020B0609020204030204" pitchFamily="49" charset="0"/>
+              </a:rPr>
+              <a:t> } </a:t>
+            </a:r>
+            <a:r>
+              <a:rPr lang="en-US" dirty="0">
+                <a:solidFill>
+                  <a:srgbClr val="C586C0"/>
+                </a:solidFill>
+                <a:latin typeface="Consolas" panose="020B0609020204030204" pitchFamily="49" charset="0"/>
+              </a:rPr>
+              <a:t>from</a:t>
+            </a:r>
+            <a:r>
+              <a:rPr lang="en-US" dirty="0">
+                <a:solidFill>
+                  <a:srgbClr val="D4D4D4"/>
+                </a:solidFill>
+                <a:latin typeface="Consolas" panose="020B0609020204030204" pitchFamily="49" charset="0"/>
+              </a:rPr>
+              <a:t> </a:t>
+            </a:r>
+            <a:r>
+              <a:rPr lang="en-US" dirty="0">
+                <a:solidFill>
+                  <a:srgbClr val="CE9178"/>
+                </a:solidFill>
+                <a:latin typeface="Consolas" panose="020B0609020204030204" pitchFamily="49" charset="0"/>
+              </a:rPr>
+              <a:t>'./demo-</a:t>
+            </a:r>
+            <a:r>
+              <a:rPr lang="en-US" dirty="0" err="1">
+                <a:solidFill>
+                  <a:srgbClr val="CE9178"/>
+                </a:solidFill>
+                <a:latin typeface="Consolas" panose="020B0609020204030204" pitchFamily="49" charset="0"/>
+              </a:rPr>
+              <a:t>cmp</a:t>
+            </a:r>
+            <a:r>
+              <a:rPr lang="en-US" dirty="0">
+                <a:solidFill>
+                  <a:srgbClr val="CE9178"/>
+                </a:solidFill>
+                <a:latin typeface="Consolas" panose="020B0609020204030204" pitchFamily="49" charset="0"/>
+              </a:rPr>
+              <a:t>/demo-</a:t>
+            </a:r>
+            <a:r>
+              <a:rPr lang="en-US" dirty="0" err="1">
+                <a:solidFill>
+                  <a:srgbClr val="CE9178"/>
+                </a:solidFill>
+                <a:latin typeface="Consolas" panose="020B0609020204030204" pitchFamily="49" charset="0"/>
+              </a:rPr>
+              <a:t>cmp.component</a:t>
+            </a:r>
+            <a:r>
+              <a:rPr lang="en-US" dirty="0">
+                <a:solidFill>
+                  <a:srgbClr val="CE9178"/>
+                </a:solidFill>
+                <a:latin typeface="Consolas" panose="020B0609020204030204" pitchFamily="49" charset="0"/>
+              </a:rPr>
+              <a:t>'</a:t>
+            </a:r>
+            <a:r>
+              <a:rPr lang="en-US" dirty="0">
+                <a:solidFill>
+                  <a:srgbClr val="D4D4D4"/>
+                </a:solidFill>
+                <a:latin typeface="Consolas" panose="020B0609020204030204" pitchFamily="49" charset="0"/>
+              </a:rPr>
+              <a:t>;</a:t>
+            </a:r>
+          </a:p>
+          <a:p>
+            <a:endParaRPr lang="en-US" dirty="0" smtClean="0">
+              <a:solidFill>
+                <a:srgbClr val="D4D4D4"/>
+              </a:solidFill>
+              <a:latin typeface="Consolas" panose="020B0609020204030204" pitchFamily="49" charset="0"/>
+            </a:endParaRPr>
+          </a:p>
+          <a:p>
             <a:r>
               <a:rPr lang="en-US" dirty="0" smtClean="0">
-                <a:hlinkClick r:id="rId5"/>
-              </a:rPr>
-              <a:t>reactivex.io/rxjs/manual/index.html</a:t>
-            </a:r>
-            <a:endParaRPr lang="en-US" dirty="0" smtClean="0"/>
-          </a:p>
-          <a:p>
-            <a:r>
-              <a:rPr lang="en-US" dirty="0" smtClean="0"/>
-              <a:t>Getting </a:t>
-            </a:r>
-            <a:r>
-              <a:rPr lang="en-US" dirty="0"/>
-              <a:t>acquainted with Angular CLI: </a:t>
+                <a:solidFill>
+                  <a:srgbClr val="D4D4D4"/>
+                </a:solidFill>
+                <a:latin typeface="Consolas" panose="020B0609020204030204" pitchFamily="49" charset="0"/>
+              </a:rPr>
+              <a:t>@</a:t>
+            </a:r>
+            <a:r>
+              <a:rPr lang="en-US" dirty="0" err="1">
+                <a:solidFill>
+                  <a:srgbClr val="DCDCAA"/>
+                </a:solidFill>
+                <a:latin typeface="Consolas" panose="020B0609020204030204" pitchFamily="49" charset="0"/>
+              </a:rPr>
+              <a:t>NgModule</a:t>
             </a:r>
             <a:r>
               <a:rPr lang="en-US" dirty="0">
-                <a:hlinkClick r:id="rId6"/>
-              </a:rPr>
-              <a:t>https://github.com/angular/angular-cli</a:t>
-            </a:r>
-            <a:endParaRPr lang="en-US" dirty="0"/>
-          </a:p>
-          <a:p>
-            <a:r>
-              <a:rPr lang="en-US" dirty="0" smtClean="0"/>
-              <a:t>Angular </a:t>
-            </a:r>
-            <a:r>
-              <a:rPr lang="en-US" dirty="0"/>
-              <a:t>in plain JavaScript: </a:t>
-            </a:r>
+                <a:solidFill>
+                  <a:srgbClr val="D4D4D4"/>
+                </a:solidFill>
+                <a:latin typeface="Consolas" panose="020B0609020204030204" pitchFamily="49" charset="0"/>
+              </a:rPr>
+              <a:t>({</a:t>
+            </a:r>
+          </a:p>
+          <a:p>
+            <a:pPr lvl="1"/>
             <a:r>
               <a:rPr lang="en-US" dirty="0">
-                <a:hlinkClick r:id="rId7"/>
-              </a:rPr>
-              <a:t>https://daveceddia.com/angular-2-in-plain-js</a:t>
-            </a:r>
-            <a:endParaRPr lang="en-US" dirty="0"/>
-          </a:p>
-          <a:p>
-            <a:r>
-              <a:rPr lang="en-US" dirty="0" smtClean="0"/>
-              <a:t>About </a:t>
-            </a:r>
-            <a:r>
-              <a:rPr lang="en-US" dirty="0"/>
-              <a:t>change detection: </a:t>
+                <a:solidFill>
+                  <a:srgbClr val="9CDCFE"/>
+                </a:solidFill>
+                <a:latin typeface="Consolas" panose="020B0609020204030204" pitchFamily="49" charset="0"/>
+              </a:rPr>
+              <a:t>declarations:</a:t>
             </a:r>
             <a:r>
               <a:rPr lang="en-US" dirty="0">
-                <a:hlinkClick r:id="rId8"/>
-              </a:rPr>
-              <a:t>https://</a:t>
+                <a:solidFill>
+                  <a:srgbClr val="D4D4D4"/>
+                </a:solidFill>
+                <a:latin typeface="Consolas" panose="020B0609020204030204" pitchFamily="49" charset="0"/>
+              </a:rPr>
+              <a:t> </a:t>
             </a:r>
             <a:r>
               <a:rPr lang="en-US" dirty="0" smtClean="0">
-                <a:hlinkClick r:id="rId8"/>
-              </a:rPr>
-              <a:t>blog.thoughtram.io/angular/2016/02/22/angular-2-change-detection-explained.html</a:t>
-            </a:r>
-            <a:endParaRPr lang="en-US" dirty="0" smtClean="0"/>
-          </a:p>
-          <a:p>
-            <a:r>
-              <a:rPr lang="en-US" dirty="0" smtClean="0"/>
-              <a:t>About </a:t>
-            </a:r>
-            <a:r>
-              <a:rPr lang="en-US" dirty="0" err="1" smtClean="0"/>
-              <a:t>ZoneJS</a:t>
-            </a:r>
-            <a:r>
-              <a:rPr lang="en-US" dirty="0"/>
-              <a:t>: </a:t>
-            </a:r>
+                <a:solidFill>
+                  <a:srgbClr val="D4D4D4"/>
+                </a:solidFill>
+                <a:latin typeface="Consolas" panose="020B0609020204030204" pitchFamily="49" charset="0"/>
+              </a:rPr>
+              <a:t>[ </a:t>
+            </a:r>
+            <a:r>
+              <a:rPr lang="en-US" dirty="0" err="1" smtClean="0">
+                <a:solidFill>
+                  <a:srgbClr val="9CDCFE"/>
+                </a:solidFill>
+                <a:latin typeface="Consolas" panose="020B0609020204030204" pitchFamily="49" charset="0"/>
+              </a:rPr>
+              <a:t>AppComponent</a:t>
+            </a:r>
+            <a:r>
+              <a:rPr lang="en-US" dirty="0" smtClean="0">
+                <a:solidFill>
+                  <a:srgbClr val="D4D4D4"/>
+                </a:solidFill>
+                <a:latin typeface="Consolas" panose="020B0609020204030204" pitchFamily="49" charset="0"/>
+              </a:rPr>
+              <a:t>, </a:t>
+            </a:r>
+            <a:r>
+              <a:rPr lang="en-US" dirty="0" err="1" smtClean="0">
+                <a:solidFill>
+                  <a:srgbClr val="9CDCFE"/>
+                </a:solidFill>
+                <a:latin typeface="Consolas" panose="020B0609020204030204" pitchFamily="49" charset="0"/>
+              </a:rPr>
+              <a:t>DemoCmpComponent</a:t>
+            </a:r>
+            <a:r>
+              <a:rPr lang="en-US" dirty="0" smtClean="0">
+                <a:solidFill>
+                  <a:srgbClr val="9CDCFE"/>
+                </a:solidFill>
+                <a:latin typeface="Consolas" panose="020B0609020204030204" pitchFamily="49" charset="0"/>
+              </a:rPr>
+              <a:t> </a:t>
+            </a:r>
+            <a:r>
+              <a:rPr lang="en-US" dirty="0" smtClean="0">
+                <a:solidFill>
+                  <a:srgbClr val="D4D4D4"/>
+                </a:solidFill>
+                <a:latin typeface="Consolas" panose="020B0609020204030204" pitchFamily="49" charset="0"/>
+              </a:rPr>
+              <a:t>],</a:t>
+            </a:r>
+            <a:endParaRPr lang="en-US" dirty="0">
+              <a:solidFill>
+                <a:srgbClr val="D4D4D4"/>
+              </a:solidFill>
+              <a:latin typeface="Consolas" panose="020B0609020204030204" pitchFamily="49" charset="0"/>
+            </a:endParaRPr>
+          </a:p>
+          <a:p>
+            <a:pPr lvl="1"/>
             <a:r>
               <a:rPr lang="en-US" dirty="0">
-                <a:hlinkClick r:id="rId9"/>
-              </a:rPr>
-              <a:t>https://</a:t>
+                <a:solidFill>
+                  <a:srgbClr val="9CDCFE"/>
+                </a:solidFill>
+                <a:latin typeface="Consolas" panose="020B0609020204030204" pitchFamily="49" charset="0"/>
+              </a:rPr>
+              <a:t>imports:</a:t>
+            </a:r>
+            <a:r>
+              <a:rPr lang="en-US" dirty="0">
+                <a:solidFill>
+                  <a:srgbClr val="D4D4D4"/>
+                </a:solidFill>
+                <a:latin typeface="Consolas" panose="020B0609020204030204" pitchFamily="49" charset="0"/>
+              </a:rPr>
+              <a:t> </a:t>
             </a:r>
             <a:r>
               <a:rPr lang="en-US" dirty="0" smtClean="0">
-                <a:hlinkClick r:id="rId9"/>
-              </a:rPr>
-              <a:t>github.com/angular/zone.js</a:t>
-            </a:r>
-            <a:endParaRPr lang="en-US" dirty="0" smtClean="0"/>
-          </a:p>
-          <a:p>
-            <a:endParaRPr lang="en-US" dirty="0"/>
+                <a:solidFill>
+                  <a:srgbClr val="D4D4D4"/>
+                </a:solidFill>
+                <a:latin typeface="Consolas" panose="020B0609020204030204" pitchFamily="49" charset="0"/>
+              </a:rPr>
+              <a:t>[</a:t>
+            </a:r>
+            <a:r>
+              <a:rPr lang="en-US" dirty="0" smtClean="0">
+                <a:solidFill>
+                  <a:srgbClr val="9CDCFE"/>
+                </a:solidFill>
+                <a:latin typeface="Consolas" panose="020B0609020204030204" pitchFamily="49" charset="0"/>
+              </a:rPr>
+              <a:t>	</a:t>
+            </a:r>
+            <a:r>
+              <a:rPr lang="en-US" dirty="0" err="1" smtClean="0">
+                <a:solidFill>
+                  <a:srgbClr val="9CDCFE"/>
+                </a:solidFill>
+                <a:latin typeface="Consolas" panose="020B0609020204030204" pitchFamily="49" charset="0"/>
+              </a:rPr>
+              <a:t>BrowserModule</a:t>
+            </a:r>
+            <a:r>
+              <a:rPr lang="en-US" dirty="0" smtClean="0">
+                <a:solidFill>
+                  <a:srgbClr val="D4D4D4"/>
+                </a:solidFill>
+                <a:latin typeface="Consolas" panose="020B0609020204030204" pitchFamily="49" charset="0"/>
+              </a:rPr>
+              <a:t>, </a:t>
+            </a:r>
+            <a:r>
+              <a:rPr lang="en-US" dirty="0" err="1" smtClean="0">
+                <a:solidFill>
+                  <a:srgbClr val="9CDCFE"/>
+                </a:solidFill>
+                <a:latin typeface="Consolas" panose="020B0609020204030204" pitchFamily="49" charset="0"/>
+              </a:rPr>
+              <a:t>HttpModule</a:t>
+            </a:r>
+            <a:r>
+              <a:rPr lang="en-US" dirty="0" smtClean="0">
+                <a:solidFill>
+                  <a:srgbClr val="9CDCFE"/>
+                </a:solidFill>
+                <a:latin typeface="Consolas" panose="020B0609020204030204" pitchFamily="49" charset="0"/>
+              </a:rPr>
+              <a:t> </a:t>
+            </a:r>
+            <a:r>
+              <a:rPr lang="en-US" dirty="0" smtClean="0">
+                <a:solidFill>
+                  <a:srgbClr val="D4D4D4"/>
+                </a:solidFill>
+                <a:latin typeface="Consolas" panose="020B0609020204030204" pitchFamily="49" charset="0"/>
+              </a:rPr>
+              <a:t>],</a:t>
+            </a:r>
+            <a:endParaRPr lang="en-US" dirty="0">
+              <a:solidFill>
+                <a:srgbClr val="D4D4D4"/>
+              </a:solidFill>
+              <a:latin typeface="Consolas" panose="020B0609020204030204" pitchFamily="49" charset="0"/>
+            </a:endParaRPr>
+          </a:p>
+          <a:p>
+            <a:pPr lvl="1"/>
+            <a:r>
+              <a:rPr lang="en-US" dirty="0">
+                <a:solidFill>
+                  <a:srgbClr val="608B4E"/>
+                </a:solidFill>
+                <a:latin typeface="Consolas" panose="020B0609020204030204" pitchFamily="49" charset="0"/>
+              </a:rPr>
+              <a:t>// exports: [],</a:t>
+            </a:r>
+            <a:endParaRPr lang="en-US" dirty="0">
+              <a:solidFill>
+                <a:srgbClr val="D4D4D4"/>
+              </a:solidFill>
+              <a:latin typeface="Consolas" panose="020B0609020204030204" pitchFamily="49" charset="0"/>
+            </a:endParaRPr>
+          </a:p>
+          <a:p>
+            <a:pPr lvl="1"/>
+            <a:r>
+              <a:rPr lang="en-US" dirty="0">
+                <a:solidFill>
+                  <a:srgbClr val="9CDCFE"/>
+                </a:solidFill>
+                <a:latin typeface="Consolas" panose="020B0609020204030204" pitchFamily="49" charset="0"/>
+              </a:rPr>
+              <a:t>providers:</a:t>
+            </a:r>
+            <a:r>
+              <a:rPr lang="en-US" dirty="0">
+                <a:solidFill>
+                  <a:srgbClr val="D4D4D4"/>
+                </a:solidFill>
+                <a:latin typeface="Consolas" panose="020B0609020204030204" pitchFamily="49" charset="0"/>
+              </a:rPr>
+              <a:t> [],</a:t>
+            </a:r>
+          </a:p>
+          <a:p>
+            <a:pPr lvl="1"/>
+            <a:r>
+              <a:rPr lang="en-US" dirty="0">
+                <a:solidFill>
+                  <a:srgbClr val="9CDCFE"/>
+                </a:solidFill>
+                <a:latin typeface="Consolas" panose="020B0609020204030204" pitchFamily="49" charset="0"/>
+              </a:rPr>
+              <a:t>bootstrap:</a:t>
+            </a:r>
+            <a:r>
+              <a:rPr lang="en-US" dirty="0">
+                <a:solidFill>
+                  <a:srgbClr val="D4D4D4"/>
+                </a:solidFill>
+                <a:latin typeface="Consolas" panose="020B0609020204030204" pitchFamily="49" charset="0"/>
+              </a:rPr>
+              <a:t> [</a:t>
+            </a:r>
+            <a:r>
+              <a:rPr lang="en-US" dirty="0" err="1">
+                <a:solidFill>
+                  <a:srgbClr val="9CDCFE"/>
+                </a:solidFill>
+                <a:latin typeface="Consolas" panose="020B0609020204030204" pitchFamily="49" charset="0"/>
+              </a:rPr>
+              <a:t>AppComponent</a:t>
+            </a:r>
+            <a:r>
+              <a:rPr lang="en-US" dirty="0">
+                <a:solidFill>
+                  <a:srgbClr val="D4D4D4"/>
+                </a:solidFill>
+                <a:latin typeface="Consolas" panose="020B0609020204030204" pitchFamily="49" charset="0"/>
+              </a:rPr>
+              <a:t>]</a:t>
+            </a:r>
+          </a:p>
+          <a:p>
+            <a:r>
+              <a:rPr lang="en-US" dirty="0">
+                <a:solidFill>
+                  <a:srgbClr val="D4D4D4"/>
+                </a:solidFill>
+                <a:latin typeface="Consolas" panose="020B0609020204030204" pitchFamily="49" charset="0"/>
+              </a:rPr>
+              <a:t>})</a:t>
+            </a:r>
+          </a:p>
+          <a:p>
+            <a:r>
+              <a:rPr lang="en-US" dirty="0">
+                <a:solidFill>
+                  <a:srgbClr val="C586C0"/>
+                </a:solidFill>
+                <a:latin typeface="Consolas" panose="020B0609020204030204" pitchFamily="49" charset="0"/>
+              </a:rPr>
+              <a:t>export</a:t>
+            </a:r>
+            <a:r>
+              <a:rPr lang="en-US" dirty="0">
+                <a:solidFill>
+                  <a:srgbClr val="D4D4D4"/>
+                </a:solidFill>
+                <a:latin typeface="Consolas" panose="020B0609020204030204" pitchFamily="49" charset="0"/>
+              </a:rPr>
+              <a:t> </a:t>
+            </a:r>
+            <a:r>
+              <a:rPr lang="en-US" dirty="0">
+                <a:solidFill>
+                  <a:srgbClr val="569CD6"/>
+                </a:solidFill>
+                <a:latin typeface="Consolas" panose="020B0609020204030204" pitchFamily="49" charset="0"/>
+              </a:rPr>
+              <a:t>class</a:t>
+            </a:r>
+            <a:r>
+              <a:rPr lang="en-US" dirty="0">
+                <a:solidFill>
+                  <a:srgbClr val="D4D4D4"/>
+                </a:solidFill>
+                <a:latin typeface="Consolas" panose="020B0609020204030204" pitchFamily="49" charset="0"/>
+              </a:rPr>
+              <a:t> </a:t>
+            </a:r>
+            <a:r>
+              <a:rPr lang="en-US" dirty="0" err="1">
+                <a:solidFill>
+                  <a:srgbClr val="4EC9B0"/>
+                </a:solidFill>
+                <a:latin typeface="Consolas" panose="020B0609020204030204" pitchFamily="49" charset="0"/>
+              </a:rPr>
+              <a:t>AppModule</a:t>
+            </a:r>
+            <a:r>
+              <a:rPr lang="en-US" dirty="0">
+                <a:solidFill>
+                  <a:srgbClr val="D4D4D4"/>
+                </a:solidFill>
+                <a:latin typeface="Consolas" panose="020B0609020204030204" pitchFamily="49" charset="0"/>
+              </a:rPr>
+              <a:t> { }</a:t>
+            </a:r>
+          </a:p>
+          <a:p>
+            <a:endParaRPr lang="en-US" b="0" dirty="0">
+              <a:solidFill>
+                <a:srgbClr val="D4D4D4"/>
+              </a:solidFill>
+              <a:effectLst/>
+              <a:latin typeface="Consolas" panose="020B0609020204030204" pitchFamily="49" charset="0"/>
+            </a:endParaRPr>
           </a:p>
         </p:txBody>
       </p:sp>
     </p:spTree>
     <p:extLst>
       <p:ext uri="{BB962C8B-B14F-4D97-AF65-F5344CB8AC3E}">
-        <p14:creationId xmlns:p14="http://schemas.microsoft.com/office/powerpoint/2010/main" val="3751561803"/>
+        <p14:creationId xmlns:p14="http://schemas.microsoft.com/office/powerpoint/2010/main" val="166430692"/>
+      </p:ext>
+    </p:extLst>
+  </p:cSld>
+  <p:clrMapOvr>
+    <a:masterClrMapping/>
+  </p:clrMapOvr>
+  <p:timing>
+    <p:tnLst>
+      <p:par>
+        <p:cTn id="1" dur="indefinite" restart="never" nodeType="tmRoot"/>
+      </p:par>
+    </p:tnLst>
+  </p:timing>
+</p:sld>
+</file>
+
+<file path=ppt/slides/slide9.xml><?xml version="1.0" encoding="utf-8"?>
+<p:sld xmlns:a="http://schemas.openxmlformats.org/drawingml/2006/main" xmlns:r="http://schemas.openxmlformats.org/officeDocument/2006/relationships" xmlns:p="http://schemas.openxmlformats.org/presentationml/2006/main">
+  <p:cSld>
+    <p:spTree>
+      <p:nvGrpSpPr>
+        <p:cNvPr id="1" name=""/>
+        <p:cNvGrpSpPr/>
+        <p:nvPr/>
+      </p:nvGrpSpPr>
+      <p:grpSpPr>
+        <a:xfrm>
+          <a:off x="0" y="0"/>
+          <a:ext cx="0" cy="0"/>
+          <a:chOff x="0" y="0"/>
+          <a:chExt cx="0" cy="0"/>
+        </a:xfrm>
+      </p:grpSpPr>
+      <p:sp>
+        <p:nvSpPr>
+          <p:cNvPr id="2" name="Title 1"/>
+          <p:cNvSpPr>
+            <a:spLocks noGrp="1"/>
+          </p:cNvSpPr>
+          <p:nvPr>
+            <p:ph type="title"/>
+          </p:nvPr>
+        </p:nvSpPr>
+        <p:spPr/>
+        <p:txBody>
+          <a:bodyPr/>
+          <a:lstStyle/>
+          <a:p>
+            <a:r>
+              <a:rPr lang="en-US" dirty="0" smtClean="0"/>
+              <a:t>Component</a:t>
+            </a:r>
+            <a:endParaRPr lang="en-US" dirty="0"/>
+          </a:p>
+        </p:txBody>
+      </p:sp>
+      <p:sp>
+        <p:nvSpPr>
+          <p:cNvPr id="7" name="TextBox 6"/>
+          <p:cNvSpPr txBox="1"/>
+          <p:nvPr/>
+        </p:nvSpPr>
+        <p:spPr>
+          <a:xfrm>
+            <a:off x="1385456" y="1644073"/>
+            <a:ext cx="8876144" cy="5078313"/>
+          </a:xfrm>
+          <a:prstGeom prst="rect">
+            <a:avLst/>
+          </a:prstGeom>
+          <a:solidFill>
+            <a:schemeClr val="bg1"/>
+          </a:solidFill>
+        </p:spPr>
+        <p:txBody>
+          <a:bodyPr wrap="square" rtlCol="0">
+            <a:spAutoFit/>
+          </a:bodyPr>
+          <a:lstStyle/>
+          <a:p>
+            <a:r>
+              <a:rPr lang="en-US" dirty="0">
+                <a:solidFill>
+                  <a:srgbClr val="C586C0"/>
+                </a:solidFill>
+                <a:latin typeface="Consolas" panose="020B0609020204030204" pitchFamily="49" charset="0"/>
+              </a:rPr>
+              <a:t>export</a:t>
+            </a:r>
+            <a:r>
+              <a:rPr lang="en-US" dirty="0">
+                <a:solidFill>
+                  <a:srgbClr val="D4D4D4"/>
+                </a:solidFill>
+                <a:latin typeface="Consolas" panose="020B0609020204030204" pitchFamily="49" charset="0"/>
+              </a:rPr>
+              <a:t> </a:t>
+            </a:r>
+            <a:r>
+              <a:rPr lang="en-US" dirty="0">
+                <a:solidFill>
+                  <a:srgbClr val="569CD6"/>
+                </a:solidFill>
+                <a:latin typeface="Consolas" panose="020B0609020204030204" pitchFamily="49" charset="0"/>
+              </a:rPr>
+              <a:t>class</a:t>
+            </a:r>
+            <a:r>
+              <a:rPr lang="en-US" dirty="0">
+                <a:solidFill>
+                  <a:srgbClr val="D4D4D4"/>
+                </a:solidFill>
+                <a:latin typeface="Consolas" panose="020B0609020204030204" pitchFamily="49" charset="0"/>
+              </a:rPr>
+              <a:t> </a:t>
+            </a:r>
+            <a:r>
+              <a:rPr lang="en-US" dirty="0" err="1">
+                <a:solidFill>
+                  <a:srgbClr val="4EC9B0"/>
+                </a:solidFill>
+                <a:latin typeface="Consolas" panose="020B0609020204030204" pitchFamily="49" charset="0"/>
+              </a:rPr>
+              <a:t>DemoCmpComponent</a:t>
+            </a:r>
+            <a:r>
+              <a:rPr lang="en-US" dirty="0">
+                <a:solidFill>
+                  <a:srgbClr val="D4D4D4"/>
+                </a:solidFill>
+                <a:latin typeface="Consolas" panose="020B0609020204030204" pitchFamily="49" charset="0"/>
+              </a:rPr>
+              <a:t> </a:t>
+            </a:r>
+            <a:r>
+              <a:rPr lang="en-US" dirty="0">
+                <a:solidFill>
+                  <a:srgbClr val="569CD6"/>
+                </a:solidFill>
+                <a:latin typeface="Consolas" panose="020B0609020204030204" pitchFamily="49" charset="0"/>
+              </a:rPr>
+              <a:t>implements</a:t>
+            </a:r>
+            <a:r>
+              <a:rPr lang="en-US" dirty="0">
+                <a:solidFill>
+                  <a:srgbClr val="D4D4D4"/>
+                </a:solidFill>
+                <a:latin typeface="Consolas" panose="020B0609020204030204" pitchFamily="49" charset="0"/>
+              </a:rPr>
+              <a:t> </a:t>
+            </a:r>
+            <a:r>
+              <a:rPr lang="en-US" dirty="0" err="1">
+                <a:solidFill>
+                  <a:srgbClr val="4EC9B0"/>
+                </a:solidFill>
+                <a:latin typeface="Consolas" panose="020B0609020204030204" pitchFamily="49" charset="0"/>
+              </a:rPr>
+              <a:t>ng</a:t>
+            </a:r>
+            <a:r>
+              <a:rPr lang="en-US" dirty="0" err="1">
+                <a:solidFill>
+                  <a:srgbClr val="D4D4D4"/>
+                </a:solidFill>
+                <a:latin typeface="Consolas" panose="020B0609020204030204" pitchFamily="49" charset="0"/>
+              </a:rPr>
+              <a:t>.</a:t>
+            </a:r>
+            <a:r>
+              <a:rPr lang="en-US" dirty="0" err="1">
+                <a:solidFill>
+                  <a:srgbClr val="4EC9B0"/>
+                </a:solidFill>
+                <a:latin typeface="Consolas" panose="020B0609020204030204" pitchFamily="49" charset="0"/>
+              </a:rPr>
+              <a:t>IComponentOptions</a:t>
+            </a:r>
+            <a:r>
+              <a:rPr lang="en-US" dirty="0">
+                <a:solidFill>
+                  <a:srgbClr val="D4D4D4"/>
+                </a:solidFill>
+                <a:latin typeface="Consolas" panose="020B0609020204030204" pitchFamily="49" charset="0"/>
+              </a:rPr>
+              <a:t> {</a:t>
+            </a:r>
+          </a:p>
+          <a:p>
+            <a:pPr lvl="1"/>
+            <a:r>
+              <a:rPr lang="en-US" dirty="0">
+                <a:solidFill>
+                  <a:srgbClr val="9CDCFE"/>
+                </a:solidFill>
+                <a:latin typeface="Consolas" panose="020B0609020204030204" pitchFamily="49" charset="0"/>
+              </a:rPr>
+              <a:t>template</a:t>
+            </a:r>
+            <a:r>
+              <a:rPr lang="en-US" dirty="0">
+                <a:solidFill>
+                  <a:srgbClr val="D4D4D4"/>
+                </a:solidFill>
+                <a:latin typeface="Consolas" panose="020B0609020204030204" pitchFamily="49" charset="0"/>
+              </a:rPr>
+              <a:t> = </a:t>
+            </a:r>
+            <a:r>
+              <a:rPr lang="en-US" dirty="0">
+                <a:solidFill>
+                  <a:srgbClr val="CE9178"/>
+                </a:solidFill>
+                <a:latin typeface="Consolas" panose="020B0609020204030204" pitchFamily="49" charset="0"/>
+              </a:rPr>
+              <a:t>'</a:t>
+            </a:r>
+            <a:r>
+              <a:rPr lang="en-US" dirty="0" smtClean="0">
+                <a:solidFill>
+                  <a:srgbClr val="CE9178"/>
+                </a:solidFill>
+                <a:latin typeface="Consolas" panose="020B0609020204030204" pitchFamily="49" charset="0"/>
+              </a:rPr>
+              <a:t>...'</a:t>
+            </a:r>
+            <a:r>
+              <a:rPr lang="en-US" dirty="0" smtClean="0">
+                <a:solidFill>
+                  <a:srgbClr val="D4D4D4"/>
+                </a:solidFill>
+                <a:latin typeface="Consolas" panose="020B0609020204030204" pitchFamily="49" charset="0"/>
+              </a:rPr>
+              <a:t>;</a:t>
+            </a:r>
+            <a:endParaRPr lang="en-US" dirty="0">
+              <a:solidFill>
+                <a:srgbClr val="D4D4D4"/>
+              </a:solidFill>
+              <a:latin typeface="Consolas" panose="020B0609020204030204" pitchFamily="49" charset="0"/>
+            </a:endParaRPr>
+          </a:p>
+          <a:p>
+            <a:pPr lvl="1"/>
+            <a:r>
+              <a:rPr lang="en-US" dirty="0">
+                <a:solidFill>
+                  <a:srgbClr val="9CDCFE"/>
+                </a:solidFill>
+                <a:latin typeface="Consolas" panose="020B0609020204030204" pitchFamily="49" charset="0"/>
+              </a:rPr>
+              <a:t>controller</a:t>
+            </a:r>
+            <a:r>
+              <a:rPr lang="en-US" dirty="0">
+                <a:solidFill>
+                  <a:srgbClr val="D4D4D4"/>
+                </a:solidFill>
+                <a:latin typeface="Consolas" panose="020B0609020204030204" pitchFamily="49" charset="0"/>
+              </a:rPr>
+              <a:t> = </a:t>
+            </a:r>
+            <a:r>
+              <a:rPr lang="en-US" dirty="0" err="1">
+                <a:solidFill>
+                  <a:srgbClr val="9CDCFE"/>
+                </a:solidFill>
+                <a:latin typeface="Consolas" panose="020B0609020204030204" pitchFamily="49" charset="0"/>
+              </a:rPr>
+              <a:t>DemoCmpController</a:t>
+            </a:r>
+            <a:r>
+              <a:rPr lang="en-US" dirty="0">
+                <a:solidFill>
+                  <a:srgbClr val="D4D4D4"/>
+                </a:solidFill>
+                <a:latin typeface="Consolas" panose="020B0609020204030204" pitchFamily="49" charset="0"/>
+              </a:rPr>
+              <a:t>;</a:t>
+            </a:r>
+          </a:p>
+          <a:p>
+            <a:pPr lvl="1"/>
+            <a:r>
+              <a:rPr lang="en-US" dirty="0" err="1">
+                <a:solidFill>
+                  <a:srgbClr val="9CDCFE"/>
+                </a:solidFill>
+                <a:latin typeface="Consolas" panose="020B0609020204030204" pitchFamily="49" charset="0"/>
+              </a:rPr>
+              <a:t>controllerAs</a:t>
+            </a:r>
+            <a:r>
+              <a:rPr lang="en-US" dirty="0">
+                <a:solidFill>
+                  <a:srgbClr val="D4D4D4"/>
+                </a:solidFill>
+                <a:latin typeface="Consolas" panose="020B0609020204030204" pitchFamily="49" charset="0"/>
+              </a:rPr>
+              <a:t> = </a:t>
+            </a:r>
+            <a:r>
+              <a:rPr lang="en-US" dirty="0">
+                <a:solidFill>
+                  <a:srgbClr val="CE9178"/>
+                </a:solidFill>
+                <a:latin typeface="Consolas" panose="020B0609020204030204" pitchFamily="49" charset="0"/>
+              </a:rPr>
+              <a:t>'$</a:t>
+            </a:r>
+            <a:r>
+              <a:rPr lang="en-US" dirty="0" err="1">
+                <a:solidFill>
+                  <a:srgbClr val="CE9178"/>
+                </a:solidFill>
+                <a:latin typeface="Consolas" panose="020B0609020204030204" pitchFamily="49" charset="0"/>
+              </a:rPr>
+              <a:t>demoCmpCtrl</a:t>
+            </a:r>
+            <a:r>
+              <a:rPr lang="en-US" dirty="0">
+                <a:solidFill>
+                  <a:srgbClr val="CE9178"/>
+                </a:solidFill>
+                <a:latin typeface="Consolas" panose="020B0609020204030204" pitchFamily="49" charset="0"/>
+              </a:rPr>
+              <a:t>'</a:t>
+            </a:r>
+            <a:r>
+              <a:rPr lang="en-US" dirty="0">
+                <a:solidFill>
+                  <a:srgbClr val="D4D4D4"/>
+                </a:solidFill>
+                <a:latin typeface="Consolas" panose="020B0609020204030204" pitchFamily="49" charset="0"/>
+              </a:rPr>
+              <a:t>;</a:t>
+            </a:r>
+          </a:p>
+          <a:p>
+            <a:pPr lvl="1"/>
+            <a:r>
+              <a:rPr lang="en-US" dirty="0">
+                <a:solidFill>
+                  <a:srgbClr val="9CDCFE"/>
+                </a:solidFill>
+                <a:latin typeface="Consolas" panose="020B0609020204030204" pitchFamily="49" charset="0"/>
+              </a:rPr>
+              <a:t>bindings</a:t>
+            </a:r>
+            <a:r>
+              <a:rPr lang="en-US" dirty="0">
+                <a:solidFill>
+                  <a:srgbClr val="D4D4D4"/>
+                </a:solidFill>
+                <a:latin typeface="Consolas" panose="020B0609020204030204" pitchFamily="49" charset="0"/>
+              </a:rPr>
+              <a:t> = </a:t>
+            </a:r>
+            <a:r>
+              <a:rPr lang="en-US" dirty="0" smtClean="0">
+                <a:solidFill>
+                  <a:srgbClr val="D4D4D4"/>
+                </a:solidFill>
+                <a:latin typeface="Consolas" panose="020B0609020204030204" pitchFamily="49" charset="0"/>
+              </a:rPr>
+              <a:t>{ </a:t>
+            </a:r>
+            <a:r>
+              <a:rPr lang="en-US" dirty="0" smtClean="0">
+                <a:solidFill>
+                  <a:srgbClr val="9CDCFE"/>
+                </a:solidFill>
+                <a:latin typeface="Consolas" panose="020B0609020204030204" pitchFamily="49" charset="0"/>
+              </a:rPr>
+              <a:t>greeting</a:t>
+            </a:r>
+            <a:r>
+              <a:rPr lang="en-US" dirty="0">
+                <a:solidFill>
+                  <a:srgbClr val="9CDCFE"/>
+                </a:solidFill>
+                <a:latin typeface="Consolas" panose="020B0609020204030204" pitchFamily="49" charset="0"/>
+              </a:rPr>
+              <a:t>:</a:t>
+            </a:r>
+            <a:r>
+              <a:rPr lang="en-US" dirty="0">
+                <a:solidFill>
+                  <a:srgbClr val="D4D4D4"/>
+                </a:solidFill>
+                <a:latin typeface="Consolas" panose="020B0609020204030204" pitchFamily="49" charset="0"/>
+              </a:rPr>
+              <a:t> </a:t>
+            </a:r>
+            <a:r>
+              <a:rPr lang="en-US" dirty="0" smtClean="0">
+                <a:solidFill>
+                  <a:srgbClr val="CE9178"/>
+                </a:solidFill>
+                <a:latin typeface="Consolas" panose="020B0609020204030204" pitchFamily="49" charset="0"/>
+              </a:rPr>
+              <a:t>'@</a:t>
+            </a:r>
+            <a:r>
+              <a:rPr lang="en-US" dirty="0">
+                <a:solidFill>
+                  <a:srgbClr val="CE9178"/>
+                </a:solidFill>
+                <a:latin typeface="Consolas" panose="020B0609020204030204" pitchFamily="49" charset="0"/>
+              </a:rPr>
+              <a:t>'</a:t>
+            </a:r>
+            <a:r>
+              <a:rPr lang="en-US" dirty="0" smtClean="0">
+                <a:solidFill>
+                  <a:srgbClr val="CE9178"/>
+                </a:solidFill>
+                <a:latin typeface="Consolas" panose="020B0609020204030204" pitchFamily="49" charset="0"/>
+              </a:rPr>
+              <a:t> </a:t>
+            </a:r>
+            <a:r>
+              <a:rPr lang="en-US" dirty="0" smtClean="0">
+                <a:solidFill>
+                  <a:srgbClr val="D4D4D4"/>
+                </a:solidFill>
+                <a:latin typeface="Consolas" panose="020B0609020204030204" pitchFamily="49" charset="0"/>
+              </a:rPr>
+              <a:t>};</a:t>
+            </a:r>
+            <a:endParaRPr lang="en-US" dirty="0">
+              <a:solidFill>
+                <a:srgbClr val="D4D4D4"/>
+              </a:solidFill>
+              <a:latin typeface="Consolas" panose="020B0609020204030204" pitchFamily="49" charset="0"/>
+            </a:endParaRPr>
+          </a:p>
+          <a:p>
+            <a:r>
+              <a:rPr lang="en-US" dirty="0" smtClean="0">
+                <a:solidFill>
+                  <a:srgbClr val="D4D4D4"/>
+                </a:solidFill>
+                <a:latin typeface="Consolas" panose="020B0609020204030204" pitchFamily="49" charset="0"/>
+              </a:rPr>
+              <a:t>}</a:t>
+            </a:r>
+            <a:endParaRPr lang="en-US" b="0" dirty="0">
+              <a:solidFill>
+                <a:srgbClr val="D4D4D4"/>
+              </a:solidFill>
+              <a:effectLst/>
+              <a:latin typeface="Consolas" panose="020B0609020204030204" pitchFamily="49" charset="0"/>
+            </a:endParaRPr>
+          </a:p>
+          <a:p>
+            <a:r>
+              <a:rPr lang="en-US" dirty="0">
+                <a:solidFill>
+                  <a:srgbClr val="569CD6"/>
+                </a:solidFill>
+                <a:latin typeface="Consolas" panose="020B0609020204030204" pitchFamily="49" charset="0"/>
+              </a:rPr>
+              <a:t>class</a:t>
+            </a:r>
+            <a:r>
+              <a:rPr lang="en-US" dirty="0">
+                <a:solidFill>
+                  <a:srgbClr val="D4D4D4"/>
+                </a:solidFill>
+                <a:latin typeface="Consolas" panose="020B0609020204030204" pitchFamily="49" charset="0"/>
+              </a:rPr>
+              <a:t> </a:t>
+            </a:r>
+            <a:r>
+              <a:rPr lang="en-US" dirty="0" err="1">
+                <a:solidFill>
+                  <a:srgbClr val="4EC9B0"/>
+                </a:solidFill>
+                <a:latin typeface="Consolas" panose="020B0609020204030204" pitchFamily="49" charset="0"/>
+              </a:rPr>
+              <a:t>DemoCmpController</a:t>
+            </a:r>
+            <a:r>
+              <a:rPr lang="en-US" dirty="0">
+                <a:solidFill>
+                  <a:srgbClr val="D4D4D4"/>
+                </a:solidFill>
+                <a:latin typeface="Consolas" panose="020B0609020204030204" pitchFamily="49" charset="0"/>
+              </a:rPr>
+              <a:t> </a:t>
+            </a:r>
+            <a:r>
+              <a:rPr lang="en-US" dirty="0">
+                <a:solidFill>
+                  <a:srgbClr val="569CD6"/>
+                </a:solidFill>
+                <a:latin typeface="Consolas" panose="020B0609020204030204" pitchFamily="49" charset="0"/>
+              </a:rPr>
+              <a:t>implements</a:t>
+            </a:r>
+            <a:r>
+              <a:rPr lang="en-US" dirty="0">
+                <a:solidFill>
+                  <a:srgbClr val="D4D4D4"/>
+                </a:solidFill>
+                <a:latin typeface="Consolas" panose="020B0609020204030204" pitchFamily="49" charset="0"/>
+              </a:rPr>
+              <a:t> </a:t>
+            </a:r>
+            <a:r>
+              <a:rPr lang="en-US" dirty="0" err="1">
+                <a:solidFill>
+                  <a:srgbClr val="4EC9B0"/>
+                </a:solidFill>
+                <a:latin typeface="Consolas" panose="020B0609020204030204" pitchFamily="49" charset="0"/>
+              </a:rPr>
+              <a:t>ng</a:t>
+            </a:r>
+            <a:r>
+              <a:rPr lang="en-US" dirty="0" err="1">
+                <a:solidFill>
+                  <a:srgbClr val="D4D4D4"/>
+                </a:solidFill>
+                <a:latin typeface="Consolas" panose="020B0609020204030204" pitchFamily="49" charset="0"/>
+              </a:rPr>
+              <a:t>.</a:t>
+            </a:r>
+            <a:r>
+              <a:rPr lang="en-US" dirty="0" err="1">
+                <a:solidFill>
+                  <a:srgbClr val="4EC9B0"/>
+                </a:solidFill>
+                <a:latin typeface="Consolas" panose="020B0609020204030204" pitchFamily="49" charset="0"/>
+              </a:rPr>
+              <a:t>IComponentController</a:t>
+            </a:r>
+            <a:r>
+              <a:rPr lang="en-US" dirty="0">
+                <a:solidFill>
+                  <a:srgbClr val="D4D4D4"/>
+                </a:solidFill>
+                <a:latin typeface="Consolas" panose="020B0609020204030204" pitchFamily="49" charset="0"/>
+              </a:rPr>
+              <a:t> {</a:t>
+            </a:r>
+          </a:p>
+          <a:p>
+            <a:r>
+              <a:rPr lang="en-US" dirty="0" smtClean="0">
+                <a:solidFill>
+                  <a:srgbClr val="569CD6"/>
+                </a:solidFill>
+                <a:latin typeface="Consolas" panose="020B0609020204030204" pitchFamily="49" charset="0"/>
+              </a:rPr>
+              <a:t>	static</a:t>
+            </a:r>
+            <a:r>
+              <a:rPr lang="en-US" dirty="0" smtClean="0">
+                <a:solidFill>
+                  <a:srgbClr val="D4D4D4"/>
+                </a:solidFill>
+                <a:latin typeface="Consolas" panose="020B0609020204030204" pitchFamily="49" charset="0"/>
+              </a:rPr>
+              <a:t> </a:t>
+            </a:r>
+            <a:r>
+              <a:rPr lang="en-US" dirty="0">
+                <a:solidFill>
+                  <a:srgbClr val="9CDCFE"/>
+                </a:solidFill>
+                <a:latin typeface="Consolas" panose="020B0609020204030204" pitchFamily="49" charset="0"/>
+              </a:rPr>
+              <a:t>$inject</a:t>
+            </a:r>
+            <a:r>
+              <a:rPr lang="en-US" dirty="0">
+                <a:solidFill>
+                  <a:srgbClr val="D4D4D4"/>
+                </a:solidFill>
+                <a:latin typeface="Consolas" panose="020B0609020204030204" pitchFamily="49" charset="0"/>
+              </a:rPr>
+              <a:t> = [</a:t>
+            </a:r>
+            <a:r>
+              <a:rPr lang="en-US" dirty="0">
+                <a:solidFill>
+                  <a:srgbClr val="CE9178"/>
+                </a:solidFill>
+                <a:latin typeface="Consolas" panose="020B0609020204030204" pitchFamily="49" charset="0"/>
+              </a:rPr>
+              <a:t>'$window'</a:t>
+            </a:r>
+            <a:r>
+              <a:rPr lang="en-US" dirty="0">
+                <a:solidFill>
+                  <a:srgbClr val="D4D4D4"/>
+                </a:solidFill>
+                <a:latin typeface="Consolas" panose="020B0609020204030204" pitchFamily="49" charset="0"/>
+              </a:rPr>
+              <a:t>];</a:t>
+            </a:r>
+          </a:p>
+          <a:p>
+            <a:r>
+              <a:rPr lang="en-US" dirty="0" smtClean="0">
+                <a:solidFill>
+                  <a:srgbClr val="9CDCFE"/>
+                </a:solidFill>
+                <a:latin typeface="Consolas" panose="020B0609020204030204" pitchFamily="49" charset="0"/>
+              </a:rPr>
+              <a:t>	title</a:t>
+            </a:r>
+            <a:r>
+              <a:rPr lang="en-US" dirty="0" smtClean="0">
+                <a:solidFill>
+                  <a:srgbClr val="D4D4D4"/>
+                </a:solidFill>
+                <a:latin typeface="Consolas" panose="020B0609020204030204" pitchFamily="49" charset="0"/>
+              </a:rPr>
+              <a:t> </a:t>
+            </a:r>
+            <a:r>
+              <a:rPr lang="en-US" dirty="0">
+                <a:solidFill>
+                  <a:srgbClr val="D4D4D4"/>
+                </a:solidFill>
+                <a:latin typeface="Consolas" panose="020B0609020204030204" pitchFamily="49" charset="0"/>
+              </a:rPr>
+              <a:t>= </a:t>
+            </a:r>
+            <a:r>
+              <a:rPr lang="en-US" dirty="0">
+                <a:solidFill>
+                  <a:srgbClr val="CE9178"/>
+                </a:solidFill>
+                <a:latin typeface="Consolas" panose="020B0609020204030204" pitchFamily="49" charset="0"/>
+              </a:rPr>
+              <a:t>'World'</a:t>
+            </a:r>
+            <a:r>
+              <a:rPr lang="en-US" dirty="0">
+                <a:solidFill>
+                  <a:srgbClr val="D4D4D4"/>
+                </a:solidFill>
+                <a:latin typeface="Consolas" panose="020B0609020204030204" pitchFamily="49" charset="0"/>
+              </a:rPr>
+              <a:t>;</a:t>
+            </a:r>
+          </a:p>
+          <a:p>
+            <a:r>
+              <a:rPr lang="en-US" dirty="0" smtClean="0">
+                <a:solidFill>
+                  <a:srgbClr val="569CD6"/>
+                </a:solidFill>
+                <a:latin typeface="Consolas" panose="020B0609020204030204" pitchFamily="49" charset="0"/>
+              </a:rPr>
+              <a:t>	constructor</a:t>
+            </a:r>
+            <a:r>
+              <a:rPr lang="en-US" dirty="0" smtClean="0">
+                <a:solidFill>
+                  <a:srgbClr val="D4D4D4"/>
+                </a:solidFill>
+                <a:latin typeface="Consolas" panose="020B0609020204030204" pitchFamily="49" charset="0"/>
+              </a:rPr>
+              <a:t>(</a:t>
+            </a:r>
+            <a:r>
+              <a:rPr lang="en-US" dirty="0" smtClean="0">
+                <a:solidFill>
+                  <a:srgbClr val="569CD6"/>
+                </a:solidFill>
+                <a:latin typeface="Consolas" panose="020B0609020204030204" pitchFamily="49" charset="0"/>
+              </a:rPr>
+              <a:t>public</a:t>
+            </a:r>
+            <a:r>
+              <a:rPr lang="en-US" dirty="0" smtClean="0">
+                <a:solidFill>
+                  <a:srgbClr val="D4D4D4"/>
+                </a:solidFill>
+                <a:latin typeface="Consolas" panose="020B0609020204030204" pitchFamily="49" charset="0"/>
+              </a:rPr>
+              <a:t> </a:t>
+            </a:r>
+            <a:r>
+              <a:rPr lang="en-US" dirty="0">
+                <a:solidFill>
+                  <a:srgbClr val="9CDCFE"/>
+                </a:solidFill>
+                <a:latin typeface="Consolas" panose="020B0609020204030204" pitchFamily="49" charset="0"/>
+              </a:rPr>
+              <a:t>window</a:t>
+            </a:r>
+            <a:r>
+              <a:rPr lang="en-US" dirty="0">
+                <a:solidFill>
+                  <a:srgbClr val="D4D4D4"/>
+                </a:solidFill>
+                <a:latin typeface="Consolas" panose="020B0609020204030204" pitchFamily="49" charset="0"/>
+              </a:rPr>
+              <a:t>: </a:t>
+            </a:r>
+            <a:r>
+              <a:rPr lang="en-US" dirty="0" err="1">
+                <a:solidFill>
+                  <a:srgbClr val="4EC9B0"/>
+                </a:solidFill>
+                <a:latin typeface="Consolas" panose="020B0609020204030204" pitchFamily="49" charset="0"/>
+              </a:rPr>
+              <a:t>ng</a:t>
+            </a:r>
+            <a:r>
+              <a:rPr lang="en-US" dirty="0" err="1">
+                <a:solidFill>
+                  <a:srgbClr val="D4D4D4"/>
+                </a:solidFill>
+                <a:latin typeface="Consolas" panose="020B0609020204030204" pitchFamily="49" charset="0"/>
+              </a:rPr>
+              <a:t>.</a:t>
+            </a:r>
+            <a:r>
+              <a:rPr lang="en-US" dirty="0" err="1">
+                <a:solidFill>
+                  <a:srgbClr val="4EC9B0"/>
+                </a:solidFill>
+                <a:latin typeface="Consolas" panose="020B0609020204030204" pitchFamily="49" charset="0"/>
+              </a:rPr>
+              <a:t>IWindowService</a:t>
+            </a:r>
+            <a:r>
+              <a:rPr lang="en-US" dirty="0">
+                <a:solidFill>
+                  <a:srgbClr val="D4D4D4"/>
+                </a:solidFill>
+                <a:latin typeface="Consolas" panose="020B0609020204030204" pitchFamily="49" charset="0"/>
+              </a:rPr>
+              <a:t>) {}</a:t>
+            </a:r>
+          </a:p>
+          <a:p>
+            <a:r>
+              <a:rPr lang="en-US" dirty="0" smtClean="0">
+                <a:solidFill>
+                  <a:srgbClr val="DCDCAA"/>
+                </a:solidFill>
+                <a:latin typeface="Consolas" panose="020B0609020204030204" pitchFamily="49" charset="0"/>
+              </a:rPr>
+              <a:t>	$</a:t>
+            </a:r>
+            <a:r>
+              <a:rPr lang="en-US" dirty="0" err="1">
+                <a:solidFill>
+                  <a:srgbClr val="DCDCAA"/>
+                </a:solidFill>
+                <a:latin typeface="Consolas" panose="020B0609020204030204" pitchFamily="49" charset="0"/>
+              </a:rPr>
+              <a:t>onInit</a:t>
+            </a:r>
+            <a:r>
+              <a:rPr lang="en-US" dirty="0">
+                <a:solidFill>
+                  <a:srgbClr val="D4D4D4"/>
+                </a:solidFill>
+                <a:latin typeface="Consolas" panose="020B0609020204030204" pitchFamily="49" charset="0"/>
+              </a:rPr>
+              <a:t>() </a:t>
+            </a:r>
+            <a:r>
+              <a:rPr lang="en-US" dirty="0" smtClean="0">
+                <a:solidFill>
+                  <a:srgbClr val="D4D4D4"/>
+                </a:solidFill>
+                <a:latin typeface="Consolas" panose="020B0609020204030204" pitchFamily="49" charset="0"/>
+              </a:rPr>
+              <a:t>{ }</a:t>
+            </a:r>
+            <a:endParaRPr lang="en-US" dirty="0">
+              <a:solidFill>
+                <a:srgbClr val="D4D4D4"/>
+              </a:solidFill>
+              <a:latin typeface="Consolas" panose="020B0609020204030204" pitchFamily="49" charset="0"/>
+            </a:endParaRPr>
+          </a:p>
+          <a:p>
+            <a:r>
+              <a:rPr lang="en-US" dirty="0" smtClean="0">
+                <a:solidFill>
+                  <a:srgbClr val="DCDCAA"/>
+                </a:solidFill>
+                <a:latin typeface="Consolas" panose="020B0609020204030204" pitchFamily="49" charset="0"/>
+              </a:rPr>
+              <a:t>	$</a:t>
+            </a:r>
+            <a:r>
+              <a:rPr lang="en-US" dirty="0" err="1">
+                <a:solidFill>
+                  <a:srgbClr val="DCDCAA"/>
+                </a:solidFill>
+                <a:latin typeface="Consolas" panose="020B0609020204030204" pitchFamily="49" charset="0"/>
+              </a:rPr>
+              <a:t>onDestroy</a:t>
+            </a:r>
+            <a:r>
+              <a:rPr lang="en-US" dirty="0">
+                <a:solidFill>
+                  <a:srgbClr val="D4D4D4"/>
+                </a:solidFill>
+                <a:latin typeface="Consolas" panose="020B0609020204030204" pitchFamily="49" charset="0"/>
+              </a:rPr>
+              <a:t>() </a:t>
+            </a:r>
+            <a:r>
+              <a:rPr lang="en-US" dirty="0" smtClean="0">
+                <a:solidFill>
+                  <a:srgbClr val="D4D4D4"/>
+                </a:solidFill>
+                <a:latin typeface="Consolas" panose="020B0609020204030204" pitchFamily="49" charset="0"/>
+              </a:rPr>
+              <a:t>{ }</a:t>
+            </a:r>
+            <a:endParaRPr lang="en-US" dirty="0">
+              <a:solidFill>
+                <a:srgbClr val="D4D4D4"/>
+              </a:solidFill>
+              <a:latin typeface="Consolas" panose="020B0609020204030204" pitchFamily="49" charset="0"/>
+            </a:endParaRPr>
+          </a:p>
+          <a:p>
+            <a:r>
+              <a:rPr lang="en-US" dirty="0" smtClean="0">
+                <a:solidFill>
+                  <a:srgbClr val="D4D4D4"/>
+                </a:solidFill>
+                <a:latin typeface="Consolas" panose="020B0609020204030204" pitchFamily="49" charset="0"/>
+              </a:rPr>
+              <a:t>}</a:t>
+            </a:r>
+          </a:p>
+          <a:p>
+            <a:r>
+              <a:rPr lang="en-US" dirty="0" err="1">
+                <a:solidFill>
+                  <a:srgbClr val="9CDCFE"/>
+                </a:solidFill>
+                <a:latin typeface="Consolas" panose="020B0609020204030204" pitchFamily="49" charset="0"/>
+              </a:rPr>
+              <a:t>ng</a:t>
+            </a:r>
+            <a:r>
+              <a:rPr lang="en-US" dirty="0" err="1">
+                <a:solidFill>
+                  <a:srgbClr val="D4D4D4"/>
+                </a:solidFill>
+                <a:latin typeface="Consolas" panose="020B0609020204030204" pitchFamily="49" charset="0"/>
+              </a:rPr>
+              <a:t>.</a:t>
+            </a:r>
+            <a:r>
+              <a:rPr lang="en-US" dirty="0" err="1">
+                <a:solidFill>
+                  <a:srgbClr val="DCDCAA"/>
+                </a:solidFill>
+                <a:latin typeface="Consolas" panose="020B0609020204030204" pitchFamily="49" charset="0"/>
+              </a:rPr>
+              <a:t>module</a:t>
+            </a:r>
+            <a:r>
+              <a:rPr lang="en-US" dirty="0">
+                <a:solidFill>
+                  <a:srgbClr val="D4D4D4"/>
+                </a:solidFill>
+                <a:latin typeface="Consolas" panose="020B0609020204030204" pitchFamily="49" charset="0"/>
+              </a:rPr>
+              <a:t>(</a:t>
+            </a:r>
+            <a:r>
+              <a:rPr lang="en-US" dirty="0">
+                <a:solidFill>
+                  <a:srgbClr val="CE9178"/>
+                </a:solidFill>
+                <a:latin typeface="Consolas" panose="020B0609020204030204" pitchFamily="49" charset="0"/>
+              </a:rPr>
+              <a:t>'demo'</a:t>
+            </a:r>
+            <a:r>
+              <a:rPr lang="en-US" dirty="0">
+                <a:solidFill>
+                  <a:srgbClr val="D4D4D4"/>
+                </a:solidFill>
+                <a:latin typeface="Consolas" panose="020B0609020204030204" pitchFamily="49" charset="0"/>
+              </a:rPr>
+              <a:t>, [])</a:t>
+            </a:r>
+          </a:p>
+          <a:p>
+            <a:r>
+              <a:rPr lang="en-US" dirty="0" smtClean="0">
+                <a:solidFill>
+                  <a:srgbClr val="D4D4D4"/>
+                </a:solidFill>
+                <a:latin typeface="Consolas" panose="020B0609020204030204" pitchFamily="49" charset="0"/>
+              </a:rPr>
+              <a:t>	.</a:t>
+            </a:r>
+            <a:r>
+              <a:rPr lang="en-US" dirty="0">
+                <a:solidFill>
+                  <a:srgbClr val="DCDCAA"/>
+                </a:solidFill>
+                <a:latin typeface="Consolas" panose="020B0609020204030204" pitchFamily="49" charset="0"/>
+              </a:rPr>
+              <a:t>component</a:t>
+            </a:r>
+            <a:r>
+              <a:rPr lang="en-US" dirty="0">
+                <a:solidFill>
+                  <a:srgbClr val="D4D4D4"/>
+                </a:solidFill>
+                <a:latin typeface="Consolas" panose="020B0609020204030204" pitchFamily="49" charset="0"/>
+              </a:rPr>
+              <a:t>(</a:t>
+            </a:r>
+            <a:r>
+              <a:rPr lang="en-US" dirty="0">
+                <a:solidFill>
+                  <a:srgbClr val="CE9178"/>
+                </a:solidFill>
+                <a:latin typeface="Consolas" panose="020B0609020204030204" pitchFamily="49" charset="0"/>
+              </a:rPr>
+              <a:t>'</a:t>
+            </a:r>
+            <a:r>
+              <a:rPr lang="en-US" dirty="0" err="1">
+                <a:solidFill>
+                  <a:srgbClr val="CE9178"/>
+                </a:solidFill>
+                <a:latin typeface="Consolas" panose="020B0609020204030204" pitchFamily="49" charset="0"/>
+              </a:rPr>
+              <a:t>demoCmpOld</a:t>
+            </a:r>
+            <a:r>
+              <a:rPr lang="en-US" dirty="0">
+                <a:solidFill>
+                  <a:srgbClr val="CE9178"/>
+                </a:solidFill>
+                <a:latin typeface="Consolas" panose="020B0609020204030204" pitchFamily="49" charset="0"/>
+              </a:rPr>
+              <a:t>'</a:t>
+            </a:r>
+            <a:r>
+              <a:rPr lang="en-US" dirty="0">
+                <a:solidFill>
+                  <a:srgbClr val="D4D4D4"/>
+                </a:solidFill>
+                <a:latin typeface="Consolas" panose="020B0609020204030204" pitchFamily="49" charset="0"/>
+              </a:rPr>
+              <a:t>, </a:t>
+            </a:r>
+            <a:r>
+              <a:rPr lang="en-US" dirty="0">
+                <a:solidFill>
+                  <a:srgbClr val="569CD6"/>
+                </a:solidFill>
+                <a:latin typeface="Consolas" panose="020B0609020204030204" pitchFamily="49" charset="0"/>
+              </a:rPr>
+              <a:t>new</a:t>
+            </a:r>
+            <a:r>
+              <a:rPr lang="en-US" dirty="0">
+                <a:solidFill>
+                  <a:srgbClr val="D4D4D4"/>
+                </a:solidFill>
+                <a:latin typeface="Consolas" panose="020B0609020204030204" pitchFamily="49" charset="0"/>
+              </a:rPr>
+              <a:t> </a:t>
+            </a:r>
+            <a:r>
+              <a:rPr lang="en-US" dirty="0" err="1">
+                <a:solidFill>
+                  <a:srgbClr val="4EC9B0"/>
+                </a:solidFill>
+                <a:latin typeface="Consolas" panose="020B0609020204030204" pitchFamily="49" charset="0"/>
+              </a:rPr>
+              <a:t>OldDemoCmpComponent</a:t>
+            </a:r>
+            <a:r>
+              <a:rPr lang="en-US" dirty="0" smtClean="0">
+                <a:solidFill>
+                  <a:srgbClr val="D4D4D4"/>
+                </a:solidFill>
+                <a:latin typeface="Consolas" panose="020B0609020204030204" pitchFamily="49" charset="0"/>
+              </a:rPr>
+              <a:t>());</a:t>
+            </a:r>
+          </a:p>
+          <a:p>
+            <a:r>
+              <a:rPr lang="en-US" smtClean="0">
+                <a:solidFill>
+                  <a:srgbClr val="D4D4D4"/>
+                </a:solidFill>
+                <a:latin typeface="Consolas" panose="020B0609020204030204" pitchFamily="49" charset="0"/>
+              </a:rPr>
+              <a:t>// HTML</a:t>
+            </a:r>
+            <a:endParaRPr lang="en-US" dirty="0" smtClean="0">
+              <a:solidFill>
+                <a:srgbClr val="D4D4D4"/>
+              </a:solidFill>
+              <a:latin typeface="Consolas" panose="020B0609020204030204" pitchFamily="49" charset="0"/>
+            </a:endParaRPr>
+          </a:p>
+          <a:p>
+            <a:r>
+              <a:rPr lang="en-US" smtClean="0">
+                <a:solidFill>
+                  <a:srgbClr val="808080"/>
+                </a:solidFill>
+                <a:latin typeface="Consolas" panose="020B0609020204030204" pitchFamily="49" charset="0"/>
+              </a:rPr>
+              <a:t>&lt;</a:t>
+            </a:r>
+            <a:r>
+              <a:rPr lang="en-US" smtClean="0">
+                <a:solidFill>
+                  <a:srgbClr val="569CD6"/>
+                </a:solidFill>
+                <a:latin typeface="Consolas" panose="020B0609020204030204" pitchFamily="49" charset="0"/>
+              </a:rPr>
+              <a:t>demo-</a:t>
+            </a:r>
+            <a:r>
+              <a:rPr lang="en-US" dirty="0" err="1" smtClean="0">
+                <a:solidFill>
+                  <a:srgbClr val="569CD6"/>
+                </a:solidFill>
+                <a:latin typeface="Consolas" panose="020B0609020204030204" pitchFamily="49" charset="0"/>
+              </a:rPr>
+              <a:t>cmp</a:t>
+            </a:r>
+            <a:r>
+              <a:rPr lang="en-US" dirty="0" smtClean="0">
+                <a:solidFill>
+                  <a:srgbClr val="569CD6"/>
+                </a:solidFill>
+                <a:latin typeface="Consolas" panose="020B0609020204030204" pitchFamily="49" charset="0"/>
+              </a:rPr>
+              <a:t>-old</a:t>
+            </a:r>
+            <a:r>
+              <a:rPr lang="en-US" dirty="0" smtClean="0">
+                <a:solidFill>
+                  <a:srgbClr val="D4D4D4"/>
+                </a:solidFill>
+                <a:latin typeface="Consolas" panose="020B0609020204030204" pitchFamily="49" charset="0"/>
+              </a:rPr>
+              <a:t> </a:t>
+            </a:r>
+            <a:r>
+              <a:rPr lang="en-US" dirty="0">
+                <a:solidFill>
+                  <a:srgbClr val="9CDCFE"/>
+                </a:solidFill>
+                <a:latin typeface="Consolas" panose="020B0609020204030204" pitchFamily="49" charset="0"/>
+              </a:rPr>
+              <a:t>greeting</a:t>
+            </a:r>
+            <a:r>
+              <a:rPr lang="en-US" dirty="0">
+                <a:solidFill>
+                  <a:srgbClr val="D4D4D4"/>
+                </a:solidFill>
+                <a:latin typeface="Consolas" panose="020B0609020204030204" pitchFamily="49" charset="0"/>
+              </a:rPr>
+              <a:t>=</a:t>
+            </a:r>
+            <a:r>
+              <a:rPr lang="en-US" dirty="0">
+                <a:solidFill>
+                  <a:srgbClr val="CE9178"/>
+                </a:solidFill>
+                <a:latin typeface="Consolas" panose="020B0609020204030204" pitchFamily="49" charset="0"/>
+              </a:rPr>
+              <a:t>"Hello"</a:t>
+            </a:r>
+            <a:r>
+              <a:rPr lang="en-US" dirty="0">
+                <a:solidFill>
+                  <a:srgbClr val="808080"/>
+                </a:solidFill>
+                <a:latin typeface="Consolas" panose="020B0609020204030204" pitchFamily="49" charset="0"/>
+              </a:rPr>
+              <a:t>&gt;&lt;/</a:t>
+            </a:r>
+            <a:r>
+              <a:rPr lang="en-US" dirty="0">
+                <a:solidFill>
+                  <a:srgbClr val="569CD6"/>
+                </a:solidFill>
+                <a:latin typeface="Consolas" panose="020B0609020204030204" pitchFamily="49" charset="0"/>
+              </a:rPr>
+              <a:t>demo-</a:t>
+            </a:r>
+            <a:r>
+              <a:rPr lang="en-US" dirty="0" err="1">
+                <a:solidFill>
+                  <a:srgbClr val="569CD6"/>
+                </a:solidFill>
+                <a:latin typeface="Consolas" panose="020B0609020204030204" pitchFamily="49" charset="0"/>
+              </a:rPr>
+              <a:t>cmp</a:t>
+            </a:r>
+            <a:r>
+              <a:rPr lang="en-US" dirty="0">
+                <a:solidFill>
+                  <a:srgbClr val="569CD6"/>
+                </a:solidFill>
+                <a:latin typeface="Consolas" panose="020B0609020204030204" pitchFamily="49" charset="0"/>
+              </a:rPr>
+              <a:t>-old</a:t>
+            </a:r>
+            <a:r>
+              <a:rPr lang="en-US" dirty="0" smtClean="0">
+                <a:solidFill>
+                  <a:srgbClr val="808080"/>
+                </a:solidFill>
+                <a:latin typeface="Consolas" panose="020B0609020204030204" pitchFamily="49" charset="0"/>
+              </a:rPr>
+              <a:t>&gt;</a:t>
+            </a:r>
+            <a:endParaRPr lang="en-US" dirty="0">
+              <a:solidFill>
+                <a:srgbClr val="D4D4D4"/>
+              </a:solidFill>
+              <a:latin typeface="Consolas" panose="020B0609020204030204" pitchFamily="49" charset="0"/>
+            </a:endParaRPr>
+          </a:p>
+          <a:p>
+            <a:endParaRPr lang="en-US" b="0" dirty="0">
+              <a:solidFill>
+                <a:srgbClr val="D4D4D4"/>
+              </a:solidFill>
+              <a:effectLst/>
+              <a:latin typeface="Consolas" panose="020B0609020204030204" pitchFamily="49" charset="0"/>
+            </a:endParaRPr>
+          </a:p>
+        </p:txBody>
+      </p:sp>
+    </p:spTree>
+    <p:extLst>
+      <p:ext uri="{BB962C8B-B14F-4D97-AF65-F5344CB8AC3E}">
+        <p14:creationId xmlns:p14="http://schemas.microsoft.com/office/powerpoint/2010/main" val="1066382295"/>
       </p:ext>
     </p:extLst>
   </p:cSld>

</xml_diff>

<commit_message>
Added last slides. Added agends.
</commit_message>
<xml_diff>
--- a/angular/Angular.pptx
+++ b/angular/Angular.pptx
@@ -20,6 +20,8 @@
     <p:sldId id="270" r:id="rId14"/>
     <p:sldId id="269" r:id="rId15"/>
     <p:sldId id="258" r:id="rId16"/>
+    <p:sldId id="271" r:id="rId17"/>
+    <p:sldId id="272" r:id="rId18"/>
   </p:sldIdLst>
   <p:sldSz cx="12192000" cy="6858000"/>
   <p:notesSz cx="6858000" cy="9144000"/>
@@ -22674,7 +22676,7 @@
           </a:p>
           <a:p>
             <a:r>
-              <a:rPr lang="en-US" smtClean="0">
+              <a:rPr lang="en-US" dirty="0" smtClean="0">
                 <a:solidFill>
                   <a:srgbClr val="808080"/>
                 </a:solidFill>
@@ -23706,6 +23708,141 @@
       </p:par>
     </p:tnLst>
   </p:timing>
+</p:sld>
+</file>
+
+<file path=ppt/slides/slide16.xml><?xml version="1.0" encoding="utf-8"?>
+<p:sld xmlns:a="http://schemas.openxmlformats.org/drawingml/2006/main" xmlns:r="http://schemas.openxmlformats.org/officeDocument/2006/relationships" xmlns:p="http://schemas.openxmlformats.org/presentationml/2006/main">
+  <p:cSld>
+    <p:spTree>
+      <p:nvGrpSpPr>
+        <p:cNvPr id="1" name=""/>
+        <p:cNvGrpSpPr/>
+        <p:nvPr/>
+      </p:nvGrpSpPr>
+      <p:grpSpPr>
+        <a:xfrm>
+          <a:off x="0" y="0"/>
+          <a:ext cx="0" cy="0"/>
+          <a:chOff x="0" y="0"/>
+          <a:chExt cx="0" cy="0"/>
+        </a:xfrm>
+      </p:grpSpPr>
+      <p:sp>
+        <p:nvSpPr>
+          <p:cNvPr id="2" name="Title 1"/>
+          <p:cNvSpPr>
+            <a:spLocks noGrp="1"/>
+          </p:cNvSpPr>
+          <p:nvPr>
+            <p:ph type="title"/>
+          </p:nvPr>
+        </p:nvSpPr>
+        <p:spPr/>
+        <p:txBody>
+          <a:bodyPr/>
+          <a:lstStyle/>
+          <a:p>
+            <a:r>
+              <a:rPr lang="en-US" dirty="0" smtClean="0"/>
+              <a:t>Q&amp;A</a:t>
+            </a:r>
+            <a:endParaRPr lang="en-US" dirty="0"/>
+          </a:p>
+        </p:txBody>
+      </p:sp>
+    </p:spTree>
+    <p:extLst>
+      <p:ext uri="{BB962C8B-B14F-4D97-AF65-F5344CB8AC3E}">
+        <p14:creationId xmlns:p14="http://schemas.microsoft.com/office/powerpoint/2010/main" val="293542842"/>
+      </p:ext>
+    </p:extLst>
+  </p:cSld>
+  <p:clrMapOvr>
+    <a:masterClrMapping/>
+  </p:clrMapOvr>
+</p:sld>
+</file>
+
+<file path=ppt/slides/slide17.xml><?xml version="1.0" encoding="utf-8"?>
+<p:sld xmlns:a="http://schemas.openxmlformats.org/drawingml/2006/main" xmlns:r="http://schemas.openxmlformats.org/officeDocument/2006/relationships" xmlns:p="http://schemas.openxmlformats.org/presentationml/2006/main">
+  <p:cSld>
+    <p:spTree>
+      <p:nvGrpSpPr>
+        <p:cNvPr id="1" name=""/>
+        <p:cNvGrpSpPr/>
+        <p:nvPr/>
+      </p:nvGrpSpPr>
+      <p:grpSpPr>
+        <a:xfrm>
+          <a:off x="0" y="0"/>
+          <a:ext cx="0" cy="0"/>
+          <a:chOff x="0" y="0"/>
+          <a:chExt cx="0" cy="0"/>
+        </a:xfrm>
+      </p:grpSpPr>
+      <p:sp>
+        <p:nvSpPr>
+          <p:cNvPr id="2" name="Title 1"/>
+          <p:cNvSpPr>
+            <a:spLocks noGrp="1"/>
+          </p:cNvSpPr>
+          <p:nvPr>
+            <p:ph type="title"/>
+          </p:nvPr>
+        </p:nvSpPr>
+        <p:spPr/>
+        <p:txBody>
+          <a:bodyPr/>
+          <a:lstStyle/>
+          <a:p>
+            <a:r>
+              <a:rPr lang="en-US" dirty="0" smtClean="0"/>
+              <a:t>Thanks!</a:t>
+            </a:r>
+            <a:endParaRPr lang="en-US" dirty="0"/>
+          </a:p>
+        </p:txBody>
+      </p:sp>
+      <p:pic>
+        <p:nvPicPr>
+          <p:cNvPr id="4" name="Content Placeholder 3"/>
+          <p:cNvPicPr>
+            <a:picLocks noGrp="1" noChangeAspect="1"/>
+          </p:cNvPicPr>
+          <p:nvPr>
+            <p:ph idx="1"/>
+          </p:nvPr>
+        </p:nvPicPr>
+        <p:blipFill>
+          <a:blip r:embed="rId2">
+            <a:extLst>
+              <a:ext uri="{28A0092B-C50C-407E-A947-70E740481C1C}">
+                <a14:useLocalDpi xmlns:a14="http://schemas.microsoft.com/office/drawing/2010/main" val="0"/>
+              </a:ext>
+            </a:extLst>
+          </a:blip>
+          <a:stretch>
+            <a:fillRect/>
+          </a:stretch>
+        </p:blipFill>
+        <p:spPr>
+          <a:xfrm>
+            <a:off x="4046538" y="2660650"/>
+            <a:ext cx="6000750" cy="2724150"/>
+          </a:xfrm>
+        </p:spPr>
+      </p:pic>
+    </p:spTree>
+    <p:extLst>
+      <p:ext uri="{BB962C8B-B14F-4D97-AF65-F5344CB8AC3E}">
+        <p14:creationId xmlns:p14="http://schemas.microsoft.com/office/powerpoint/2010/main" val="1299228464"/>
+      </p:ext>
+    </p:extLst>
+  </p:cSld>
+  <p:clrMapOvr>
+    <a:masterClrMapping/>
+  </p:clrMapOvr>
 </p:sld>
 </file>
 

</xml_diff>